<commit_message>
Schemi frontend + arduino/raspberry
</commit_message>
<xml_diff>
--- a/Appunti/ISSPowerPoint.pptx
+++ b/Appunti/ISSPowerPoint.pptx
@@ -16,6 +16,8 @@
     <p:sldId id="264" r:id="rId10"/>
     <p:sldId id="266" r:id="rId11"/>
     <p:sldId id="267" r:id="rId12"/>
+    <p:sldId id="268" r:id="rId13"/>
+    <p:sldId id="269" r:id="rId14"/>
   </p:sldIdLst>
   <p:sldSz cx="12192000" cy="6858000"/>
   <p:notesSz cx="6858000" cy="9144000"/>
@@ -269,7 +271,7 @@
           <a:p>
             <a:fld id="{E6413443-42B5-4B96-B751-851C9FA71E6D}" type="datetimeFigureOut">
               <a:rPr lang="it-IT" smtClean="0"/>
-              <a:t>07/09/2018</a:t>
+              <a:t>08/09/2018</a:t>
             </a:fld>
             <a:endParaRPr lang="it-IT"/>
           </a:p>
@@ -467,7 +469,7 @@
           <a:p>
             <a:fld id="{E6413443-42B5-4B96-B751-851C9FA71E6D}" type="datetimeFigureOut">
               <a:rPr lang="it-IT" smtClean="0"/>
-              <a:t>07/09/2018</a:t>
+              <a:t>08/09/2018</a:t>
             </a:fld>
             <a:endParaRPr lang="it-IT"/>
           </a:p>
@@ -675,7 +677,7 @@
           <a:p>
             <a:fld id="{E6413443-42B5-4B96-B751-851C9FA71E6D}" type="datetimeFigureOut">
               <a:rPr lang="it-IT" smtClean="0"/>
-              <a:t>07/09/2018</a:t>
+              <a:t>08/09/2018</a:t>
             </a:fld>
             <a:endParaRPr lang="it-IT"/>
           </a:p>
@@ -873,7 +875,7 @@
           <a:p>
             <a:fld id="{E6413443-42B5-4B96-B751-851C9FA71E6D}" type="datetimeFigureOut">
               <a:rPr lang="it-IT" smtClean="0"/>
-              <a:t>07/09/2018</a:t>
+              <a:t>08/09/2018</a:t>
             </a:fld>
             <a:endParaRPr lang="it-IT"/>
           </a:p>
@@ -1148,7 +1150,7 @@
           <a:p>
             <a:fld id="{E6413443-42B5-4B96-B751-851C9FA71E6D}" type="datetimeFigureOut">
               <a:rPr lang="it-IT" smtClean="0"/>
-              <a:t>07/09/2018</a:t>
+              <a:t>08/09/2018</a:t>
             </a:fld>
             <a:endParaRPr lang="it-IT"/>
           </a:p>
@@ -1413,7 +1415,7 @@
           <a:p>
             <a:fld id="{E6413443-42B5-4B96-B751-851C9FA71E6D}" type="datetimeFigureOut">
               <a:rPr lang="it-IT" smtClean="0"/>
-              <a:t>07/09/2018</a:t>
+              <a:t>08/09/2018</a:t>
             </a:fld>
             <a:endParaRPr lang="it-IT"/>
           </a:p>
@@ -1825,7 +1827,7 @@
           <a:p>
             <a:fld id="{E6413443-42B5-4B96-B751-851C9FA71E6D}" type="datetimeFigureOut">
               <a:rPr lang="it-IT" smtClean="0"/>
-              <a:t>07/09/2018</a:t>
+              <a:t>08/09/2018</a:t>
             </a:fld>
             <a:endParaRPr lang="it-IT"/>
           </a:p>
@@ -1966,7 +1968,7 @@
           <a:p>
             <a:fld id="{E6413443-42B5-4B96-B751-851C9FA71E6D}" type="datetimeFigureOut">
               <a:rPr lang="it-IT" smtClean="0"/>
-              <a:t>07/09/2018</a:t>
+              <a:t>08/09/2018</a:t>
             </a:fld>
             <a:endParaRPr lang="it-IT"/>
           </a:p>
@@ -2079,7 +2081,7 @@
           <a:p>
             <a:fld id="{E6413443-42B5-4B96-B751-851C9FA71E6D}" type="datetimeFigureOut">
               <a:rPr lang="it-IT" smtClean="0"/>
-              <a:t>07/09/2018</a:t>
+              <a:t>08/09/2018</a:t>
             </a:fld>
             <a:endParaRPr lang="it-IT"/>
           </a:p>
@@ -2390,7 +2392,7 @@
           <a:p>
             <a:fld id="{E6413443-42B5-4B96-B751-851C9FA71E6D}" type="datetimeFigureOut">
               <a:rPr lang="it-IT" smtClean="0"/>
-              <a:t>07/09/2018</a:t>
+              <a:t>08/09/2018</a:t>
             </a:fld>
             <a:endParaRPr lang="it-IT"/>
           </a:p>
@@ -2678,7 +2680,7 @@
           <a:p>
             <a:fld id="{E6413443-42B5-4B96-B751-851C9FA71E6D}" type="datetimeFigureOut">
               <a:rPr lang="it-IT" smtClean="0"/>
-              <a:t>07/09/2018</a:t>
+              <a:t>08/09/2018</a:t>
             </a:fld>
             <a:endParaRPr lang="it-IT"/>
           </a:p>
@@ -2919,7 +2921,7 @@
           <a:p>
             <a:fld id="{E6413443-42B5-4B96-B751-851C9FA71E6D}" type="datetimeFigureOut">
               <a:rPr lang="it-IT" smtClean="0"/>
-              <a:t>07/09/2018</a:t>
+              <a:t>08/09/2018</a:t>
             </a:fld>
             <a:endParaRPr lang="it-IT"/>
           </a:p>
@@ -6560,8 +6562,8 @@
         </p:nvSpPr>
         <p:spPr>
           <a:xfrm>
-            <a:off x="8535106" y="1019908"/>
-            <a:ext cx="3015761" cy="2567354"/>
+            <a:off x="8535106" y="1019907"/>
+            <a:ext cx="3015761" cy="2673505"/>
           </a:xfrm>
           <a:prstGeom prst="roundRect">
             <a:avLst/>
@@ -7468,8 +7470,8 @@
         </p:nvSpPr>
         <p:spPr>
           <a:xfrm>
-            <a:off x="5158514" y="5888594"/>
-            <a:ext cx="1602253" cy="369332"/>
+            <a:off x="5324081" y="5953551"/>
+            <a:ext cx="1240766" cy="369332"/>
           </a:xfrm>
           <a:prstGeom prst="rect">
             <a:avLst/>
@@ -7484,7 +7486,7 @@
           <a:p>
             <a:r>
               <a:rPr lang="it-IT" dirty="0"/>
-              <a:t>QA real robot</a:t>
+              <a:t>Real Robot</a:t>
             </a:r>
           </a:p>
         </p:txBody>
@@ -7810,142 +7812,6 @@
           </a:fontRef>
         </p:style>
       </p:cxnSp>
-      <p:grpSp>
-        <p:nvGrpSpPr>
-          <p:cNvPr id="66" name="Gruppo 65">
-            <a:extLst>
-              <a:ext uri="{FF2B5EF4-FFF2-40B4-BE49-F238E27FC236}">
-                <a16:creationId xmlns:a16="http://schemas.microsoft.com/office/drawing/2014/main" id="{1B8300BD-A7A6-48EF-A65A-5BE02545C857}"/>
-              </a:ext>
-            </a:extLst>
-          </p:cNvPr>
-          <p:cNvGrpSpPr/>
-          <p:nvPr/>
-        </p:nvGrpSpPr>
-        <p:grpSpPr>
-          <a:xfrm>
-            <a:off x="9681135" y="3314700"/>
-            <a:ext cx="869528" cy="228600"/>
-            <a:chOff x="9938385" y="6250305"/>
-            <a:chExt cx="869528" cy="228600"/>
-          </a:xfrm>
-        </p:grpSpPr>
-        <p:cxnSp>
-          <p:nvCxnSpPr>
-            <p:cNvPr id="67" name="Connettore diritto 66">
-              <a:extLst>
-                <a:ext uri="{FF2B5EF4-FFF2-40B4-BE49-F238E27FC236}">
-                  <a16:creationId xmlns:a16="http://schemas.microsoft.com/office/drawing/2014/main" id="{507C3EF4-E6D3-4C6D-8640-35C66E688EF7}"/>
-                </a:ext>
-              </a:extLst>
-            </p:cNvPr>
-            <p:cNvCxnSpPr/>
-            <p:nvPr/>
-          </p:nvCxnSpPr>
-          <p:spPr>
-            <a:xfrm flipV="1">
-              <a:off x="9938385" y="6250305"/>
-              <a:ext cx="0" cy="228600"/>
-            </a:xfrm>
-            <a:prstGeom prst="line">
-              <a:avLst/>
-            </a:prstGeom>
-            <a:ln w="19050"/>
-          </p:spPr>
-          <p:style>
-            <a:lnRef idx="1">
-              <a:schemeClr val="dk1"/>
-            </a:lnRef>
-            <a:fillRef idx="0">
-              <a:schemeClr val="dk1"/>
-            </a:fillRef>
-            <a:effectRef idx="0">
-              <a:schemeClr val="dk1"/>
-            </a:effectRef>
-            <a:fontRef idx="minor">
-              <a:schemeClr val="tx1"/>
-            </a:fontRef>
-          </p:style>
-        </p:cxnSp>
-        <p:cxnSp>
-          <p:nvCxnSpPr>
-            <p:cNvPr id="68" name="Connettore diritto 67">
-              <a:extLst>
-                <a:ext uri="{FF2B5EF4-FFF2-40B4-BE49-F238E27FC236}">
-                  <a16:creationId xmlns:a16="http://schemas.microsoft.com/office/drawing/2014/main" id="{60740E67-A408-4ED1-AC70-11E00AC76A90}"/>
-                </a:ext>
-              </a:extLst>
-            </p:cNvPr>
-            <p:cNvCxnSpPr>
-              <a:cxnSpLocks/>
-            </p:cNvCxnSpPr>
-            <p:nvPr/>
-          </p:nvCxnSpPr>
-          <p:spPr>
-            <a:xfrm>
-              <a:off x="9938385" y="6250305"/>
-              <a:ext cx="869528" cy="0"/>
-            </a:xfrm>
-            <a:prstGeom prst="line">
-              <a:avLst/>
-            </a:prstGeom>
-            <a:ln w="19050"/>
-          </p:spPr>
-          <p:style>
-            <a:lnRef idx="1">
-              <a:schemeClr val="dk1"/>
-            </a:lnRef>
-            <a:fillRef idx="0">
-              <a:schemeClr val="dk1"/>
-            </a:fillRef>
-            <a:effectRef idx="0">
-              <a:schemeClr val="dk1"/>
-            </a:effectRef>
-            <a:fontRef idx="minor">
-              <a:schemeClr val="tx1"/>
-            </a:fontRef>
-          </p:style>
-        </p:cxnSp>
-        <p:cxnSp>
-          <p:nvCxnSpPr>
-            <p:cNvPr id="69" name="Connettore diritto 68">
-              <a:extLst>
-                <a:ext uri="{FF2B5EF4-FFF2-40B4-BE49-F238E27FC236}">
-                  <a16:creationId xmlns:a16="http://schemas.microsoft.com/office/drawing/2014/main" id="{BAB470B7-A78D-46E0-868E-39D1B328DE64}"/>
-                </a:ext>
-              </a:extLst>
-            </p:cNvPr>
-            <p:cNvCxnSpPr>
-              <a:cxnSpLocks/>
-            </p:cNvCxnSpPr>
-            <p:nvPr/>
-          </p:nvCxnSpPr>
-          <p:spPr>
-            <a:xfrm flipV="1">
-              <a:off x="10801349" y="6250305"/>
-              <a:ext cx="1" cy="228600"/>
-            </a:xfrm>
-            <a:prstGeom prst="line">
-              <a:avLst/>
-            </a:prstGeom>
-            <a:ln w="19050"/>
-          </p:spPr>
-          <p:style>
-            <a:lnRef idx="1">
-              <a:schemeClr val="dk1"/>
-            </a:lnRef>
-            <a:fillRef idx="0">
-              <a:schemeClr val="dk1"/>
-            </a:fillRef>
-            <a:effectRef idx="0">
-              <a:schemeClr val="dk1"/>
-            </a:effectRef>
-            <a:fontRef idx="minor">
-              <a:schemeClr val="tx1"/>
-            </a:fontRef>
-          </p:style>
-        </p:cxnSp>
-      </p:grpSp>
       <p:sp>
         <p:nvSpPr>
           <p:cNvPr id="70" name="Rettangolo con angoli arrotondati 69">
@@ -8284,7 +8150,7 @@
         </p:nvSpPr>
         <p:spPr>
           <a:xfrm>
-            <a:off x="9522170" y="2601791"/>
+            <a:off x="9552477" y="2742700"/>
             <a:ext cx="1150413" cy="612599"/>
           </a:xfrm>
           <a:prstGeom prst="roundRect">
@@ -8323,10 +8189,10 @@
             <a:r>
               <a:rPr lang="it-IT" dirty="0">
                 <a:solidFill>
-                  <a:schemeClr val="tx2"/>
+                  <a:schemeClr val="bg1"/>
                 </a:solidFill>
               </a:rPr>
-              <a:t>Temp Client</a:t>
+              <a:t>Java TCP Client</a:t>
             </a:r>
           </a:p>
         </p:txBody>
@@ -8441,7 +8307,7 @@
         </p:nvSpPr>
         <p:spPr>
           <a:xfrm rot="10800000" flipV="1">
-            <a:off x="8044680" y="4954438"/>
+            <a:off x="8054739" y="4892343"/>
             <a:ext cx="876988" cy="369332"/>
           </a:xfrm>
           <a:prstGeom prst="rect">
@@ -8473,13 +8339,12 @@
           </p:cNvPr>
           <p:cNvCxnSpPr>
             <a:cxnSpLocks/>
-            <a:stCxn id="96" idx="0"/>
           </p:cNvCxnSpPr>
           <p:nvPr/>
         </p:nvCxnSpPr>
         <p:spPr>
           <a:xfrm flipH="1" flipV="1">
-            <a:off x="10097376" y="2051101"/>
+            <a:off x="10121276" y="1418699"/>
             <a:ext cx="1" cy="550690"/>
           </a:xfrm>
           <a:prstGeom prst="straightConnector1">
@@ -8521,7 +8386,7 @@
         </p:nvSpPr>
         <p:spPr>
           <a:xfrm rot="10800000" flipV="1">
-            <a:off x="10071760" y="2145854"/>
+            <a:off x="10154672" y="1533859"/>
             <a:ext cx="876988" cy="369332"/>
           </a:xfrm>
           <a:prstGeom prst="rect">
@@ -8603,45 +8468,10 @@
             <a:r>
               <a:rPr lang="it-IT" dirty="0">
                 <a:solidFill>
-                  <a:schemeClr val="tx2"/>
+                  <a:schemeClr val="bg1"/>
                 </a:solidFill>
               </a:rPr>
               <a:t>Mock TempGUI</a:t>
-            </a:r>
-          </a:p>
-        </p:txBody>
-      </p:sp>
-      <p:sp>
-        <p:nvSpPr>
-          <p:cNvPr id="145" name="CasellaDiTesto 144">
-            <a:extLst>
-              <a:ext uri="{FF2B5EF4-FFF2-40B4-BE49-F238E27FC236}">
-                <a16:creationId xmlns:a16="http://schemas.microsoft.com/office/drawing/2014/main" id="{82D2D75D-EC84-4EDD-8AC7-8182E9083453}"/>
-              </a:ext>
-            </a:extLst>
-          </p:cNvPr>
-          <p:cNvSpPr txBox="1"/>
-          <p:nvPr/>
-        </p:nvSpPr>
-        <p:spPr>
-          <a:xfrm>
-            <a:off x="8876965" y="5519262"/>
-            <a:ext cx="579292" cy="369332"/>
-          </a:xfrm>
-          <a:prstGeom prst="rect">
-            <a:avLst/>
-          </a:prstGeom>
-          <a:noFill/>
-        </p:spPr>
-        <p:txBody>
-          <a:bodyPr wrap="square" rtlCol="0">
-            <a:spAutoFit/>
-          </a:bodyPr>
-          <a:lstStyle/>
-          <a:p>
-            <a:r>
-              <a:rPr lang="it-IT" dirty="0"/>
-              <a:t>QA</a:t>
             </a:r>
           </a:p>
         </p:txBody>
@@ -8788,8 +8618,8 @@
         </p:nvCxnSpPr>
         <p:spPr>
           <a:xfrm flipV="1">
-            <a:off x="7102156" y="3535334"/>
-            <a:ext cx="1601740" cy="2156180"/>
+            <a:off x="7102156" y="3587262"/>
+            <a:ext cx="1585408" cy="2104252"/>
           </a:xfrm>
           <a:prstGeom prst="straightConnector1">
             <a:avLst/>
@@ -8856,41 +8686,6 @@
           </a:p>
         </p:txBody>
       </p:sp>
-      <p:sp>
-        <p:nvSpPr>
-          <p:cNvPr id="159" name="CasellaDiTesto 158">
-            <a:extLst>
-              <a:ext uri="{FF2B5EF4-FFF2-40B4-BE49-F238E27FC236}">
-                <a16:creationId xmlns:a16="http://schemas.microsoft.com/office/drawing/2014/main" id="{C5013DFB-02A2-4E60-9333-42F662FC17D9}"/>
-              </a:ext>
-            </a:extLst>
-          </p:cNvPr>
-          <p:cNvSpPr txBox="1"/>
-          <p:nvPr/>
-        </p:nvSpPr>
-        <p:spPr>
-          <a:xfrm>
-            <a:off x="10894403" y="3535334"/>
-            <a:ext cx="1259670" cy="646331"/>
-          </a:xfrm>
-          <a:prstGeom prst="rect">
-            <a:avLst/>
-          </a:prstGeom>
-          <a:noFill/>
-        </p:spPr>
-        <p:txBody>
-          <a:bodyPr wrap="square" rtlCol="0">
-            <a:spAutoFit/>
-          </a:bodyPr>
-          <a:lstStyle/>
-          <a:p>
-            <a:r>
-              <a:rPr lang="it-IT" dirty="0"/>
-              <a:t>Java TCP Client</a:t>
-            </a:r>
-          </a:p>
-        </p:txBody>
-      </p:sp>
       <p:pic>
         <p:nvPicPr>
           <p:cNvPr id="1026" name="Picture 2" descr="Risultati immagini per arduino logo png">
@@ -9079,10 +8874,2348 @@
           </a:extLst>
         </p:spPr>
       </p:pic>
+      <p:sp>
+        <p:nvSpPr>
+          <p:cNvPr id="63" name="Ovale 62">
+            <a:extLst>
+              <a:ext uri="{FF2B5EF4-FFF2-40B4-BE49-F238E27FC236}">
+                <a16:creationId xmlns:a16="http://schemas.microsoft.com/office/drawing/2014/main" id="{45F6205E-4B1B-4B2E-B32A-35BCBEDB56B4}"/>
+              </a:ext>
+            </a:extLst>
+          </p:cNvPr>
+          <p:cNvSpPr/>
+          <p:nvPr/>
+        </p:nvSpPr>
+        <p:spPr>
+          <a:xfrm>
+            <a:off x="9240311" y="1960597"/>
+            <a:ext cx="1774747" cy="1626665"/>
+          </a:xfrm>
+          <a:prstGeom prst="ellipse">
+            <a:avLst/>
+          </a:prstGeom>
+          <a:noFill/>
+          <a:ln w="38100">
+            <a:solidFill>
+              <a:schemeClr val="accent2"/>
+            </a:solidFill>
+          </a:ln>
+        </p:spPr>
+        <p:style>
+          <a:lnRef idx="2">
+            <a:schemeClr val="accent1">
+              <a:shade val="50000"/>
+            </a:schemeClr>
+          </a:lnRef>
+          <a:fillRef idx="1">
+            <a:schemeClr val="accent1"/>
+          </a:fillRef>
+          <a:effectRef idx="0">
+            <a:schemeClr val="accent1"/>
+          </a:effectRef>
+          <a:fontRef idx="minor">
+            <a:schemeClr val="lt1"/>
+          </a:fontRef>
+        </p:style>
+        <p:txBody>
+          <a:bodyPr rtlCol="0" anchor="ctr"/>
+          <a:lstStyle/>
+          <a:p>
+            <a:pPr algn="ctr"/>
+            <a:endParaRPr lang="it-IT" sz="2000" dirty="0">
+              <a:solidFill>
+                <a:schemeClr val="tx2"/>
+              </a:solidFill>
+            </a:endParaRPr>
+          </a:p>
+        </p:txBody>
+      </p:sp>
     </p:spTree>
     <p:extLst>
       <p:ext uri="{BB962C8B-B14F-4D97-AF65-F5344CB8AC3E}">
         <p14:creationId xmlns:p14="http://schemas.microsoft.com/office/powerpoint/2010/main" val="1477396198"/>
+      </p:ext>
+    </p:extLst>
+  </p:cSld>
+  <p:clrMapOvr>
+    <a:masterClrMapping/>
+  </p:clrMapOvr>
+</p:sld>
+</file>
+
+<file path=ppt/slides/slide12.xml><?xml version="1.0" encoding="utf-8"?>
+<p:sld xmlns:a="http://schemas.openxmlformats.org/drawingml/2006/main" xmlns:r="http://schemas.openxmlformats.org/officeDocument/2006/relationships" xmlns:p="http://schemas.openxmlformats.org/presentationml/2006/main">
+  <p:cSld>
+    <p:spTree>
+      <p:nvGrpSpPr>
+        <p:cNvPr id="1" name=""/>
+        <p:cNvGrpSpPr/>
+        <p:nvPr/>
+      </p:nvGrpSpPr>
+      <p:grpSpPr>
+        <a:xfrm>
+          <a:off x="0" y="0"/>
+          <a:ext cx="0" cy="0"/>
+          <a:chOff x="0" y="0"/>
+          <a:chExt cx="0" cy="0"/>
+        </a:xfrm>
+      </p:grpSpPr>
+      <p:sp>
+        <p:nvSpPr>
+          <p:cNvPr id="2" name="Rettangolo con angoli arrotondati 1">
+            <a:extLst>
+              <a:ext uri="{FF2B5EF4-FFF2-40B4-BE49-F238E27FC236}">
+                <a16:creationId xmlns:a16="http://schemas.microsoft.com/office/drawing/2014/main" id="{B80AA083-EE88-41EC-96BA-9019F59DD0D5}"/>
+              </a:ext>
+            </a:extLst>
+          </p:cNvPr>
+          <p:cNvSpPr/>
+          <p:nvPr/>
+        </p:nvSpPr>
+        <p:spPr>
+          <a:xfrm>
+            <a:off x="2927838" y="1828800"/>
+            <a:ext cx="3420208" cy="3305908"/>
+          </a:xfrm>
+          <a:prstGeom prst="roundRect">
+            <a:avLst/>
+          </a:prstGeom>
+          <a:noFill/>
+          <a:ln w="38100">
+            <a:solidFill>
+              <a:schemeClr val="tx1"/>
+            </a:solidFill>
+          </a:ln>
+        </p:spPr>
+        <p:style>
+          <a:lnRef idx="2">
+            <a:schemeClr val="accent1">
+              <a:shade val="50000"/>
+            </a:schemeClr>
+          </a:lnRef>
+          <a:fillRef idx="1">
+            <a:schemeClr val="accent1"/>
+          </a:fillRef>
+          <a:effectRef idx="0">
+            <a:schemeClr val="accent1"/>
+          </a:effectRef>
+          <a:fontRef idx="minor">
+            <a:schemeClr val="lt1"/>
+          </a:fontRef>
+        </p:style>
+        <p:txBody>
+          <a:bodyPr rtlCol="0" anchor="ctr"/>
+          <a:lstStyle/>
+          <a:p>
+            <a:pPr algn="ctr"/>
+            <a:endParaRPr lang="it-IT"/>
+          </a:p>
+        </p:txBody>
+      </p:sp>
+      <p:sp>
+        <p:nvSpPr>
+          <p:cNvPr id="3" name="Rettangolo con angoli arrotondati 2">
+            <a:extLst>
+              <a:ext uri="{FF2B5EF4-FFF2-40B4-BE49-F238E27FC236}">
+                <a16:creationId xmlns:a16="http://schemas.microsoft.com/office/drawing/2014/main" id="{B4F3E563-B08B-4D8A-AF95-EF27AD184AC3}"/>
+              </a:ext>
+            </a:extLst>
+          </p:cNvPr>
+          <p:cNvSpPr/>
+          <p:nvPr/>
+        </p:nvSpPr>
+        <p:spPr>
+          <a:xfrm>
+            <a:off x="8474905" y="2130118"/>
+            <a:ext cx="2234126" cy="2224453"/>
+          </a:xfrm>
+          <a:prstGeom prst="roundRect">
+            <a:avLst/>
+          </a:prstGeom>
+          <a:noFill/>
+          <a:ln w="38100">
+            <a:solidFill>
+              <a:schemeClr val="accent1"/>
+            </a:solidFill>
+          </a:ln>
+        </p:spPr>
+        <p:style>
+          <a:lnRef idx="2">
+            <a:schemeClr val="accent1">
+              <a:shade val="50000"/>
+            </a:schemeClr>
+          </a:lnRef>
+          <a:fillRef idx="1">
+            <a:schemeClr val="accent1"/>
+          </a:fillRef>
+          <a:effectRef idx="0">
+            <a:schemeClr val="accent1"/>
+          </a:effectRef>
+          <a:fontRef idx="minor">
+            <a:schemeClr val="lt1"/>
+          </a:fontRef>
+        </p:style>
+        <p:txBody>
+          <a:bodyPr rtlCol="0" anchor="ctr"/>
+          <a:lstStyle/>
+          <a:p>
+            <a:pPr algn="ctr"/>
+            <a:endParaRPr lang="it-IT"/>
+          </a:p>
+        </p:txBody>
+      </p:sp>
+      <p:sp>
+        <p:nvSpPr>
+          <p:cNvPr id="4" name="Rettangolo 3">
+            <a:extLst>
+              <a:ext uri="{FF2B5EF4-FFF2-40B4-BE49-F238E27FC236}">
+                <a16:creationId xmlns:a16="http://schemas.microsoft.com/office/drawing/2014/main" id="{3CA09E77-DBFC-4101-802F-EEB84E5CEE96}"/>
+              </a:ext>
+            </a:extLst>
+          </p:cNvPr>
+          <p:cNvSpPr/>
+          <p:nvPr/>
+        </p:nvSpPr>
+        <p:spPr>
+          <a:xfrm>
+            <a:off x="3780034" y="695164"/>
+            <a:ext cx="1722120" cy="266700"/>
+          </a:xfrm>
+          <a:prstGeom prst="rect">
+            <a:avLst/>
+          </a:prstGeom>
+        </p:spPr>
+        <p:style>
+          <a:lnRef idx="2">
+            <a:schemeClr val="accent1">
+              <a:shade val="50000"/>
+            </a:schemeClr>
+          </a:lnRef>
+          <a:fillRef idx="1">
+            <a:schemeClr val="accent1"/>
+          </a:fillRef>
+          <a:effectRef idx="0">
+            <a:schemeClr val="accent1"/>
+          </a:effectRef>
+          <a:fontRef idx="minor">
+            <a:schemeClr val="lt1"/>
+          </a:fontRef>
+        </p:style>
+        <p:txBody>
+          <a:bodyPr rtlCol="0" anchor="ctr"/>
+          <a:lstStyle/>
+          <a:p>
+            <a:pPr algn="ctr"/>
+            <a:r>
+              <a:rPr lang="it-IT" dirty="0"/>
+              <a:t>Real Robot</a:t>
+            </a:r>
+          </a:p>
+        </p:txBody>
+      </p:sp>
+      <p:sp>
+        <p:nvSpPr>
+          <p:cNvPr id="5" name="Rettangolo 4">
+            <a:extLst>
+              <a:ext uri="{FF2B5EF4-FFF2-40B4-BE49-F238E27FC236}">
+                <a16:creationId xmlns:a16="http://schemas.microsoft.com/office/drawing/2014/main" id="{ED65227B-5B1C-45A4-A088-D21A5E581C2D}"/>
+              </a:ext>
+            </a:extLst>
+          </p:cNvPr>
+          <p:cNvSpPr/>
+          <p:nvPr/>
+        </p:nvSpPr>
+        <p:spPr>
+          <a:xfrm>
+            <a:off x="8730908" y="695164"/>
+            <a:ext cx="1722120" cy="266700"/>
+          </a:xfrm>
+          <a:prstGeom prst="rect">
+            <a:avLst/>
+          </a:prstGeom>
+        </p:spPr>
+        <p:style>
+          <a:lnRef idx="2">
+            <a:schemeClr val="accent1">
+              <a:shade val="50000"/>
+            </a:schemeClr>
+          </a:lnRef>
+          <a:fillRef idx="1">
+            <a:schemeClr val="accent1"/>
+          </a:fillRef>
+          <a:effectRef idx="0">
+            <a:schemeClr val="accent1"/>
+          </a:effectRef>
+          <a:fontRef idx="minor">
+            <a:schemeClr val="lt1"/>
+          </a:fontRef>
+        </p:style>
+        <p:txBody>
+          <a:bodyPr rtlCol="0" anchor="ctr"/>
+          <a:lstStyle/>
+          <a:p>
+            <a:pPr algn="ctr"/>
+            <a:r>
+              <a:rPr lang="it-IT" dirty="0"/>
+              <a:t>System</a:t>
+            </a:r>
+          </a:p>
+        </p:txBody>
+      </p:sp>
+      <p:sp>
+        <p:nvSpPr>
+          <p:cNvPr id="7" name="Ovale 6">
+            <a:extLst>
+              <a:ext uri="{FF2B5EF4-FFF2-40B4-BE49-F238E27FC236}">
+                <a16:creationId xmlns:a16="http://schemas.microsoft.com/office/drawing/2014/main" id="{15950A0B-E6D8-494E-B84A-31FF67A63A85}"/>
+              </a:ext>
+            </a:extLst>
+          </p:cNvPr>
+          <p:cNvSpPr/>
+          <p:nvPr/>
+        </p:nvSpPr>
+        <p:spPr>
+          <a:xfrm>
+            <a:off x="3182817" y="2721272"/>
+            <a:ext cx="1153255" cy="1116623"/>
+          </a:xfrm>
+          <a:prstGeom prst="ellipse">
+            <a:avLst/>
+          </a:prstGeom>
+          <a:solidFill>
+            <a:schemeClr val="accent1">
+              <a:lumMod val="60000"/>
+              <a:lumOff val="40000"/>
+            </a:schemeClr>
+          </a:solidFill>
+          <a:ln w="38100"/>
+        </p:spPr>
+        <p:style>
+          <a:lnRef idx="2">
+            <a:schemeClr val="accent1">
+              <a:shade val="50000"/>
+            </a:schemeClr>
+          </a:lnRef>
+          <a:fillRef idx="1">
+            <a:schemeClr val="accent1"/>
+          </a:fillRef>
+          <a:effectRef idx="0">
+            <a:schemeClr val="accent1"/>
+          </a:effectRef>
+          <a:fontRef idx="minor">
+            <a:schemeClr val="lt1"/>
+          </a:fontRef>
+        </p:style>
+        <p:txBody>
+          <a:bodyPr rtlCol="0" anchor="ctr"/>
+          <a:lstStyle/>
+          <a:p>
+            <a:pPr algn="ctr"/>
+            <a:endParaRPr lang="it-IT" dirty="0"/>
+          </a:p>
+        </p:txBody>
+      </p:sp>
+      <p:sp>
+        <p:nvSpPr>
+          <p:cNvPr id="14" name="Ovale 13">
+            <a:extLst>
+              <a:ext uri="{FF2B5EF4-FFF2-40B4-BE49-F238E27FC236}">
+                <a16:creationId xmlns:a16="http://schemas.microsoft.com/office/drawing/2014/main" id="{9849D68C-F64D-4792-8165-C458BF49CD29}"/>
+              </a:ext>
+            </a:extLst>
+          </p:cNvPr>
+          <p:cNvSpPr/>
+          <p:nvPr/>
+        </p:nvSpPr>
+        <p:spPr>
+          <a:xfrm>
+            <a:off x="4828445" y="2721272"/>
+            <a:ext cx="1153255" cy="1116623"/>
+          </a:xfrm>
+          <a:prstGeom prst="ellipse">
+            <a:avLst/>
+          </a:prstGeom>
+          <a:solidFill>
+            <a:schemeClr val="accent2">
+              <a:lumMod val="60000"/>
+              <a:lumOff val="40000"/>
+            </a:schemeClr>
+          </a:solidFill>
+          <a:ln w="38100">
+            <a:solidFill>
+              <a:schemeClr val="accent2">
+                <a:lumMod val="75000"/>
+              </a:schemeClr>
+            </a:solidFill>
+          </a:ln>
+        </p:spPr>
+        <p:style>
+          <a:lnRef idx="2">
+            <a:schemeClr val="accent1">
+              <a:shade val="50000"/>
+            </a:schemeClr>
+          </a:lnRef>
+          <a:fillRef idx="1">
+            <a:schemeClr val="accent1"/>
+          </a:fillRef>
+          <a:effectRef idx="0">
+            <a:schemeClr val="accent1"/>
+          </a:effectRef>
+          <a:fontRef idx="minor">
+            <a:schemeClr val="lt1"/>
+          </a:fontRef>
+        </p:style>
+        <p:txBody>
+          <a:bodyPr rtlCol="0" anchor="ctr"/>
+          <a:lstStyle/>
+          <a:p>
+            <a:pPr algn="ctr"/>
+            <a:endParaRPr lang="it-IT" dirty="0"/>
+          </a:p>
+        </p:txBody>
+      </p:sp>
+      <mc:AlternateContent xmlns:mc="http://schemas.openxmlformats.org/markup-compatibility/2006" xmlns:am3d="http://schemas.microsoft.com/office/drawing/2017/model3d">
+        <mc:Choice Requires="am3d">
+          <p:graphicFrame>
+            <p:nvGraphicFramePr>
+              <p:cNvPr id="17" name="Modello 3D 16" descr="Tubo">
+                <a:extLst>
+                  <a:ext uri="{FF2B5EF4-FFF2-40B4-BE49-F238E27FC236}">
+                    <a16:creationId xmlns:a16="http://schemas.microsoft.com/office/drawing/2014/main" id="{28A366A5-1F0F-45B8-AA67-C61E3B5414AD}"/>
+                  </a:ext>
+                </a:extLst>
+              </p:cNvPr>
+              <p:cNvGraphicFramePr>
+                <a:graphicFrameLocks noChangeAspect="1"/>
+              </p:cNvGraphicFramePr>
+              <p:nvPr>
+                <p:extLst>
+                  <p:ext uri="{D42A27DB-BD31-4B8C-83A1-F6EECF244321}">
+                    <p14:modId xmlns:p14="http://schemas.microsoft.com/office/powerpoint/2010/main" val="2322938054"/>
+                  </p:ext>
+                </p:extLst>
+              </p:nvPr>
+            </p:nvGraphicFramePr>
+            <p:xfrm rot="16200000">
+              <a:off x="4317504" y="2906586"/>
+              <a:ext cx="519364" cy="745994"/>
+            </p:xfrm>
+            <a:graphic>
+              <a:graphicData uri="http://schemas.microsoft.com/office/drawing/2017/model3d">
+                <am3d:model3d r:embed="rId2">
+                  <am3d:spPr>
+                    <a:xfrm rot="16200000">
+                      <a:off x="0" y="0"/>
+                      <a:ext cx="519364" cy="745994"/>
+                    </a:xfrm>
+                    <a:prstGeom prst="rect">
+                      <a:avLst/>
+                    </a:prstGeom>
+                  </am3d:spPr>
+                  <am3d:camera>
+                    <am3d:pos x="0" y="0" z="62782805"/>
+                    <am3d:up dx="0" dy="36000000" dz="0"/>
+                    <am3d:lookAt x="0" y="0" z="0"/>
+                    <am3d:perspective fov="2700000"/>
+                  </am3d:camera>
+                  <am3d:trans>
+                    <am3d:meterPerModelUnit n="7159681" d="1000000"/>
+                    <am3d:preTrans dx="22" dy="-18000000" dz="6"/>
+                    <am3d:scale>
+                      <am3d:sx n="1000000" d="1000000"/>
+                      <am3d:sy n="1000000" d="1000000"/>
+                      <am3d:sz n="1000000" d="1000000"/>
+                    </am3d:scale>
+                    <am3d:rot ax="8046875" ay="-2659582" az="-8653294"/>
+                    <am3d:postTrans dx="0" dy="0" dz="0"/>
+                  </am3d:trans>
+                  <am3d:raster rName="Office3DRenderer" rVer="16.0.8326">
+                    <am3d:blip r:embed="rId3"/>
+                  </am3d:raster>
+                  <am3d:objViewport viewportSz="821538"/>
+                  <am3d:ambientLight>
+                    <am3d:clr>
+                      <a:scrgbClr r="50000" g="50000" b="50000"/>
+                    </am3d:clr>
+                    <am3d:illuminance n="500000" d="1000000"/>
+                  </am3d:ambientLight>
+                  <am3d:ptLight rad="0">
+                    <am3d:clr>
+                      <a:scrgbClr r="100000" g="75000" b="50000"/>
+                    </am3d:clr>
+                    <am3d:intensity n="9765625" d="1000000"/>
+                    <am3d:pos x="21959998" y="70920001" z="16344003"/>
+                  </am3d:ptLight>
+                  <am3d:ptLight rad="0">
+                    <am3d:clr>
+                      <a:scrgbClr r="40000" g="60000" b="95000"/>
+                    </am3d:clr>
+                    <am3d:intensity n="12250000" d="1000000"/>
+                    <am3d:pos x="-37964106" y="51130435" z="57631972"/>
+                  </am3d:ptLight>
+                  <am3d:ptLight rad="0">
+                    <am3d:clr>
+                      <a:scrgbClr r="86837" g="72700" b="100000"/>
+                    </am3d:clr>
+                    <am3d:intensity n="3125000" d="1000000"/>
+                    <am3d:pos x="-37739122" y="58056624" z="-34769649"/>
+                  </am3d:ptLight>
+                </am3d:model3d>
+              </a:graphicData>
+            </a:graphic>
+          </p:graphicFrame>
+        </mc:Choice>
+        <mc:Fallback xmlns="">
+          <p:pic>
+            <p:nvPicPr>
+              <p:cNvPr id="17" name="Modello 3D 16" descr="Tubo">
+                <a:extLst>
+                  <a:ext uri="{FF2B5EF4-FFF2-40B4-BE49-F238E27FC236}">
+                    <a16:creationId xmlns:a16="http://schemas.microsoft.com/office/drawing/2014/main" id="{28A366A5-1F0F-45B8-AA67-C61E3B5414AD}"/>
+                  </a:ext>
+                </a:extLst>
+              </p:cNvPr>
+              <p:cNvPicPr>
+                <a:picLocks noGrp="1" noRot="1" noChangeAspect="1" noMove="1" noResize="1" noEditPoints="1" noAdjustHandles="1" noChangeArrowheads="1" noChangeShapeType="1" noCrop="1"/>
+              </p:cNvPicPr>
+              <p:nvPr/>
+            </p:nvPicPr>
+            <p:blipFill>
+              <a:blip r:embed="rId4"/>
+              <a:stretch>
+                <a:fillRect/>
+              </a:stretch>
+            </p:blipFill>
+            <p:spPr>
+              <a:xfrm rot="16200000">
+                <a:off x="4317504" y="2906586"/>
+                <a:ext cx="519364" cy="745994"/>
+              </a:xfrm>
+              <a:prstGeom prst="rect">
+                <a:avLst/>
+              </a:prstGeom>
+            </p:spPr>
+          </p:pic>
+        </mc:Fallback>
+      </mc:AlternateContent>
+      <p:sp>
+        <p:nvSpPr>
+          <p:cNvPr id="20" name="CasellaDiTesto 19">
+            <a:extLst>
+              <a:ext uri="{FF2B5EF4-FFF2-40B4-BE49-F238E27FC236}">
+                <a16:creationId xmlns:a16="http://schemas.microsoft.com/office/drawing/2014/main" id="{6E16E299-6658-4CC6-99EF-B8075E5E224C}"/>
+              </a:ext>
+            </a:extLst>
+          </p:cNvPr>
+          <p:cNvSpPr txBox="1"/>
+          <p:nvPr/>
+        </p:nvSpPr>
+        <p:spPr>
+          <a:xfrm>
+            <a:off x="4239586" y="3439046"/>
+            <a:ext cx="934915" cy="369332"/>
+          </a:xfrm>
+          <a:prstGeom prst="rect">
+            <a:avLst/>
+          </a:prstGeom>
+          <a:noFill/>
+        </p:spPr>
+        <p:txBody>
+          <a:bodyPr wrap="square" rtlCol="0">
+            <a:spAutoFit/>
+          </a:bodyPr>
+          <a:lstStyle/>
+          <a:p>
+            <a:r>
+              <a:rPr lang="it-IT" dirty="0"/>
+              <a:t>Serial</a:t>
+            </a:r>
+          </a:p>
+        </p:txBody>
+      </p:sp>
+      <p:cxnSp>
+        <p:nvCxnSpPr>
+          <p:cNvPr id="21" name="Connettore 2 20">
+            <a:extLst>
+              <a:ext uri="{FF2B5EF4-FFF2-40B4-BE49-F238E27FC236}">
+                <a16:creationId xmlns:a16="http://schemas.microsoft.com/office/drawing/2014/main" id="{EA3FCD20-E55B-403E-A357-65D6A6991A36}"/>
+              </a:ext>
+            </a:extLst>
+          </p:cNvPr>
+          <p:cNvCxnSpPr>
+            <a:cxnSpLocks/>
+          </p:cNvCxnSpPr>
+          <p:nvPr/>
+        </p:nvCxnSpPr>
+        <p:spPr>
+          <a:xfrm>
+            <a:off x="6348046" y="2683347"/>
+            <a:ext cx="2126859" cy="0"/>
+          </a:xfrm>
+          <a:prstGeom prst="straightConnector1">
+            <a:avLst/>
+          </a:prstGeom>
+          <a:ln w="38100">
+            <a:solidFill>
+              <a:srgbClr val="FF0000"/>
+            </a:solidFill>
+            <a:headEnd type="arrow" w="med" len="med"/>
+            <a:tailEnd type="none" w="med" len="med"/>
+          </a:ln>
+        </p:spPr>
+        <p:style>
+          <a:lnRef idx="1">
+            <a:schemeClr val="accent2"/>
+          </a:lnRef>
+          <a:fillRef idx="0">
+            <a:schemeClr val="accent2"/>
+          </a:fillRef>
+          <a:effectRef idx="0">
+            <a:schemeClr val="accent2"/>
+          </a:effectRef>
+          <a:fontRef idx="minor">
+            <a:schemeClr val="tx1"/>
+          </a:fontRef>
+        </p:style>
+      </p:cxnSp>
+      <p:sp>
+        <p:nvSpPr>
+          <p:cNvPr id="24" name="CasellaDiTesto 23">
+            <a:extLst>
+              <a:ext uri="{FF2B5EF4-FFF2-40B4-BE49-F238E27FC236}">
+                <a16:creationId xmlns:a16="http://schemas.microsoft.com/office/drawing/2014/main" id="{925AEA73-D9CA-4DA8-A712-2CE54675D5FF}"/>
+              </a:ext>
+            </a:extLst>
+          </p:cNvPr>
+          <p:cNvSpPr txBox="1"/>
+          <p:nvPr/>
+        </p:nvSpPr>
+        <p:spPr>
+          <a:xfrm>
+            <a:off x="6708531" y="2057344"/>
+            <a:ext cx="1301261" cy="646331"/>
+          </a:xfrm>
+          <a:prstGeom prst="rect">
+            <a:avLst/>
+          </a:prstGeom>
+          <a:noFill/>
+        </p:spPr>
+        <p:txBody>
+          <a:bodyPr wrap="square" rtlCol="0">
+            <a:spAutoFit/>
+          </a:bodyPr>
+          <a:lstStyle/>
+          <a:p>
+            <a:r>
+              <a:rPr lang="it-IT" dirty="0"/>
+              <a:t>movement commands</a:t>
+            </a:r>
+          </a:p>
+        </p:txBody>
+      </p:sp>
+      <p:cxnSp>
+        <p:nvCxnSpPr>
+          <p:cNvPr id="25" name="Connettore 2 24">
+            <a:extLst>
+              <a:ext uri="{FF2B5EF4-FFF2-40B4-BE49-F238E27FC236}">
+                <a16:creationId xmlns:a16="http://schemas.microsoft.com/office/drawing/2014/main" id="{0AF20DE2-6DD8-4096-B53A-06465683324D}"/>
+              </a:ext>
+            </a:extLst>
+          </p:cNvPr>
+          <p:cNvCxnSpPr>
+            <a:cxnSpLocks/>
+          </p:cNvCxnSpPr>
+          <p:nvPr/>
+        </p:nvCxnSpPr>
+        <p:spPr>
+          <a:xfrm>
+            <a:off x="6348046" y="3767732"/>
+            <a:ext cx="2126859" cy="0"/>
+          </a:xfrm>
+          <a:prstGeom prst="straightConnector1">
+            <a:avLst/>
+          </a:prstGeom>
+          <a:ln w="38100">
+            <a:solidFill>
+              <a:srgbClr val="FF0000"/>
+            </a:solidFill>
+            <a:headEnd type="none" w="med" len="med"/>
+            <a:tailEnd type="triangle" w="med" len="med"/>
+          </a:ln>
+        </p:spPr>
+        <p:style>
+          <a:lnRef idx="1">
+            <a:schemeClr val="accent2"/>
+          </a:lnRef>
+          <a:fillRef idx="0">
+            <a:schemeClr val="accent2"/>
+          </a:fillRef>
+          <a:effectRef idx="0">
+            <a:schemeClr val="accent2"/>
+          </a:effectRef>
+          <a:fontRef idx="minor">
+            <a:schemeClr val="tx1"/>
+          </a:fontRef>
+        </p:style>
+      </p:cxnSp>
+      <p:sp>
+        <p:nvSpPr>
+          <p:cNvPr id="26" name="CasellaDiTesto 25">
+            <a:extLst>
+              <a:ext uri="{FF2B5EF4-FFF2-40B4-BE49-F238E27FC236}">
+                <a16:creationId xmlns:a16="http://schemas.microsoft.com/office/drawing/2014/main" id="{762A265D-E927-4548-A41E-D126DD3786F3}"/>
+              </a:ext>
+            </a:extLst>
+          </p:cNvPr>
+          <p:cNvSpPr txBox="1"/>
+          <p:nvPr/>
+        </p:nvSpPr>
+        <p:spPr>
+          <a:xfrm>
+            <a:off x="6760845" y="2711203"/>
+            <a:ext cx="1301261" cy="369332"/>
+          </a:xfrm>
+          <a:prstGeom prst="rect">
+            <a:avLst/>
+          </a:prstGeom>
+          <a:noFill/>
+        </p:spPr>
+        <p:txBody>
+          <a:bodyPr wrap="square" rtlCol="0">
+            <a:spAutoFit/>
+          </a:bodyPr>
+          <a:lstStyle/>
+          <a:p>
+            <a:r>
+              <a:rPr lang="it-IT" dirty="0"/>
+              <a:t>blink led</a:t>
+            </a:r>
+          </a:p>
+        </p:txBody>
+      </p:sp>
+      <p:sp>
+        <p:nvSpPr>
+          <p:cNvPr id="28" name="CasellaDiTesto 27">
+            <a:extLst>
+              <a:ext uri="{FF2B5EF4-FFF2-40B4-BE49-F238E27FC236}">
+                <a16:creationId xmlns:a16="http://schemas.microsoft.com/office/drawing/2014/main" id="{910A3736-8CB8-4F73-BD27-1A53734CABFE}"/>
+              </a:ext>
+            </a:extLst>
+          </p:cNvPr>
+          <p:cNvSpPr txBox="1"/>
+          <p:nvPr/>
+        </p:nvSpPr>
+        <p:spPr>
+          <a:xfrm>
+            <a:off x="6620020" y="3382831"/>
+            <a:ext cx="1389772" cy="369332"/>
+          </a:xfrm>
+          <a:prstGeom prst="rect">
+            <a:avLst/>
+          </a:prstGeom>
+          <a:noFill/>
+        </p:spPr>
+        <p:txBody>
+          <a:bodyPr wrap="square" rtlCol="0">
+            <a:spAutoFit/>
+          </a:bodyPr>
+          <a:lstStyle/>
+          <a:p>
+            <a:r>
+              <a:rPr lang="it-IT" dirty="0"/>
+              <a:t>temperature</a:t>
+            </a:r>
+          </a:p>
+        </p:txBody>
+      </p:sp>
+      <p:sp>
+        <p:nvSpPr>
+          <p:cNvPr id="29" name="CasellaDiTesto 28">
+            <a:extLst>
+              <a:ext uri="{FF2B5EF4-FFF2-40B4-BE49-F238E27FC236}">
+                <a16:creationId xmlns:a16="http://schemas.microsoft.com/office/drawing/2014/main" id="{67EF222F-D778-4568-B19C-5B0B94E3A858}"/>
+              </a:ext>
+            </a:extLst>
+          </p:cNvPr>
+          <p:cNvSpPr txBox="1"/>
+          <p:nvPr/>
+        </p:nvSpPr>
+        <p:spPr>
+          <a:xfrm>
+            <a:off x="6620020" y="3752163"/>
+            <a:ext cx="1389772" cy="369332"/>
+          </a:xfrm>
+          <a:prstGeom prst="rect">
+            <a:avLst/>
+          </a:prstGeom>
+          <a:noFill/>
+        </p:spPr>
+        <p:txBody>
+          <a:bodyPr wrap="square" rtlCol="0">
+            <a:spAutoFit/>
+          </a:bodyPr>
+          <a:lstStyle/>
+          <a:p>
+            <a:r>
+              <a:rPr lang="it-IT" dirty="0"/>
+              <a:t>front sonar</a:t>
+            </a:r>
+          </a:p>
+        </p:txBody>
+      </p:sp>
+      <p:sp>
+        <p:nvSpPr>
+          <p:cNvPr id="30" name="Ovale 29">
+            <a:extLst>
+              <a:ext uri="{FF2B5EF4-FFF2-40B4-BE49-F238E27FC236}">
+                <a16:creationId xmlns:a16="http://schemas.microsoft.com/office/drawing/2014/main" id="{51F42550-AE0C-4761-98C5-D59E2E384D88}"/>
+              </a:ext>
+            </a:extLst>
+          </p:cNvPr>
+          <p:cNvSpPr/>
+          <p:nvPr/>
+        </p:nvSpPr>
+        <p:spPr>
+          <a:xfrm>
+            <a:off x="802739" y="2308034"/>
+            <a:ext cx="1632726" cy="826476"/>
+          </a:xfrm>
+          <a:prstGeom prst="ellipse">
+            <a:avLst/>
+          </a:prstGeom>
+          <a:solidFill>
+            <a:srgbClr val="FFFF00"/>
+          </a:solidFill>
+          <a:ln w="38100">
+            <a:solidFill>
+              <a:srgbClr val="FFC000"/>
+            </a:solidFill>
+          </a:ln>
+        </p:spPr>
+        <p:style>
+          <a:lnRef idx="2">
+            <a:schemeClr val="accent1">
+              <a:shade val="50000"/>
+            </a:schemeClr>
+          </a:lnRef>
+          <a:fillRef idx="1">
+            <a:schemeClr val="accent1"/>
+          </a:fillRef>
+          <a:effectRef idx="0">
+            <a:schemeClr val="accent1"/>
+          </a:effectRef>
+          <a:fontRef idx="minor">
+            <a:schemeClr val="lt1"/>
+          </a:fontRef>
+        </p:style>
+        <p:txBody>
+          <a:bodyPr rtlCol="0" anchor="ctr"/>
+          <a:lstStyle/>
+          <a:p>
+            <a:pPr algn="ctr"/>
+            <a:r>
+              <a:rPr lang="it-IT" sz="2400" dirty="0">
+                <a:solidFill>
+                  <a:schemeClr val="tx2"/>
+                </a:solidFill>
+              </a:rPr>
+              <a:t>Sensors</a:t>
+            </a:r>
+            <a:endParaRPr lang="it-IT" dirty="0">
+              <a:solidFill>
+                <a:schemeClr val="tx2"/>
+              </a:solidFill>
+            </a:endParaRPr>
+          </a:p>
+        </p:txBody>
+      </p:sp>
+      <p:sp>
+        <p:nvSpPr>
+          <p:cNvPr id="32" name="Ovale 31">
+            <a:extLst>
+              <a:ext uri="{FF2B5EF4-FFF2-40B4-BE49-F238E27FC236}">
+                <a16:creationId xmlns:a16="http://schemas.microsoft.com/office/drawing/2014/main" id="{A7414880-17FA-43BC-BD28-CCDF2CC5E6C5}"/>
+              </a:ext>
+            </a:extLst>
+          </p:cNvPr>
+          <p:cNvSpPr/>
+          <p:nvPr/>
+        </p:nvSpPr>
+        <p:spPr>
+          <a:xfrm>
+            <a:off x="646382" y="3706011"/>
+            <a:ext cx="1945439" cy="826476"/>
+          </a:xfrm>
+          <a:prstGeom prst="ellipse">
+            <a:avLst/>
+          </a:prstGeom>
+          <a:solidFill>
+            <a:schemeClr val="accent6">
+              <a:lumMod val="60000"/>
+              <a:lumOff val="40000"/>
+            </a:schemeClr>
+          </a:solidFill>
+          <a:ln w="38100">
+            <a:solidFill>
+              <a:schemeClr val="accent6"/>
+            </a:solidFill>
+          </a:ln>
+        </p:spPr>
+        <p:style>
+          <a:lnRef idx="2">
+            <a:schemeClr val="accent1">
+              <a:shade val="50000"/>
+            </a:schemeClr>
+          </a:lnRef>
+          <a:fillRef idx="1">
+            <a:schemeClr val="accent1"/>
+          </a:fillRef>
+          <a:effectRef idx="0">
+            <a:schemeClr val="accent1"/>
+          </a:effectRef>
+          <a:fontRef idx="minor">
+            <a:schemeClr val="lt1"/>
+          </a:fontRef>
+        </p:style>
+        <p:txBody>
+          <a:bodyPr rtlCol="0" anchor="ctr"/>
+          <a:lstStyle/>
+          <a:p>
+            <a:pPr algn="ctr"/>
+            <a:r>
+              <a:rPr lang="it-IT" sz="2400" dirty="0">
+                <a:solidFill>
+                  <a:schemeClr val="tx2"/>
+                </a:solidFill>
+              </a:rPr>
+              <a:t>Actuators</a:t>
+            </a:r>
+            <a:endParaRPr lang="it-IT" dirty="0">
+              <a:solidFill>
+                <a:schemeClr val="tx2"/>
+              </a:solidFill>
+            </a:endParaRPr>
+          </a:p>
+        </p:txBody>
+      </p:sp>
+      <p:sp>
+        <p:nvSpPr>
+          <p:cNvPr id="33" name="Freccia a destra 32">
+            <a:extLst>
+              <a:ext uri="{FF2B5EF4-FFF2-40B4-BE49-F238E27FC236}">
+                <a16:creationId xmlns:a16="http://schemas.microsoft.com/office/drawing/2014/main" id="{95EED6ED-87B7-4EFB-94C4-1B87D23E68AC}"/>
+              </a:ext>
+            </a:extLst>
+          </p:cNvPr>
+          <p:cNvSpPr/>
+          <p:nvPr/>
+        </p:nvSpPr>
+        <p:spPr>
+          <a:xfrm rot="1604241">
+            <a:off x="2442796" y="2567477"/>
+            <a:ext cx="747352" cy="826476"/>
+          </a:xfrm>
+          <a:prstGeom prst="rightArrow">
+            <a:avLst/>
+          </a:prstGeom>
+          <a:solidFill>
+            <a:srgbClr val="FF0000"/>
+          </a:solidFill>
+          <a:ln>
+            <a:solidFill>
+              <a:srgbClr val="FF0000"/>
+            </a:solidFill>
+          </a:ln>
+        </p:spPr>
+        <p:style>
+          <a:lnRef idx="2">
+            <a:schemeClr val="accent1">
+              <a:shade val="50000"/>
+            </a:schemeClr>
+          </a:lnRef>
+          <a:fillRef idx="1">
+            <a:schemeClr val="accent1"/>
+          </a:fillRef>
+          <a:effectRef idx="0">
+            <a:schemeClr val="accent1"/>
+          </a:effectRef>
+          <a:fontRef idx="minor">
+            <a:schemeClr val="lt1"/>
+          </a:fontRef>
+        </p:style>
+        <p:txBody>
+          <a:bodyPr rtlCol="0" anchor="ctr"/>
+          <a:lstStyle/>
+          <a:p>
+            <a:pPr algn="ctr"/>
+            <a:endParaRPr lang="it-IT"/>
+          </a:p>
+        </p:txBody>
+      </p:sp>
+      <p:sp>
+        <p:nvSpPr>
+          <p:cNvPr id="34" name="Freccia a destra 33">
+            <a:extLst>
+              <a:ext uri="{FF2B5EF4-FFF2-40B4-BE49-F238E27FC236}">
+                <a16:creationId xmlns:a16="http://schemas.microsoft.com/office/drawing/2014/main" id="{5A0D3553-7659-4B17-A737-6DCE4AE9ED98}"/>
+              </a:ext>
+            </a:extLst>
+          </p:cNvPr>
+          <p:cNvSpPr/>
+          <p:nvPr/>
+        </p:nvSpPr>
+        <p:spPr>
+          <a:xfrm rot="8706235">
+            <a:off x="2559115" y="3415371"/>
+            <a:ext cx="747352" cy="826476"/>
+          </a:xfrm>
+          <a:prstGeom prst="rightArrow">
+            <a:avLst/>
+          </a:prstGeom>
+          <a:solidFill>
+            <a:srgbClr val="FF0000"/>
+          </a:solidFill>
+          <a:ln>
+            <a:solidFill>
+              <a:srgbClr val="FF0000"/>
+            </a:solidFill>
+          </a:ln>
+        </p:spPr>
+        <p:style>
+          <a:lnRef idx="2">
+            <a:schemeClr val="accent1">
+              <a:shade val="50000"/>
+            </a:schemeClr>
+          </a:lnRef>
+          <a:fillRef idx="1">
+            <a:schemeClr val="accent1"/>
+          </a:fillRef>
+          <a:effectRef idx="0">
+            <a:schemeClr val="accent1"/>
+          </a:effectRef>
+          <a:fontRef idx="minor">
+            <a:schemeClr val="lt1"/>
+          </a:fontRef>
+        </p:style>
+        <p:txBody>
+          <a:bodyPr rtlCol="0" anchor="ctr"/>
+          <a:lstStyle/>
+          <a:p>
+            <a:pPr algn="ctr"/>
+            <a:endParaRPr lang="it-IT"/>
+          </a:p>
+        </p:txBody>
+      </p:sp>
+      <p:sp>
+        <p:nvSpPr>
+          <p:cNvPr id="35" name="CasellaDiTesto 34">
+            <a:extLst>
+              <a:ext uri="{FF2B5EF4-FFF2-40B4-BE49-F238E27FC236}">
+                <a16:creationId xmlns:a16="http://schemas.microsoft.com/office/drawing/2014/main" id="{E5E520B9-81FC-4F1D-A97F-6A939C9C5C44}"/>
+              </a:ext>
+            </a:extLst>
+          </p:cNvPr>
+          <p:cNvSpPr txBox="1"/>
+          <p:nvPr/>
+        </p:nvSpPr>
+        <p:spPr>
+          <a:xfrm>
+            <a:off x="752284" y="1646774"/>
+            <a:ext cx="1860051" cy="646331"/>
+          </a:xfrm>
+          <a:prstGeom prst="rect">
+            <a:avLst/>
+          </a:prstGeom>
+          <a:noFill/>
+        </p:spPr>
+        <p:txBody>
+          <a:bodyPr wrap="square" rtlCol="0">
+            <a:spAutoFit/>
+          </a:bodyPr>
+          <a:lstStyle/>
+          <a:p>
+            <a:pPr marL="285750" indent="-285750">
+              <a:buFont typeface="Arial" panose="020B0604020202020204" pitchFamily="34" charset="0"/>
+              <a:buChar char="•"/>
+            </a:pPr>
+            <a:r>
+              <a:rPr lang="it-IT" dirty="0"/>
+              <a:t>temperature</a:t>
+            </a:r>
+          </a:p>
+          <a:p>
+            <a:pPr marL="285750" indent="-285750">
+              <a:buFont typeface="Arial" panose="020B0604020202020204" pitchFamily="34" charset="0"/>
+              <a:buChar char="•"/>
+            </a:pPr>
+            <a:r>
+              <a:rPr lang="it-IT" dirty="0"/>
+              <a:t>sonar</a:t>
+            </a:r>
+          </a:p>
+        </p:txBody>
+      </p:sp>
+      <p:sp>
+        <p:nvSpPr>
+          <p:cNvPr id="36" name="CasellaDiTesto 35">
+            <a:extLst>
+              <a:ext uri="{FF2B5EF4-FFF2-40B4-BE49-F238E27FC236}">
+                <a16:creationId xmlns:a16="http://schemas.microsoft.com/office/drawing/2014/main" id="{98EBE1F3-D5AB-43B8-A341-8FBBA951A985}"/>
+              </a:ext>
+            </a:extLst>
+          </p:cNvPr>
+          <p:cNvSpPr txBox="1"/>
+          <p:nvPr/>
+        </p:nvSpPr>
+        <p:spPr>
+          <a:xfrm>
+            <a:off x="707302" y="4522708"/>
+            <a:ext cx="1860051" cy="646331"/>
+          </a:xfrm>
+          <a:prstGeom prst="rect">
+            <a:avLst/>
+          </a:prstGeom>
+          <a:noFill/>
+        </p:spPr>
+        <p:txBody>
+          <a:bodyPr wrap="square" rtlCol="0">
+            <a:spAutoFit/>
+          </a:bodyPr>
+          <a:lstStyle/>
+          <a:p>
+            <a:pPr marL="285750" indent="-285750">
+              <a:buFont typeface="Arial" panose="020B0604020202020204" pitchFamily="34" charset="0"/>
+              <a:buChar char="•"/>
+            </a:pPr>
+            <a:r>
+              <a:rPr lang="it-IT" dirty="0"/>
+              <a:t>led</a:t>
+            </a:r>
+          </a:p>
+          <a:p>
+            <a:pPr marL="285750" indent="-285750">
+              <a:buFont typeface="Arial" panose="020B0604020202020204" pitchFamily="34" charset="0"/>
+              <a:buChar char="•"/>
+            </a:pPr>
+            <a:r>
+              <a:rPr lang="it-IT" dirty="0"/>
+              <a:t>motors</a:t>
+            </a:r>
+          </a:p>
+        </p:txBody>
+      </p:sp>
+      <p:pic>
+        <p:nvPicPr>
+          <p:cNvPr id="38" name="Picture 4" descr="Risultati immagini per termometro">
+            <a:extLst>
+              <a:ext uri="{FF2B5EF4-FFF2-40B4-BE49-F238E27FC236}">
+                <a16:creationId xmlns:a16="http://schemas.microsoft.com/office/drawing/2014/main" id="{6C6947BC-0CAC-4DD0-97D1-E6E6721348A7}"/>
+              </a:ext>
+            </a:extLst>
+          </p:cNvPr>
+          <p:cNvPicPr>
+            <a:picLocks noChangeAspect="1" noChangeArrowheads="1"/>
+          </p:cNvPicPr>
+          <p:nvPr/>
+        </p:nvPicPr>
+        <p:blipFill>
+          <a:blip r:embed="rId5">
+            <a:extLst>
+              <a:ext uri="{28A0092B-C50C-407E-A947-70E740481C1C}">
+                <a14:useLocalDpi xmlns:a14="http://schemas.microsoft.com/office/drawing/2010/main" val="0"/>
+              </a:ext>
+            </a:extLst>
+          </a:blip>
+          <a:srcRect/>
+          <a:stretch>
+            <a:fillRect/>
+          </a:stretch>
+        </p:blipFill>
+        <p:spPr bwMode="auto">
+          <a:xfrm>
+            <a:off x="1976149" y="2130118"/>
+            <a:ext cx="617068" cy="617068"/>
+          </a:xfrm>
+          <a:prstGeom prst="rect">
+            <a:avLst/>
+          </a:prstGeom>
+          <a:noFill/>
+          <a:extLst>
+            <a:ext uri="{909E8E84-426E-40DD-AFC4-6F175D3DCCD1}">
+              <a14:hiddenFill xmlns:a14="http://schemas.microsoft.com/office/drawing/2010/main">
+                <a:solidFill>
+                  <a:srgbClr val="FFFFFF"/>
+                </a:solidFill>
+              </a14:hiddenFill>
+            </a:ext>
+          </a:extLst>
+        </p:spPr>
+      </p:pic>
+      <p:pic>
+        <p:nvPicPr>
+          <p:cNvPr id="39" name="Picture 6" descr="Verde, Ha Portato, Lampade A Led, Luce">
+            <a:extLst>
+              <a:ext uri="{FF2B5EF4-FFF2-40B4-BE49-F238E27FC236}">
+                <a16:creationId xmlns:a16="http://schemas.microsoft.com/office/drawing/2014/main" id="{6CAE9A5C-B8BF-43B8-9DD3-D3AE414A6D34}"/>
+              </a:ext>
+            </a:extLst>
+          </p:cNvPr>
+          <p:cNvPicPr>
+            <a:picLocks noChangeAspect="1" noChangeArrowheads="1"/>
+          </p:cNvPicPr>
+          <p:nvPr/>
+        </p:nvPicPr>
+        <p:blipFill>
+          <a:blip r:embed="rId6">
+            <a:extLst>
+              <a:ext uri="{28A0092B-C50C-407E-A947-70E740481C1C}">
+                <a14:useLocalDpi xmlns:a14="http://schemas.microsoft.com/office/drawing/2010/main" val="0"/>
+              </a:ext>
+            </a:extLst>
+          </a:blip>
+          <a:srcRect/>
+          <a:stretch>
+            <a:fillRect/>
+          </a:stretch>
+        </p:blipFill>
+        <p:spPr bwMode="auto">
+          <a:xfrm>
+            <a:off x="1999036" y="3438485"/>
+            <a:ext cx="367640" cy="478812"/>
+          </a:xfrm>
+          <a:prstGeom prst="rect">
+            <a:avLst/>
+          </a:prstGeom>
+          <a:noFill/>
+          <a:extLst>
+            <a:ext uri="{909E8E84-426E-40DD-AFC4-6F175D3DCCD1}">
+              <a14:hiddenFill xmlns:a14="http://schemas.microsoft.com/office/drawing/2010/main">
+                <a:solidFill>
+                  <a:srgbClr val="FFFFFF"/>
+                </a:solidFill>
+              </a14:hiddenFill>
+            </a:ext>
+          </a:extLst>
+        </p:spPr>
+      </p:pic>
+      <p:pic>
+        <p:nvPicPr>
+          <p:cNvPr id="41" name="Picture 6" descr="Risultati immagini per raspberry logo png">
+            <a:extLst>
+              <a:ext uri="{FF2B5EF4-FFF2-40B4-BE49-F238E27FC236}">
+                <a16:creationId xmlns:a16="http://schemas.microsoft.com/office/drawing/2014/main" id="{0FD90BA0-8B61-4696-A7FE-2FBF45AF55F1}"/>
+              </a:ext>
+            </a:extLst>
+          </p:cNvPr>
+          <p:cNvPicPr>
+            <a:picLocks noChangeAspect="1" noChangeArrowheads="1"/>
+          </p:cNvPicPr>
+          <p:nvPr/>
+        </p:nvPicPr>
+        <p:blipFill>
+          <a:blip r:embed="rId7">
+            <a:extLst>
+              <a:ext uri="{28A0092B-C50C-407E-A947-70E740481C1C}">
+                <a14:useLocalDpi xmlns:a14="http://schemas.microsoft.com/office/drawing/2010/main" val="0"/>
+              </a:ext>
+            </a:extLst>
+          </a:blip>
+          <a:srcRect/>
+          <a:stretch>
+            <a:fillRect/>
+          </a:stretch>
+        </p:blipFill>
+        <p:spPr bwMode="auto">
+          <a:xfrm>
+            <a:off x="5124036" y="1969939"/>
+            <a:ext cx="562071" cy="717656"/>
+          </a:xfrm>
+          <a:prstGeom prst="rect">
+            <a:avLst/>
+          </a:prstGeom>
+          <a:noFill/>
+          <a:extLst>
+            <a:ext uri="{909E8E84-426E-40DD-AFC4-6F175D3DCCD1}">
+              <a14:hiddenFill xmlns:a14="http://schemas.microsoft.com/office/drawing/2010/main">
+                <a:solidFill>
+                  <a:srgbClr val="FFFFFF"/>
+                </a:solidFill>
+              </a14:hiddenFill>
+            </a:ext>
+          </a:extLst>
+        </p:spPr>
+      </p:pic>
+      <p:pic>
+        <p:nvPicPr>
+          <p:cNvPr id="42" name="Picture 2" descr="Risultati immagini per arduino logo png">
+            <a:extLst>
+              <a:ext uri="{FF2B5EF4-FFF2-40B4-BE49-F238E27FC236}">
+                <a16:creationId xmlns:a16="http://schemas.microsoft.com/office/drawing/2014/main" id="{939499DE-B5D3-4F9F-BF96-12A4F73F4C9F}"/>
+              </a:ext>
+            </a:extLst>
+          </p:cNvPr>
+          <p:cNvPicPr>
+            <a:picLocks noChangeAspect="1" noChangeArrowheads="1"/>
+          </p:cNvPicPr>
+          <p:nvPr/>
+        </p:nvPicPr>
+        <p:blipFill>
+          <a:blip r:embed="rId8">
+            <a:extLst>
+              <a:ext uri="{28A0092B-C50C-407E-A947-70E740481C1C}">
+                <a14:useLocalDpi xmlns:a14="http://schemas.microsoft.com/office/drawing/2010/main" val="0"/>
+              </a:ext>
+            </a:extLst>
+          </a:blip>
+          <a:srcRect/>
+          <a:stretch>
+            <a:fillRect/>
+          </a:stretch>
+        </p:blipFill>
+        <p:spPr bwMode="auto">
+          <a:xfrm>
+            <a:off x="3307291" y="1989768"/>
+            <a:ext cx="904305" cy="690334"/>
+          </a:xfrm>
+          <a:prstGeom prst="rect">
+            <a:avLst/>
+          </a:prstGeom>
+          <a:noFill/>
+          <a:extLst>
+            <a:ext uri="{909E8E84-426E-40DD-AFC4-6F175D3DCCD1}">
+              <a14:hiddenFill xmlns:a14="http://schemas.microsoft.com/office/drawing/2010/main">
+                <a:solidFill>
+                  <a:srgbClr val="FFFFFF"/>
+                </a:solidFill>
+              </a14:hiddenFill>
+            </a:ext>
+          </a:extLst>
+        </p:spPr>
+      </p:pic>
+    </p:spTree>
+    <p:extLst>
+      <p:ext uri="{BB962C8B-B14F-4D97-AF65-F5344CB8AC3E}">
+        <p14:creationId xmlns:p14="http://schemas.microsoft.com/office/powerpoint/2010/main" val="2836005151"/>
+      </p:ext>
+    </p:extLst>
+  </p:cSld>
+  <p:clrMapOvr>
+    <a:masterClrMapping/>
+  </p:clrMapOvr>
+</p:sld>
+</file>
+
+<file path=ppt/slides/slide13.xml><?xml version="1.0" encoding="utf-8"?>
+<p:sld xmlns:a="http://schemas.openxmlformats.org/drawingml/2006/main" xmlns:r="http://schemas.openxmlformats.org/officeDocument/2006/relationships" xmlns:p="http://schemas.openxmlformats.org/presentationml/2006/main">
+  <p:cSld>
+    <p:spTree>
+      <p:nvGrpSpPr>
+        <p:cNvPr id="1" name=""/>
+        <p:cNvGrpSpPr/>
+        <p:nvPr/>
+      </p:nvGrpSpPr>
+      <p:grpSpPr>
+        <a:xfrm>
+          <a:off x="0" y="0"/>
+          <a:ext cx="0" cy="0"/>
+          <a:chOff x="0" y="0"/>
+          <a:chExt cx="0" cy="0"/>
+        </a:xfrm>
+      </p:grpSpPr>
+      <p:sp>
+        <p:nvSpPr>
+          <p:cNvPr id="2" name="Rettangolo con angoli arrotondati 1">
+            <a:extLst>
+              <a:ext uri="{FF2B5EF4-FFF2-40B4-BE49-F238E27FC236}">
+                <a16:creationId xmlns:a16="http://schemas.microsoft.com/office/drawing/2014/main" id="{4CA35170-E1F1-43D1-B661-3E9255B7B3EF}"/>
+              </a:ext>
+            </a:extLst>
+          </p:cNvPr>
+          <p:cNvSpPr/>
+          <p:nvPr/>
+        </p:nvSpPr>
+        <p:spPr>
+          <a:xfrm>
+            <a:off x="3522417" y="1042621"/>
+            <a:ext cx="2573583" cy="2386379"/>
+          </a:xfrm>
+          <a:prstGeom prst="roundRect">
+            <a:avLst/>
+          </a:prstGeom>
+          <a:solidFill>
+            <a:schemeClr val="accent5">
+              <a:lumMod val="60000"/>
+              <a:lumOff val="40000"/>
+            </a:schemeClr>
+          </a:solidFill>
+          <a:ln w="38100">
+            <a:solidFill>
+              <a:schemeClr val="accent5">
+                <a:lumMod val="75000"/>
+              </a:schemeClr>
+            </a:solidFill>
+          </a:ln>
+        </p:spPr>
+        <p:style>
+          <a:lnRef idx="2">
+            <a:schemeClr val="accent1">
+              <a:shade val="50000"/>
+            </a:schemeClr>
+          </a:lnRef>
+          <a:fillRef idx="1">
+            <a:schemeClr val="accent1"/>
+          </a:fillRef>
+          <a:effectRef idx="0">
+            <a:schemeClr val="accent1"/>
+          </a:effectRef>
+          <a:fontRef idx="minor">
+            <a:schemeClr val="lt1"/>
+          </a:fontRef>
+        </p:style>
+        <p:txBody>
+          <a:bodyPr rtlCol="0" anchor="ctr"/>
+          <a:lstStyle/>
+          <a:p>
+            <a:pPr algn="ctr"/>
+            <a:r>
+              <a:rPr lang="it-IT" sz="3600" dirty="0">
+                <a:solidFill>
+                  <a:schemeClr val="tx2"/>
+                </a:solidFill>
+              </a:rPr>
+              <a:t>Frontend Server</a:t>
+            </a:r>
+          </a:p>
+        </p:txBody>
+      </p:sp>
+      <p:grpSp>
+        <p:nvGrpSpPr>
+          <p:cNvPr id="12" name="Gruppo 11">
+            <a:extLst>
+              <a:ext uri="{FF2B5EF4-FFF2-40B4-BE49-F238E27FC236}">
+                <a16:creationId xmlns:a16="http://schemas.microsoft.com/office/drawing/2014/main" id="{43521005-01A3-4664-A9BB-7A58190AEE8E}"/>
+              </a:ext>
+            </a:extLst>
+          </p:cNvPr>
+          <p:cNvGrpSpPr/>
+          <p:nvPr/>
+        </p:nvGrpSpPr>
+        <p:grpSpPr>
+          <a:xfrm>
+            <a:off x="585234" y="776470"/>
+            <a:ext cx="1777147" cy="2360185"/>
+            <a:chOff x="585234" y="925939"/>
+            <a:chExt cx="1777147" cy="2360185"/>
+          </a:xfrm>
+        </p:grpSpPr>
+        <p:sp>
+          <p:nvSpPr>
+            <p:cNvPr id="4" name="Rettangolo con angoli arrotondati 3">
+              <a:extLst>
+                <a:ext uri="{FF2B5EF4-FFF2-40B4-BE49-F238E27FC236}">
+                  <a16:creationId xmlns:a16="http://schemas.microsoft.com/office/drawing/2014/main" id="{0CF4BB3B-F5A1-4E52-972B-75F5F6A2A65E}"/>
+                </a:ext>
+              </a:extLst>
+            </p:cNvPr>
+            <p:cNvSpPr/>
+            <p:nvPr/>
+          </p:nvSpPr>
+          <p:spPr>
+            <a:xfrm>
+              <a:off x="585234" y="1485899"/>
+              <a:ext cx="1777147" cy="1800225"/>
+            </a:xfrm>
+            <a:prstGeom prst="roundRect">
+              <a:avLst/>
+            </a:prstGeom>
+            <a:solidFill>
+              <a:schemeClr val="accent2">
+                <a:lumMod val="60000"/>
+                <a:lumOff val="40000"/>
+              </a:schemeClr>
+            </a:solidFill>
+            <a:ln w="38100">
+              <a:solidFill>
+                <a:schemeClr val="accent2">
+                  <a:lumMod val="75000"/>
+                </a:schemeClr>
+              </a:solidFill>
+            </a:ln>
+          </p:spPr>
+          <p:style>
+            <a:lnRef idx="2">
+              <a:schemeClr val="accent1">
+                <a:shade val="50000"/>
+              </a:schemeClr>
+            </a:lnRef>
+            <a:fillRef idx="1">
+              <a:schemeClr val="accent1"/>
+            </a:fillRef>
+            <a:effectRef idx="0">
+              <a:schemeClr val="accent1"/>
+            </a:effectRef>
+            <a:fontRef idx="minor">
+              <a:schemeClr val="lt1"/>
+            </a:fontRef>
+          </p:style>
+          <p:txBody>
+            <a:bodyPr rtlCol="0" anchor="ctr"/>
+            <a:lstStyle/>
+            <a:p>
+              <a:pPr algn="ctr"/>
+              <a:r>
+                <a:rPr lang="it-IT" sz="2800" dirty="0">
+                  <a:solidFill>
+                    <a:schemeClr val="tx2"/>
+                  </a:solidFill>
+                </a:rPr>
+                <a:t>Robot model</a:t>
+              </a:r>
+            </a:p>
+          </p:txBody>
+        </p:sp>
+        <p:pic>
+          <p:nvPicPr>
+            <p:cNvPr id="2052" name="Picture 4" descr="Risultati immagini per json logo">
+              <a:extLst>
+                <a:ext uri="{FF2B5EF4-FFF2-40B4-BE49-F238E27FC236}">
+                  <a16:creationId xmlns:a16="http://schemas.microsoft.com/office/drawing/2014/main" id="{9687118F-5E0B-4955-8C0E-6520E97B2362}"/>
+                </a:ext>
+              </a:extLst>
+            </p:cNvPr>
+            <p:cNvPicPr>
+              <a:picLocks noChangeAspect="1" noChangeArrowheads="1"/>
+            </p:cNvPicPr>
+            <p:nvPr/>
+          </p:nvPicPr>
+          <p:blipFill>
+            <a:blip r:embed="rId2">
+              <a:extLst>
+                <a:ext uri="{28A0092B-C50C-407E-A947-70E740481C1C}">
+                  <a14:useLocalDpi xmlns:a14="http://schemas.microsoft.com/office/drawing/2010/main" val="0"/>
+                </a:ext>
+              </a:extLst>
+            </a:blip>
+            <a:srcRect/>
+            <a:stretch>
+              <a:fillRect/>
+            </a:stretch>
+          </p:blipFill>
+          <p:spPr bwMode="auto">
+            <a:xfrm>
+              <a:off x="687994" y="925939"/>
+              <a:ext cx="1571625" cy="785813"/>
+            </a:xfrm>
+            <a:prstGeom prst="rect">
+              <a:avLst/>
+            </a:prstGeom>
+            <a:noFill/>
+            <a:extLst>
+              <a:ext uri="{909E8E84-426E-40DD-AFC4-6F175D3DCCD1}">
+                <a14:hiddenFill xmlns:a14="http://schemas.microsoft.com/office/drawing/2010/main">
+                  <a:solidFill>
+                    <a:srgbClr val="FFFFFF"/>
+                  </a:solidFill>
+                </a14:hiddenFill>
+              </a:ext>
+            </a:extLst>
+          </p:spPr>
+        </p:pic>
+      </p:grpSp>
+      <p:grpSp>
+        <p:nvGrpSpPr>
+          <p:cNvPr id="5" name="Gruppo 4">
+            <a:extLst>
+              <a:ext uri="{FF2B5EF4-FFF2-40B4-BE49-F238E27FC236}">
+                <a16:creationId xmlns:a16="http://schemas.microsoft.com/office/drawing/2014/main" id="{3FF0CE6F-1AB4-4E9C-8865-D3940AE9E079}"/>
+              </a:ext>
+            </a:extLst>
+          </p:cNvPr>
+          <p:cNvGrpSpPr/>
+          <p:nvPr/>
+        </p:nvGrpSpPr>
+        <p:grpSpPr>
+          <a:xfrm>
+            <a:off x="3844253" y="4124798"/>
+            <a:ext cx="2257244" cy="2319427"/>
+            <a:chOff x="3888213" y="4186342"/>
+            <a:chExt cx="2257244" cy="2319427"/>
+          </a:xfrm>
+        </p:grpSpPr>
+        <p:pic>
+          <p:nvPicPr>
+            <p:cNvPr id="2050" name="Picture 2" descr="Risultati immagini per database">
+              <a:extLst>
+                <a:ext uri="{FF2B5EF4-FFF2-40B4-BE49-F238E27FC236}">
+                  <a16:creationId xmlns:a16="http://schemas.microsoft.com/office/drawing/2014/main" id="{767A0126-2ED3-43ED-A0CA-56F90166EC6A}"/>
+                </a:ext>
+              </a:extLst>
+            </p:cNvPr>
+            <p:cNvPicPr>
+              <a:picLocks noChangeAspect="1" noChangeArrowheads="1"/>
+            </p:cNvPicPr>
+            <p:nvPr/>
+          </p:nvPicPr>
+          <p:blipFill>
+            <a:blip r:embed="rId3">
+              <a:extLst>
+                <a:ext uri="{28A0092B-C50C-407E-A947-70E740481C1C}">
+                  <a14:useLocalDpi xmlns:a14="http://schemas.microsoft.com/office/drawing/2010/main" val="0"/>
+                </a:ext>
+              </a:extLst>
+            </a:blip>
+            <a:srcRect/>
+            <a:stretch>
+              <a:fillRect/>
+            </a:stretch>
+          </p:blipFill>
+          <p:spPr bwMode="auto">
+            <a:xfrm>
+              <a:off x="3888213" y="4362988"/>
+              <a:ext cx="1940903" cy="2142781"/>
+            </a:xfrm>
+            <a:prstGeom prst="rect">
+              <a:avLst/>
+            </a:prstGeom>
+            <a:noFill/>
+            <a:extLst>
+              <a:ext uri="{909E8E84-426E-40DD-AFC4-6F175D3DCCD1}">
+                <a14:hiddenFill xmlns:a14="http://schemas.microsoft.com/office/drawing/2010/main">
+                  <a:solidFill>
+                    <a:srgbClr val="FFFFFF"/>
+                  </a:solidFill>
+                </a14:hiddenFill>
+              </a:ext>
+            </a:extLst>
+          </p:spPr>
+        </p:pic>
+        <p:pic>
+          <p:nvPicPr>
+            <p:cNvPr id="2056" name="Picture 8" descr="Risultati immagini per mongodb png">
+              <a:extLst>
+                <a:ext uri="{FF2B5EF4-FFF2-40B4-BE49-F238E27FC236}">
+                  <a16:creationId xmlns:a16="http://schemas.microsoft.com/office/drawing/2014/main" id="{1586B79B-AEA8-41CC-B99E-E1891BA864D7}"/>
+                </a:ext>
+              </a:extLst>
+            </p:cNvPr>
+            <p:cNvPicPr>
+              <a:picLocks noChangeAspect="1" noChangeArrowheads="1"/>
+            </p:cNvPicPr>
+            <p:nvPr/>
+          </p:nvPicPr>
+          <p:blipFill>
+            <a:blip r:embed="rId4">
+              <a:extLst>
+                <a:ext uri="{28A0092B-C50C-407E-A947-70E740481C1C}">
+                  <a14:useLocalDpi xmlns:a14="http://schemas.microsoft.com/office/drawing/2010/main" val="0"/>
+                </a:ext>
+              </a:extLst>
+            </a:blip>
+            <a:srcRect/>
+            <a:stretch>
+              <a:fillRect/>
+            </a:stretch>
+          </p:blipFill>
+          <p:spPr bwMode="auto">
+            <a:xfrm>
+              <a:off x="5316782" y="4186342"/>
+              <a:ext cx="828675" cy="885721"/>
+            </a:xfrm>
+            <a:prstGeom prst="rect">
+              <a:avLst/>
+            </a:prstGeom>
+            <a:noFill/>
+            <a:extLst>
+              <a:ext uri="{909E8E84-426E-40DD-AFC4-6F175D3DCCD1}">
+                <a14:hiddenFill xmlns:a14="http://schemas.microsoft.com/office/drawing/2010/main">
+                  <a:solidFill>
+                    <a:srgbClr val="FFFFFF"/>
+                  </a:solidFill>
+                </a14:hiddenFill>
+              </a:ext>
+            </a:extLst>
+          </p:spPr>
+        </p:pic>
+      </p:grpSp>
+      <p:sp>
+        <p:nvSpPr>
+          <p:cNvPr id="3" name="CasellaDiTesto 2">
+            <a:extLst>
+              <a:ext uri="{FF2B5EF4-FFF2-40B4-BE49-F238E27FC236}">
+                <a16:creationId xmlns:a16="http://schemas.microsoft.com/office/drawing/2014/main" id="{6ED1BD23-9C07-4A47-A0DD-7FDDC00D41AB}"/>
+              </a:ext>
+            </a:extLst>
+          </p:cNvPr>
+          <p:cNvSpPr txBox="1"/>
+          <p:nvPr/>
+        </p:nvSpPr>
+        <p:spPr>
+          <a:xfrm>
+            <a:off x="4369044" y="6303757"/>
+            <a:ext cx="1211507" cy="369332"/>
+          </a:xfrm>
+          <a:prstGeom prst="rect">
+            <a:avLst/>
+          </a:prstGeom>
+          <a:noFill/>
+        </p:spPr>
+        <p:txBody>
+          <a:bodyPr wrap="square" rtlCol="0">
+            <a:spAutoFit/>
+          </a:bodyPr>
+          <a:lstStyle/>
+          <a:p>
+            <a:r>
+              <a:rPr lang="it-IT" dirty="0"/>
+              <a:t>MongoDB </a:t>
+            </a:r>
+          </a:p>
+        </p:txBody>
+      </p:sp>
+      <p:sp>
+        <p:nvSpPr>
+          <p:cNvPr id="11" name="Rettangolo con angoli arrotondati 10">
+            <a:extLst>
+              <a:ext uri="{FF2B5EF4-FFF2-40B4-BE49-F238E27FC236}">
+                <a16:creationId xmlns:a16="http://schemas.microsoft.com/office/drawing/2014/main" id="{E949EEA1-FC18-48E5-8807-5482CCBE6121}"/>
+              </a:ext>
+            </a:extLst>
+          </p:cNvPr>
+          <p:cNvSpPr/>
+          <p:nvPr/>
+        </p:nvSpPr>
+        <p:spPr>
+          <a:xfrm>
+            <a:off x="8607303" y="1042621"/>
+            <a:ext cx="2573583" cy="2386379"/>
+          </a:xfrm>
+          <a:prstGeom prst="roundRect">
+            <a:avLst/>
+          </a:prstGeom>
+          <a:solidFill>
+            <a:schemeClr val="accent6">
+              <a:lumMod val="40000"/>
+              <a:lumOff val="60000"/>
+            </a:schemeClr>
+          </a:solidFill>
+          <a:ln w="38100">
+            <a:solidFill>
+              <a:schemeClr val="accent6"/>
+            </a:solidFill>
+          </a:ln>
+        </p:spPr>
+        <p:style>
+          <a:lnRef idx="2">
+            <a:schemeClr val="accent1">
+              <a:shade val="50000"/>
+            </a:schemeClr>
+          </a:lnRef>
+          <a:fillRef idx="1">
+            <a:schemeClr val="accent1"/>
+          </a:fillRef>
+          <a:effectRef idx="0">
+            <a:schemeClr val="accent1"/>
+          </a:effectRef>
+          <a:fontRef idx="minor">
+            <a:schemeClr val="lt1"/>
+          </a:fontRef>
+        </p:style>
+        <p:txBody>
+          <a:bodyPr rtlCol="0" anchor="ctr"/>
+          <a:lstStyle/>
+          <a:p>
+            <a:pPr algn="ctr"/>
+            <a:r>
+              <a:rPr lang="it-IT" sz="3600" dirty="0">
+                <a:solidFill>
+                  <a:schemeClr val="tx2"/>
+                </a:solidFill>
+              </a:rPr>
+              <a:t>System</a:t>
+            </a:r>
+          </a:p>
+        </p:txBody>
+      </p:sp>
+      <p:cxnSp>
+        <p:nvCxnSpPr>
+          <p:cNvPr id="10" name="Connettore 2 9">
+            <a:extLst>
+              <a:ext uri="{FF2B5EF4-FFF2-40B4-BE49-F238E27FC236}">
+                <a16:creationId xmlns:a16="http://schemas.microsoft.com/office/drawing/2014/main" id="{897E7060-8D14-4361-A310-6A2E40867CEA}"/>
+              </a:ext>
+            </a:extLst>
+          </p:cNvPr>
+          <p:cNvCxnSpPr>
+            <a:stCxn id="4" idx="3"/>
+            <a:endCxn id="2" idx="1"/>
+          </p:cNvCxnSpPr>
+          <p:nvPr/>
+        </p:nvCxnSpPr>
+        <p:spPr>
+          <a:xfrm flipV="1">
+            <a:off x="2362381" y="2235811"/>
+            <a:ext cx="1160036" cy="732"/>
+          </a:xfrm>
+          <a:prstGeom prst="straightConnector1">
+            <a:avLst/>
+          </a:prstGeom>
+          <a:ln w="38100">
+            <a:solidFill>
+              <a:srgbClr val="FF0000"/>
+            </a:solidFill>
+            <a:headEnd type="triangle"/>
+            <a:tailEnd type="triangle"/>
+          </a:ln>
+        </p:spPr>
+        <p:style>
+          <a:lnRef idx="1">
+            <a:schemeClr val="accent1"/>
+          </a:lnRef>
+          <a:fillRef idx="0">
+            <a:schemeClr val="accent1"/>
+          </a:fillRef>
+          <a:effectRef idx="0">
+            <a:schemeClr val="accent1"/>
+          </a:effectRef>
+          <a:fontRef idx="minor">
+            <a:schemeClr val="tx1"/>
+          </a:fontRef>
+        </p:style>
+      </p:cxnSp>
+      <p:cxnSp>
+        <p:nvCxnSpPr>
+          <p:cNvPr id="17" name="Connettore 2 16">
+            <a:extLst>
+              <a:ext uri="{FF2B5EF4-FFF2-40B4-BE49-F238E27FC236}">
+                <a16:creationId xmlns:a16="http://schemas.microsoft.com/office/drawing/2014/main" id="{647C59B2-1F5D-4C86-BECC-9005526ADC75}"/>
+              </a:ext>
+            </a:extLst>
+          </p:cNvPr>
+          <p:cNvCxnSpPr>
+            <a:cxnSpLocks/>
+            <a:stCxn id="2050" idx="0"/>
+            <a:endCxn id="2" idx="2"/>
+          </p:cNvCxnSpPr>
+          <p:nvPr/>
+        </p:nvCxnSpPr>
+        <p:spPr>
+          <a:xfrm flipH="1" flipV="1">
+            <a:off x="4809209" y="3429000"/>
+            <a:ext cx="5496" cy="872444"/>
+          </a:xfrm>
+          <a:prstGeom prst="straightConnector1">
+            <a:avLst/>
+          </a:prstGeom>
+          <a:ln w="38100">
+            <a:solidFill>
+              <a:srgbClr val="FF0000"/>
+            </a:solidFill>
+            <a:headEnd type="triangle"/>
+            <a:tailEnd type="triangle"/>
+          </a:ln>
+        </p:spPr>
+        <p:style>
+          <a:lnRef idx="1">
+            <a:schemeClr val="accent1"/>
+          </a:lnRef>
+          <a:fillRef idx="0">
+            <a:schemeClr val="accent1"/>
+          </a:fillRef>
+          <a:effectRef idx="0">
+            <a:schemeClr val="accent1"/>
+          </a:effectRef>
+          <a:fontRef idx="minor">
+            <a:schemeClr val="tx1"/>
+          </a:fontRef>
+        </p:style>
+      </p:cxnSp>
+      <p:sp>
+        <p:nvSpPr>
+          <p:cNvPr id="15" name="CasellaDiTesto 14">
+            <a:extLst>
+              <a:ext uri="{FF2B5EF4-FFF2-40B4-BE49-F238E27FC236}">
+                <a16:creationId xmlns:a16="http://schemas.microsoft.com/office/drawing/2014/main" id="{9068B498-3A4D-4320-8309-E78305FD60B7}"/>
+              </a:ext>
+            </a:extLst>
+          </p:cNvPr>
+          <p:cNvSpPr txBox="1"/>
+          <p:nvPr/>
+        </p:nvSpPr>
+        <p:spPr>
+          <a:xfrm>
+            <a:off x="2362381" y="1866478"/>
+            <a:ext cx="1291740" cy="369332"/>
+          </a:xfrm>
+          <a:prstGeom prst="rect">
+            <a:avLst/>
+          </a:prstGeom>
+          <a:noFill/>
+        </p:spPr>
+        <p:txBody>
+          <a:bodyPr wrap="square" rtlCol="0">
+            <a:spAutoFit/>
+          </a:bodyPr>
+          <a:lstStyle/>
+          <a:p>
+            <a:r>
+              <a:rPr lang="it-IT" dirty="0"/>
+              <a:t>robot state</a:t>
+            </a:r>
+          </a:p>
+        </p:txBody>
+      </p:sp>
+      <p:sp>
+        <p:nvSpPr>
+          <p:cNvPr id="16" name="CasellaDiTesto 15">
+            <a:extLst>
+              <a:ext uri="{FF2B5EF4-FFF2-40B4-BE49-F238E27FC236}">
+                <a16:creationId xmlns:a16="http://schemas.microsoft.com/office/drawing/2014/main" id="{E2A87A62-B019-49FF-8628-0A78EF7037CC}"/>
+              </a:ext>
+            </a:extLst>
+          </p:cNvPr>
+          <p:cNvSpPr txBox="1"/>
+          <p:nvPr/>
+        </p:nvSpPr>
+        <p:spPr>
+          <a:xfrm>
+            <a:off x="3522417" y="3745523"/>
+            <a:ext cx="823179" cy="369332"/>
+          </a:xfrm>
+          <a:prstGeom prst="rect">
+            <a:avLst/>
+          </a:prstGeom>
+          <a:noFill/>
+        </p:spPr>
+        <p:txBody>
+          <a:bodyPr wrap="square" rtlCol="0">
+            <a:spAutoFit/>
+          </a:bodyPr>
+          <a:lstStyle/>
+          <a:p>
+            <a:r>
+              <a:rPr lang="it-IT" dirty="0"/>
+              <a:t>users</a:t>
+            </a:r>
+          </a:p>
+        </p:txBody>
+      </p:sp>
+      <p:pic>
+        <p:nvPicPr>
+          <p:cNvPr id="2058" name="Picture 10" descr="Risultati immagini per utente">
+            <a:extLst>
+              <a:ext uri="{FF2B5EF4-FFF2-40B4-BE49-F238E27FC236}">
+                <a16:creationId xmlns:a16="http://schemas.microsoft.com/office/drawing/2014/main" id="{4520DDAC-A384-4FD2-8241-DC17AF042546}"/>
+              </a:ext>
+            </a:extLst>
+          </p:cNvPr>
+          <p:cNvPicPr>
+            <a:picLocks noChangeAspect="1" noChangeArrowheads="1"/>
+          </p:cNvPicPr>
+          <p:nvPr/>
+        </p:nvPicPr>
+        <p:blipFill>
+          <a:blip r:embed="rId5">
+            <a:extLst>
+              <a:ext uri="{28A0092B-C50C-407E-A947-70E740481C1C}">
+                <a14:useLocalDpi xmlns:a14="http://schemas.microsoft.com/office/drawing/2010/main" val="0"/>
+              </a:ext>
+            </a:extLst>
+          </a:blip>
+          <a:srcRect/>
+          <a:stretch>
+            <a:fillRect/>
+          </a:stretch>
+        </p:blipFill>
+        <p:spPr bwMode="auto">
+          <a:xfrm>
+            <a:off x="4009108" y="3581572"/>
+            <a:ext cx="719872" cy="719872"/>
+          </a:xfrm>
+          <a:prstGeom prst="rect">
+            <a:avLst/>
+          </a:prstGeom>
+          <a:noFill/>
+          <a:extLst>
+            <a:ext uri="{909E8E84-426E-40DD-AFC4-6F175D3DCCD1}">
+              <a14:hiddenFill xmlns:a14="http://schemas.microsoft.com/office/drawing/2010/main">
+                <a:solidFill>
+                  <a:srgbClr val="FFFFFF"/>
+                </a:solidFill>
+              </a14:hiddenFill>
+            </a:ext>
+          </a:extLst>
+        </p:spPr>
+      </p:pic>
+      <p:cxnSp>
+        <p:nvCxnSpPr>
+          <p:cNvPr id="24" name="Connettore 2 23">
+            <a:extLst>
+              <a:ext uri="{FF2B5EF4-FFF2-40B4-BE49-F238E27FC236}">
+                <a16:creationId xmlns:a16="http://schemas.microsoft.com/office/drawing/2014/main" id="{A956FD39-0764-4B94-B1DD-BDECB593C7EE}"/>
+              </a:ext>
+            </a:extLst>
+          </p:cNvPr>
+          <p:cNvCxnSpPr>
+            <a:cxnSpLocks/>
+            <a:stCxn id="2" idx="3"/>
+            <a:endCxn id="11" idx="1"/>
+          </p:cNvCxnSpPr>
+          <p:nvPr/>
+        </p:nvCxnSpPr>
+        <p:spPr>
+          <a:xfrm>
+            <a:off x="6096000" y="2235811"/>
+            <a:ext cx="2511303" cy="0"/>
+          </a:xfrm>
+          <a:prstGeom prst="straightConnector1">
+            <a:avLst/>
+          </a:prstGeom>
+          <a:ln w="38100">
+            <a:solidFill>
+              <a:srgbClr val="FF0000"/>
+            </a:solidFill>
+            <a:headEnd type="none" w="med" len="med"/>
+            <a:tailEnd type="triangle" w="med" len="med"/>
+          </a:ln>
+        </p:spPr>
+        <p:style>
+          <a:lnRef idx="1">
+            <a:schemeClr val="accent1"/>
+          </a:lnRef>
+          <a:fillRef idx="0">
+            <a:schemeClr val="accent1"/>
+          </a:fillRef>
+          <a:effectRef idx="0">
+            <a:schemeClr val="accent1"/>
+          </a:effectRef>
+          <a:fontRef idx="minor">
+            <a:schemeClr val="tx1"/>
+          </a:fontRef>
+        </p:style>
+      </p:cxnSp>
+      <p:sp>
+        <p:nvSpPr>
+          <p:cNvPr id="6" name="CasellaDiTesto 5">
+            <a:extLst>
+              <a:ext uri="{FF2B5EF4-FFF2-40B4-BE49-F238E27FC236}">
+                <a16:creationId xmlns:a16="http://schemas.microsoft.com/office/drawing/2014/main" id="{A42652FB-B83C-403A-B126-576A4BBB72DA}"/>
+              </a:ext>
+            </a:extLst>
+          </p:cNvPr>
+          <p:cNvSpPr txBox="1"/>
+          <p:nvPr/>
+        </p:nvSpPr>
+        <p:spPr>
+          <a:xfrm rot="2171467">
+            <a:off x="6372296" y="3177543"/>
+            <a:ext cx="2286548" cy="646331"/>
+          </a:xfrm>
+          <a:prstGeom prst="rect">
+            <a:avLst/>
+          </a:prstGeom>
+          <a:noFill/>
+        </p:spPr>
+        <p:txBody>
+          <a:bodyPr wrap="square" rtlCol="0">
+            <a:spAutoFit/>
+          </a:bodyPr>
+          <a:lstStyle/>
+          <a:p>
+            <a:r>
+              <a:rPr lang="it-IT" dirty="0"/>
+              <a:t>alarm | usercmd : usercmd(CMD)</a:t>
+            </a:r>
+          </a:p>
+        </p:txBody>
+      </p:sp>
+      <p:sp>
+        <p:nvSpPr>
+          <p:cNvPr id="7" name="Rettangolo con angoli arrotondati 6">
+            <a:extLst>
+              <a:ext uri="{FF2B5EF4-FFF2-40B4-BE49-F238E27FC236}">
+                <a16:creationId xmlns:a16="http://schemas.microsoft.com/office/drawing/2014/main" id="{CF053B30-A2B1-4912-804D-5346F770B255}"/>
+              </a:ext>
+            </a:extLst>
+          </p:cNvPr>
+          <p:cNvSpPr/>
+          <p:nvPr/>
+        </p:nvSpPr>
+        <p:spPr>
+          <a:xfrm>
+            <a:off x="8002282" y="4401552"/>
+            <a:ext cx="2189284" cy="1942563"/>
+          </a:xfrm>
+          <a:prstGeom prst="roundRect">
+            <a:avLst/>
+          </a:prstGeom>
+          <a:solidFill>
+            <a:srgbClr val="FAF472"/>
+          </a:solidFill>
+          <a:ln w="38100">
+            <a:solidFill>
+              <a:srgbClr val="F39B0D"/>
+            </a:solidFill>
+          </a:ln>
+        </p:spPr>
+        <p:style>
+          <a:lnRef idx="2">
+            <a:schemeClr val="accent1">
+              <a:shade val="50000"/>
+            </a:schemeClr>
+          </a:lnRef>
+          <a:fillRef idx="1">
+            <a:schemeClr val="accent1"/>
+          </a:fillRef>
+          <a:effectRef idx="0">
+            <a:schemeClr val="accent1"/>
+          </a:effectRef>
+          <a:fontRef idx="minor">
+            <a:schemeClr val="lt1"/>
+          </a:fontRef>
+        </p:style>
+        <p:txBody>
+          <a:bodyPr rtlCol="0" anchor="ctr"/>
+          <a:lstStyle/>
+          <a:p>
+            <a:pPr algn="ctr"/>
+            <a:r>
+              <a:rPr lang="it-IT" sz="3600" dirty="0">
+                <a:solidFill>
+                  <a:schemeClr val="tx2"/>
+                </a:solidFill>
+              </a:rPr>
+              <a:t>MQTT</a:t>
+            </a:r>
+            <a:endParaRPr lang="it-IT" dirty="0">
+              <a:solidFill>
+                <a:schemeClr val="tx2"/>
+              </a:solidFill>
+            </a:endParaRPr>
+          </a:p>
+        </p:txBody>
+      </p:sp>
+      <p:cxnSp>
+        <p:nvCxnSpPr>
+          <p:cNvPr id="21" name="Connettore 2 20">
+            <a:extLst>
+              <a:ext uri="{FF2B5EF4-FFF2-40B4-BE49-F238E27FC236}">
+                <a16:creationId xmlns:a16="http://schemas.microsoft.com/office/drawing/2014/main" id="{BC9CD8FD-69C0-414F-8D96-25DA21472B3D}"/>
+              </a:ext>
+            </a:extLst>
+          </p:cNvPr>
+          <p:cNvCxnSpPr>
+            <a:cxnSpLocks/>
+          </p:cNvCxnSpPr>
+          <p:nvPr/>
+        </p:nvCxnSpPr>
+        <p:spPr>
+          <a:xfrm>
+            <a:off x="6122724" y="2866070"/>
+            <a:ext cx="2106876" cy="1535482"/>
+          </a:xfrm>
+          <a:prstGeom prst="straightConnector1">
+            <a:avLst/>
+          </a:prstGeom>
+          <a:ln w="38100">
+            <a:solidFill>
+              <a:srgbClr val="FF0000"/>
+            </a:solidFill>
+            <a:headEnd type="none" w="med" len="med"/>
+            <a:tailEnd type="triangle" w="med" len="med"/>
+          </a:ln>
+        </p:spPr>
+        <p:style>
+          <a:lnRef idx="1">
+            <a:schemeClr val="accent1"/>
+          </a:lnRef>
+          <a:fillRef idx="0">
+            <a:schemeClr val="accent1"/>
+          </a:fillRef>
+          <a:effectRef idx="0">
+            <a:schemeClr val="accent1"/>
+          </a:effectRef>
+          <a:fontRef idx="minor">
+            <a:schemeClr val="tx1"/>
+          </a:fontRef>
+        </p:style>
+      </p:cxnSp>
+      <p:cxnSp>
+        <p:nvCxnSpPr>
+          <p:cNvPr id="25" name="Connettore 2 24">
+            <a:extLst>
+              <a:ext uri="{FF2B5EF4-FFF2-40B4-BE49-F238E27FC236}">
+                <a16:creationId xmlns:a16="http://schemas.microsoft.com/office/drawing/2014/main" id="{6F72EC06-8107-4E98-84F9-922FE942B007}"/>
+              </a:ext>
+            </a:extLst>
+          </p:cNvPr>
+          <p:cNvCxnSpPr>
+            <a:cxnSpLocks/>
+            <a:endCxn id="7" idx="0"/>
+          </p:cNvCxnSpPr>
+          <p:nvPr/>
+        </p:nvCxnSpPr>
+        <p:spPr>
+          <a:xfrm flipH="1">
+            <a:off x="9096924" y="3429000"/>
+            <a:ext cx="389976" cy="972552"/>
+          </a:xfrm>
+          <a:prstGeom prst="straightConnector1">
+            <a:avLst/>
+          </a:prstGeom>
+          <a:ln w="38100">
+            <a:solidFill>
+              <a:srgbClr val="FF0000"/>
+            </a:solidFill>
+            <a:headEnd type="triangle" w="med" len="med"/>
+            <a:tailEnd type="triangle" w="med" len="med"/>
+          </a:ln>
+        </p:spPr>
+        <p:style>
+          <a:lnRef idx="1">
+            <a:schemeClr val="accent1"/>
+          </a:lnRef>
+          <a:fillRef idx="0">
+            <a:schemeClr val="accent1"/>
+          </a:fillRef>
+          <a:effectRef idx="0">
+            <a:schemeClr val="accent1"/>
+          </a:effectRef>
+          <a:fontRef idx="minor">
+            <a:schemeClr val="tx1"/>
+          </a:fontRef>
+        </p:style>
+      </p:cxnSp>
+      <p:sp>
+        <p:nvSpPr>
+          <p:cNvPr id="31" name="CasellaDiTesto 30">
+            <a:extLst>
+              <a:ext uri="{FF2B5EF4-FFF2-40B4-BE49-F238E27FC236}">
+                <a16:creationId xmlns:a16="http://schemas.microsoft.com/office/drawing/2014/main" id="{6D7C24F6-03D8-4A23-9333-00E5D292722D}"/>
+              </a:ext>
+            </a:extLst>
+          </p:cNvPr>
+          <p:cNvSpPr txBox="1"/>
+          <p:nvPr/>
+        </p:nvSpPr>
+        <p:spPr>
+          <a:xfrm>
+            <a:off x="6509516" y="1607545"/>
+            <a:ext cx="2286548" cy="646331"/>
+          </a:xfrm>
+          <a:prstGeom prst="rect">
+            <a:avLst/>
+          </a:prstGeom>
+          <a:noFill/>
+        </p:spPr>
+        <p:txBody>
+          <a:bodyPr wrap="square" rtlCol="0">
+            <a:spAutoFit/>
+          </a:bodyPr>
+          <a:lstStyle/>
+          <a:p>
+            <a:r>
+              <a:rPr lang="it-IT" dirty="0"/>
+              <a:t>alarm | usercmd : usercmd(CMD)</a:t>
+            </a:r>
+          </a:p>
+        </p:txBody>
+      </p:sp>
+      <p:cxnSp>
+        <p:nvCxnSpPr>
+          <p:cNvPr id="33" name="Connettore 2 32">
+            <a:extLst>
+              <a:ext uri="{FF2B5EF4-FFF2-40B4-BE49-F238E27FC236}">
+                <a16:creationId xmlns:a16="http://schemas.microsoft.com/office/drawing/2014/main" id="{EA4CDF94-C3FF-4AF5-9827-D827D0B13EF1}"/>
+              </a:ext>
+            </a:extLst>
+          </p:cNvPr>
+          <p:cNvCxnSpPr>
+            <a:cxnSpLocks/>
+          </p:cNvCxnSpPr>
+          <p:nvPr/>
+        </p:nvCxnSpPr>
+        <p:spPr>
+          <a:xfrm>
+            <a:off x="5983505" y="3289525"/>
+            <a:ext cx="2029392" cy="1476080"/>
+          </a:xfrm>
+          <a:prstGeom prst="straightConnector1">
+            <a:avLst/>
+          </a:prstGeom>
+          <a:ln w="38100">
+            <a:solidFill>
+              <a:srgbClr val="FF0000"/>
+            </a:solidFill>
+            <a:headEnd type="triangle" w="med" len="med"/>
+            <a:tailEnd type="none" w="med" len="med"/>
+          </a:ln>
+        </p:spPr>
+        <p:style>
+          <a:lnRef idx="1">
+            <a:schemeClr val="accent1"/>
+          </a:lnRef>
+          <a:fillRef idx="0">
+            <a:schemeClr val="accent1"/>
+          </a:fillRef>
+          <a:effectRef idx="0">
+            <a:schemeClr val="accent1"/>
+          </a:effectRef>
+          <a:fontRef idx="minor">
+            <a:schemeClr val="tx1"/>
+          </a:fontRef>
+        </p:style>
+      </p:cxnSp>
+      <p:pic>
+        <p:nvPicPr>
+          <p:cNvPr id="1026" name="Picture 2" descr="Risultati immagini per mqtt logo png">
+            <a:extLst>
+              <a:ext uri="{FF2B5EF4-FFF2-40B4-BE49-F238E27FC236}">
+                <a16:creationId xmlns:a16="http://schemas.microsoft.com/office/drawing/2014/main" id="{DF3D5CAC-ECC6-4ADB-9577-35A95BC4CD8C}"/>
+              </a:ext>
+            </a:extLst>
+          </p:cNvPr>
+          <p:cNvPicPr>
+            <a:picLocks noChangeAspect="1" noChangeArrowheads="1"/>
+          </p:cNvPicPr>
+          <p:nvPr/>
+        </p:nvPicPr>
+        <p:blipFill>
+          <a:blip r:embed="rId6">
+            <a:extLst>
+              <a:ext uri="{28A0092B-C50C-407E-A947-70E740481C1C}">
+                <a14:useLocalDpi xmlns:a14="http://schemas.microsoft.com/office/drawing/2010/main" val="0"/>
+              </a:ext>
+            </a:extLst>
+          </a:blip>
+          <a:srcRect/>
+          <a:stretch>
+            <a:fillRect/>
+          </a:stretch>
+        </p:blipFill>
+        <p:spPr bwMode="auto">
+          <a:xfrm>
+            <a:off x="9486900" y="5701502"/>
+            <a:ext cx="986383" cy="971587"/>
+          </a:xfrm>
+          <a:prstGeom prst="rect">
+            <a:avLst/>
+          </a:prstGeom>
+          <a:noFill/>
+          <a:extLst>
+            <a:ext uri="{909E8E84-426E-40DD-AFC4-6F175D3DCCD1}">
+              <a14:hiddenFill xmlns:a14="http://schemas.microsoft.com/office/drawing/2010/main">
+                <a:solidFill>
+                  <a:srgbClr val="FFFFFF"/>
+                </a:solidFill>
+              </a14:hiddenFill>
+            </a:ext>
+          </a:extLst>
+        </p:spPr>
+      </p:pic>
+    </p:spTree>
+    <p:extLst>
+      <p:ext uri="{BB962C8B-B14F-4D97-AF65-F5344CB8AC3E}">
+        <p14:creationId xmlns:p14="http://schemas.microsoft.com/office/powerpoint/2010/main" val="1076403188"/>
       </p:ext>
     </p:extLst>
   </p:cSld>
@@ -24819,7 +26952,7 @@
         <p:spPr>
           <a:xfrm>
             <a:off x="6556289" y="1562359"/>
-            <a:ext cx="1464466" cy="657881"/>
+            <a:ext cx="1614984" cy="657881"/>
           </a:xfrm>
           <a:prstGeom prst="ellipse">
             <a:avLst/>
@@ -24863,7 +26996,7 @@
                   <a:schemeClr val="tx1"/>
                 </a:solidFill>
               </a:rPr>
-              <a:t>leftTurn</a:t>
+              <a:t>rightTurn</a:t>
             </a:r>
           </a:p>
         </p:txBody>
@@ -24882,7 +27015,7 @@
         </p:nvSpPr>
         <p:spPr>
           <a:xfrm>
-            <a:off x="6429762" y="4654737"/>
+            <a:off x="6508890" y="4654737"/>
             <a:ext cx="1717520" cy="657881"/>
           </a:xfrm>
           <a:prstGeom prst="ellipse">
@@ -24997,7 +27130,7 @@
         <p:spPr>
           <a:xfrm flipH="1">
             <a:off x="4830111" y="4983678"/>
-            <a:ext cx="1599651" cy="1"/>
+            <a:ext cx="1678779" cy="1"/>
           </a:xfrm>
           <a:prstGeom prst="straightConnector1">
             <a:avLst/>
@@ -25006,7 +27139,8 @@
             <a:solidFill>
               <a:schemeClr val="tx1"/>
             </a:solidFill>
-            <a:tailEnd type="triangle"/>
+            <a:headEnd type="triangle" w="med" len="med"/>
+            <a:tailEnd type="none" w="med" len="med"/>
           </a:ln>
         </p:spPr>
         <p:style>
@@ -25042,8 +27176,8 @@
         </p:nvCxnSpPr>
         <p:spPr>
           <a:xfrm>
-            <a:off x="7288522" y="2220240"/>
-            <a:ext cx="0" cy="2434497"/>
+            <a:off x="7363781" y="2220240"/>
+            <a:ext cx="3869" cy="2434497"/>
           </a:xfrm>
           <a:prstGeom prst="straightConnector1">
             <a:avLst/>
@@ -25052,7 +27186,8 @@
             <a:solidFill>
               <a:schemeClr val="tx1"/>
             </a:solidFill>
-            <a:tailEnd type="triangle"/>
+            <a:headEnd type="triangle" w="med" len="med"/>
+            <a:tailEnd type="none" w="med" len="med"/>
           </a:ln>
         </p:spPr>
         <p:style>
@@ -25098,7 +27233,8 @@
             <a:solidFill>
               <a:schemeClr val="tx1"/>
             </a:solidFill>
-            <a:tailEnd type="triangle"/>
+            <a:headEnd type="triangle" w="med" len="med"/>
+            <a:tailEnd type="none" w="med" len="med"/>
           </a:ln>
         </p:spPr>
         <p:style>
@@ -25175,7 +27311,7 @@
                   <a:schemeClr val="tx1"/>
                 </a:solidFill>
               </a:rPr>
-              <a:t>rightTurn</a:t>
+              <a:t>leftTurn</a:t>
             </a:r>
           </a:p>
         </p:txBody>
@@ -25208,7 +27344,8 @@
             <a:solidFill>
               <a:schemeClr val="tx1"/>
             </a:solidFill>
-            <a:tailEnd type="triangle"/>
+            <a:headEnd type="triangle" w="med" len="med"/>
+            <a:tailEnd type="none" w="med" len="med"/>
           </a:ln>
         </p:spPr>
         <p:style>
@@ -25468,7 +27605,7 @@
         </p:nvSpPr>
         <p:spPr>
           <a:xfrm rot="5400000">
-            <a:off x="7645891" y="1905898"/>
+            <a:off x="7755675" y="1921736"/>
             <a:ext cx="448407" cy="447338"/>
           </a:xfrm>
           <a:prstGeom prst="upArrow">
@@ -25522,7 +27659,7 @@
         </p:nvSpPr>
         <p:spPr>
           <a:xfrm>
-            <a:off x="7722866" y="4564599"/>
+            <a:off x="7722866" y="4414092"/>
             <a:ext cx="448407" cy="447338"/>
           </a:xfrm>
           <a:prstGeom prst="upArrow">

</xml_diff>

<commit_message>
Modifiche e screen FrontendServer + correzione disegni
</commit_message>
<xml_diff>
--- a/Appunti/ISSPowerPoint.pptx
+++ b/Appunti/ISSPowerPoint.pptx
@@ -11212,6 +11212,84 @@
           </a:extLst>
         </p:spPr>
       </p:pic>
+      <p:sp>
+        <p:nvSpPr>
+          <p:cNvPr id="30" name="CasellaDiTesto 29">
+            <a:extLst>
+              <a:ext uri="{FF2B5EF4-FFF2-40B4-BE49-F238E27FC236}">
+                <a16:creationId xmlns:a16="http://schemas.microsoft.com/office/drawing/2014/main" id="{8C2FB992-193E-4898-9A77-3859D396020F}"/>
+              </a:ext>
+            </a:extLst>
+          </p:cNvPr>
+          <p:cNvSpPr txBox="1"/>
+          <p:nvPr/>
+        </p:nvSpPr>
+        <p:spPr>
+          <a:xfrm>
+            <a:off x="6977978" y="1042621"/>
+            <a:ext cx="747346" cy="769441"/>
+          </a:xfrm>
+          <a:prstGeom prst="rect">
+            <a:avLst/>
+          </a:prstGeom>
+          <a:noFill/>
+        </p:spPr>
+        <p:txBody>
+          <a:bodyPr wrap="square" rtlCol="0">
+            <a:spAutoFit/>
+          </a:bodyPr>
+          <a:lstStyle/>
+          <a:p>
+            <a:r>
+              <a:rPr lang="it-IT" sz="4400" dirty="0">
+                <a:solidFill>
+                  <a:srgbClr val="FF0000"/>
+                </a:solidFill>
+              </a:rPr>
+              <a:t>a)</a:t>
+            </a:r>
+          </a:p>
+        </p:txBody>
+      </p:sp>
+      <p:sp>
+        <p:nvSpPr>
+          <p:cNvPr id="38" name="CasellaDiTesto 37">
+            <a:extLst>
+              <a:ext uri="{FF2B5EF4-FFF2-40B4-BE49-F238E27FC236}">
+                <a16:creationId xmlns:a16="http://schemas.microsoft.com/office/drawing/2014/main" id="{B8EDAE9C-C508-438D-8E34-2615048BB58E}"/>
+              </a:ext>
+            </a:extLst>
+          </p:cNvPr>
+          <p:cNvSpPr txBox="1"/>
+          <p:nvPr/>
+        </p:nvSpPr>
+        <p:spPr>
+          <a:xfrm>
+            <a:off x="6465267" y="3849186"/>
+            <a:ext cx="747346" cy="769441"/>
+          </a:xfrm>
+          <a:prstGeom prst="rect">
+            <a:avLst/>
+          </a:prstGeom>
+          <a:noFill/>
+        </p:spPr>
+        <p:txBody>
+          <a:bodyPr wrap="square" rtlCol="0">
+            <a:spAutoFit/>
+          </a:bodyPr>
+          <a:lstStyle/>
+          <a:p>
+            <a:r>
+              <a:rPr lang="it-IT" sz="4400" dirty="0">
+                <a:solidFill>
+                  <a:srgbClr val="FF0000"/>
+                </a:solidFill>
+              </a:rPr>
+              <a:t>b)</a:t>
+            </a:r>
+          </a:p>
+        </p:txBody>
+      </p:sp>
     </p:spTree>
     <p:extLst>
       <p:ext uri="{BB962C8B-B14F-4D97-AF65-F5344CB8AC3E}">
@@ -18654,51 +18732,6 @@
           </a:p>
         </p:txBody>
       </p:sp>
-      <p:cxnSp>
-        <p:nvCxnSpPr>
-          <p:cNvPr id="6" name="Connettore 2 5">
-            <a:extLst>
-              <a:ext uri="{FF2B5EF4-FFF2-40B4-BE49-F238E27FC236}">
-                <a16:creationId xmlns:a16="http://schemas.microsoft.com/office/drawing/2014/main" id="{5662DC31-80E5-415B-BF04-1BB78922E9DB}"/>
-              </a:ext>
-            </a:extLst>
-          </p:cNvPr>
-          <p:cNvCxnSpPr>
-            <a:stCxn id="51" idx="6"/>
-          </p:cNvCxnSpPr>
-          <p:nvPr/>
-        </p:nvCxnSpPr>
-        <p:spPr>
-          <a:xfrm>
-            <a:off x="10332937" y="6164147"/>
-            <a:ext cx="683825" cy="0"/>
-          </a:xfrm>
-          <a:prstGeom prst="straightConnector1">
-            <a:avLst/>
-          </a:prstGeom>
-          <a:ln w="38100">
-            <a:solidFill>
-              <a:schemeClr val="tx1"/>
-            </a:solidFill>
-            <a:prstDash val="sysDash"/>
-            <a:tailEnd type="triangle"/>
-          </a:ln>
-        </p:spPr>
-        <p:style>
-          <a:lnRef idx="1">
-            <a:schemeClr val="accent1"/>
-          </a:lnRef>
-          <a:fillRef idx="0">
-            <a:schemeClr val="accent1"/>
-          </a:fillRef>
-          <a:effectRef idx="0">
-            <a:schemeClr val="accent1"/>
-          </a:effectRef>
-          <a:fontRef idx="minor">
-            <a:schemeClr val="tx1"/>
-          </a:fontRef>
-        </p:style>
-      </p:cxnSp>
       <p:sp>
         <p:nvSpPr>
           <p:cNvPr id="4" name="Ovale 3">
@@ -18944,7 +18977,7 @@
           <a:noFill/>
           <a:ln w="57150">
             <a:solidFill>
-              <a:schemeClr val="tx1"/>
+              <a:srgbClr val="FF0000"/>
             </a:solidFill>
           </a:ln>
         </p:spPr>
@@ -20929,88 +20962,6 @@
           </a:fontRef>
         </p:style>
       </p:cxnSp>
-      <p:cxnSp>
-        <p:nvCxnSpPr>
-          <p:cNvPr id="269" name="Connettore curvo 268">
-            <a:extLst>
-              <a:ext uri="{FF2B5EF4-FFF2-40B4-BE49-F238E27FC236}">
-                <a16:creationId xmlns:a16="http://schemas.microsoft.com/office/drawing/2014/main" id="{85582E4C-E53D-4ADA-B756-9549336E6C71}"/>
-              </a:ext>
-            </a:extLst>
-          </p:cNvPr>
-          <p:cNvCxnSpPr>
-            <a:stCxn id="10" idx="2"/>
-            <a:endCxn id="5" idx="2"/>
-          </p:cNvCxnSpPr>
-          <p:nvPr/>
-        </p:nvCxnSpPr>
-        <p:spPr>
-          <a:xfrm rot="10800000">
-            <a:off x="946443" y="815773"/>
-            <a:ext cx="271862" cy="3452622"/>
-          </a:xfrm>
-          <a:prstGeom prst="curvedConnector3">
-            <a:avLst>
-              <a:gd name="adj1" fmla="val 337359"/>
-            </a:avLst>
-          </a:prstGeom>
-          <a:ln w="38100">
-            <a:solidFill>
-              <a:schemeClr val="tx1"/>
-            </a:solidFill>
-            <a:tailEnd type="triangle"/>
-          </a:ln>
-        </p:spPr>
-        <p:style>
-          <a:lnRef idx="1">
-            <a:schemeClr val="accent1"/>
-          </a:lnRef>
-          <a:fillRef idx="0">
-            <a:schemeClr val="accent1"/>
-          </a:fillRef>
-          <a:effectRef idx="0">
-            <a:schemeClr val="accent1"/>
-          </a:effectRef>
-          <a:fontRef idx="minor">
-            <a:schemeClr val="tx1"/>
-          </a:fontRef>
-        </p:style>
-      </p:cxnSp>
-      <p:sp>
-        <p:nvSpPr>
-          <p:cNvPr id="301" name="CasellaDiTesto 300">
-            <a:extLst>
-              <a:ext uri="{FF2B5EF4-FFF2-40B4-BE49-F238E27FC236}">
-                <a16:creationId xmlns:a16="http://schemas.microsoft.com/office/drawing/2014/main" id="{DDFBCC0E-35B7-4FFE-945D-58C0899BAD8B}"/>
-              </a:ext>
-            </a:extLst>
-          </p:cNvPr>
-          <p:cNvSpPr txBox="1"/>
-          <p:nvPr/>
-        </p:nvSpPr>
-        <p:spPr>
-          <a:xfrm>
-            <a:off x="0" y="3244572"/>
-            <a:ext cx="1390084" cy="400110"/>
-          </a:xfrm>
-          <a:prstGeom prst="rect">
-            <a:avLst/>
-          </a:prstGeom>
-          <a:noFill/>
-        </p:spPr>
-        <p:txBody>
-          <a:bodyPr wrap="square" rtlCol="0">
-            <a:spAutoFit/>
-          </a:bodyPr>
-          <a:lstStyle/>
-          <a:p>
-            <a:r>
-              <a:rPr lang="it-IT" sz="2000" dirty="0"/>
-              <a:t>frontSonar</a:t>
-            </a:r>
-          </a:p>
-        </p:txBody>
-      </p:sp>
       <p:sp>
         <p:nvSpPr>
           <p:cNvPr id="335" name="CasellaDiTesto 334">
@@ -21484,51 +21435,6 @@
           </a:extLst>
         </p:spPr>
       </p:pic>
-      <p:cxnSp>
-        <p:nvCxnSpPr>
-          <p:cNvPr id="3" name="Connettore 2 2">
-            <a:extLst>
-              <a:ext uri="{FF2B5EF4-FFF2-40B4-BE49-F238E27FC236}">
-                <a16:creationId xmlns:a16="http://schemas.microsoft.com/office/drawing/2014/main" id="{8E96A151-F283-4FB4-AE47-639F064F1DE4}"/>
-              </a:ext>
-            </a:extLst>
-          </p:cNvPr>
-          <p:cNvCxnSpPr>
-            <a:endCxn id="5" idx="1"/>
-          </p:cNvCxnSpPr>
-          <p:nvPr/>
-        </p:nvCxnSpPr>
-        <p:spPr>
-          <a:xfrm>
-            <a:off x="633046" y="316523"/>
-            <a:ext cx="619799" cy="246654"/>
-          </a:xfrm>
-          <a:prstGeom prst="straightConnector1">
-            <a:avLst/>
-          </a:prstGeom>
-          <a:ln w="38100">
-            <a:solidFill>
-              <a:schemeClr val="tx1"/>
-            </a:solidFill>
-            <a:prstDash val="dash"/>
-            <a:tailEnd type="triangle"/>
-          </a:ln>
-        </p:spPr>
-        <p:style>
-          <a:lnRef idx="1">
-            <a:schemeClr val="accent1"/>
-          </a:lnRef>
-          <a:fillRef idx="0">
-            <a:schemeClr val="accent1"/>
-          </a:fillRef>
-          <a:effectRef idx="0">
-            <a:schemeClr val="accent1"/>
-          </a:effectRef>
-          <a:fontRef idx="minor">
-            <a:schemeClr val="tx1"/>
-          </a:fontRef>
-        </p:style>
-      </p:cxnSp>
       <p:sp>
         <p:nvSpPr>
           <p:cNvPr id="67" name="Ovale 66">

</xml_diff>

<commit_message>
Schemi frontend  + fix bug in applCodeRobot
</commit_message>
<xml_diff>
--- a/Appunti/ISSPowerPoint.pptx
+++ b/Appunti/ISSPowerPoint.pptx
@@ -18,6 +18,7 @@
     <p:sldId id="267" r:id="rId12"/>
     <p:sldId id="268" r:id="rId13"/>
     <p:sldId id="269" r:id="rId14"/>
+    <p:sldId id="270" r:id="rId15"/>
   </p:sldIdLst>
   <p:sldSz cx="12192000" cy="6858000"/>
   <p:notesSz cx="6858000" cy="9144000"/>
@@ -271,7 +272,7 @@
           <a:p>
             <a:fld id="{E6413443-42B5-4B96-B751-851C9FA71E6D}" type="datetimeFigureOut">
               <a:rPr lang="it-IT" smtClean="0"/>
-              <a:t>15/09/2018</a:t>
+              <a:t>18/09/2018</a:t>
             </a:fld>
             <a:endParaRPr lang="it-IT"/>
           </a:p>
@@ -469,7 +470,7 @@
           <a:p>
             <a:fld id="{E6413443-42B5-4B96-B751-851C9FA71E6D}" type="datetimeFigureOut">
               <a:rPr lang="it-IT" smtClean="0"/>
-              <a:t>15/09/2018</a:t>
+              <a:t>18/09/2018</a:t>
             </a:fld>
             <a:endParaRPr lang="it-IT"/>
           </a:p>
@@ -677,7 +678,7 @@
           <a:p>
             <a:fld id="{E6413443-42B5-4B96-B751-851C9FA71E6D}" type="datetimeFigureOut">
               <a:rPr lang="it-IT" smtClean="0"/>
-              <a:t>15/09/2018</a:t>
+              <a:t>18/09/2018</a:t>
             </a:fld>
             <a:endParaRPr lang="it-IT"/>
           </a:p>
@@ -875,7 +876,7 @@
           <a:p>
             <a:fld id="{E6413443-42B5-4B96-B751-851C9FA71E6D}" type="datetimeFigureOut">
               <a:rPr lang="it-IT" smtClean="0"/>
-              <a:t>15/09/2018</a:t>
+              <a:t>18/09/2018</a:t>
             </a:fld>
             <a:endParaRPr lang="it-IT"/>
           </a:p>
@@ -1150,7 +1151,7 @@
           <a:p>
             <a:fld id="{E6413443-42B5-4B96-B751-851C9FA71E6D}" type="datetimeFigureOut">
               <a:rPr lang="it-IT" smtClean="0"/>
-              <a:t>15/09/2018</a:t>
+              <a:t>18/09/2018</a:t>
             </a:fld>
             <a:endParaRPr lang="it-IT"/>
           </a:p>
@@ -1415,7 +1416,7 @@
           <a:p>
             <a:fld id="{E6413443-42B5-4B96-B751-851C9FA71E6D}" type="datetimeFigureOut">
               <a:rPr lang="it-IT" smtClean="0"/>
-              <a:t>15/09/2018</a:t>
+              <a:t>18/09/2018</a:t>
             </a:fld>
             <a:endParaRPr lang="it-IT"/>
           </a:p>
@@ -1827,7 +1828,7 @@
           <a:p>
             <a:fld id="{E6413443-42B5-4B96-B751-851C9FA71E6D}" type="datetimeFigureOut">
               <a:rPr lang="it-IT" smtClean="0"/>
-              <a:t>15/09/2018</a:t>
+              <a:t>18/09/2018</a:t>
             </a:fld>
             <a:endParaRPr lang="it-IT"/>
           </a:p>
@@ -1968,7 +1969,7 @@
           <a:p>
             <a:fld id="{E6413443-42B5-4B96-B751-851C9FA71E6D}" type="datetimeFigureOut">
               <a:rPr lang="it-IT" smtClean="0"/>
-              <a:t>15/09/2018</a:t>
+              <a:t>18/09/2018</a:t>
             </a:fld>
             <a:endParaRPr lang="it-IT"/>
           </a:p>
@@ -2081,7 +2082,7 @@
           <a:p>
             <a:fld id="{E6413443-42B5-4B96-B751-851C9FA71E6D}" type="datetimeFigureOut">
               <a:rPr lang="it-IT" smtClean="0"/>
-              <a:t>15/09/2018</a:t>
+              <a:t>18/09/2018</a:t>
             </a:fld>
             <a:endParaRPr lang="it-IT"/>
           </a:p>
@@ -2392,7 +2393,7 @@
           <a:p>
             <a:fld id="{E6413443-42B5-4B96-B751-851C9FA71E6D}" type="datetimeFigureOut">
               <a:rPr lang="it-IT" smtClean="0"/>
-              <a:t>15/09/2018</a:t>
+              <a:t>18/09/2018</a:t>
             </a:fld>
             <a:endParaRPr lang="it-IT"/>
           </a:p>
@@ -2680,7 +2681,7 @@
           <a:p>
             <a:fld id="{E6413443-42B5-4B96-B751-851C9FA71E6D}" type="datetimeFigureOut">
               <a:rPr lang="it-IT" smtClean="0"/>
-              <a:t>15/09/2018</a:t>
+              <a:t>18/09/2018</a:t>
             </a:fld>
             <a:endParaRPr lang="it-IT"/>
           </a:p>
@@ -2921,7 +2922,7 @@
           <a:p>
             <a:fld id="{E6413443-42B5-4B96-B751-851C9FA71E6D}" type="datetimeFigureOut">
               <a:rPr lang="it-IT" smtClean="0"/>
-              <a:t>15/09/2018</a:t>
+              <a:t>18/09/2018</a:t>
             </a:fld>
             <a:endParaRPr lang="it-IT"/>
           </a:p>
@@ -10742,8 +10743,8 @@
           <p:nvPr/>
         </p:nvSpPr>
         <p:spPr>
-          <a:xfrm>
-            <a:off x="2362381" y="1866478"/>
+          <a:xfrm rot="19017159">
+            <a:off x="2491819" y="3353447"/>
             <a:ext cx="1291740" cy="369332"/>
           </a:xfrm>
           <a:prstGeom prst="rect">
@@ -11290,10 +11291,1863 @@
           </a:p>
         </p:txBody>
       </p:sp>
+      <p:grpSp>
+        <p:nvGrpSpPr>
+          <p:cNvPr id="26" name="Gruppo 25">
+            <a:extLst>
+              <a:ext uri="{FF2B5EF4-FFF2-40B4-BE49-F238E27FC236}">
+                <a16:creationId xmlns:a16="http://schemas.microsoft.com/office/drawing/2014/main" id="{0752A54F-902E-4D82-8F1E-FEAE8B4E97E1}"/>
+              </a:ext>
+            </a:extLst>
+          </p:cNvPr>
+          <p:cNvGrpSpPr/>
+          <p:nvPr/>
+        </p:nvGrpSpPr>
+        <p:grpSpPr>
+          <a:xfrm>
+            <a:off x="357425" y="3331799"/>
+            <a:ext cx="2573583" cy="3043333"/>
+            <a:chOff x="357425" y="3331799"/>
+            <a:chExt cx="2573583" cy="3043333"/>
+          </a:xfrm>
+        </p:grpSpPr>
+        <p:sp>
+          <p:nvSpPr>
+            <p:cNvPr id="27" name="Rettangolo con angoli arrotondati 26">
+              <a:extLst>
+                <a:ext uri="{FF2B5EF4-FFF2-40B4-BE49-F238E27FC236}">
+                  <a16:creationId xmlns:a16="http://schemas.microsoft.com/office/drawing/2014/main" id="{865E844F-7160-4FF6-B0B9-27C2C488D203}"/>
+                </a:ext>
+              </a:extLst>
+            </p:cNvPr>
+            <p:cNvSpPr/>
+            <p:nvPr/>
+          </p:nvSpPr>
+          <p:spPr>
+            <a:xfrm>
+              <a:off x="357425" y="3988753"/>
+              <a:ext cx="2573583" cy="2386379"/>
+            </a:xfrm>
+            <a:prstGeom prst="roundRect">
+              <a:avLst/>
+            </a:prstGeom>
+            <a:solidFill>
+              <a:srgbClr val="BF84FA"/>
+            </a:solidFill>
+            <a:ln w="38100">
+              <a:solidFill>
+                <a:srgbClr val="7030A0"/>
+              </a:solidFill>
+            </a:ln>
+          </p:spPr>
+          <p:style>
+            <a:lnRef idx="2">
+              <a:schemeClr val="accent1">
+                <a:shade val="50000"/>
+              </a:schemeClr>
+            </a:lnRef>
+            <a:fillRef idx="1">
+              <a:schemeClr val="accent1"/>
+            </a:fillRef>
+            <a:effectRef idx="0">
+              <a:schemeClr val="accent1"/>
+            </a:effectRef>
+            <a:fontRef idx="minor">
+              <a:schemeClr val="lt1"/>
+            </a:fontRef>
+          </p:style>
+          <p:txBody>
+            <a:bodyPr rtlCol="0" anchor="ctr"/>
+            <a:lstStyle/>
+            <a:p>
+              <a:pPr algn="ctr"/>
+              <a:r>
+                <a:rPr lang="it-IT" sz="3600" dirty="0">
+                  <a:solidFill>
+                    <a:schemeClr val="tx2"/>
+                  </a:solidFill>
+                </a:rPr>
+                <a:t>Browser</a:t>
+              </a:r>
+            </a:p>
+          </p:txBody>
+        </p:sp>
+        <p:pic>
+          <p:nvPicPr>
+            <p:cNvPr id="28" name="Picture 2" descr="Risultati immagini per firefox png">
+              <a:extLst>
+                <a:ext uri="{FF2B5EF4-FFF2-40B4-BE49-F238E27FC236}">
+                  <a16:creationId xmlns:a16="http://schemas.microsoft.com/office/drawing/2014/main" id="{B961968E-63DA-418C-8746-C69DC6A4C898}"/>
+                </a:ext>
+              </a:extLst>
+            </p:cNvPr>
+            <p:cNvPicPr>
+              <a:picLocks noChangeAspect="1" noChangeArrowheads="1"/>
+            </p:cNvPicPr>
+            <p:nvPr/>
+          </p:nvPicPr>
+          <p:blipFill>
+            <a:blip r:embed="rId7">
+              <a:extLst>
+                <a:ext uri="{28A0092B-C50C-407E-A947-70E740481C1C}">
+                  <a14:useLocalDpi xmlns:a14="http://schemas.microsoft.com/office/drawing/2010/main" val="0"/>
+                </a:ext>
+              </a:extLst>
+            </a:blip>
+            <a:srcRect/>
+            <a:stretch>
+              <a:fillRect/>
+            </a:stretch>
+          </p:blipFill>
+          <p:spPr bwMode="auto">
+            <a:xfrm>
+              <a:off x="533134" y="3331799"/>
+              <a:ext cx="1158868" cy="1196537"/>
+            </a:xfrm>
+            <a:prstGeom prst="rect">
+              <a:avLst/>
+            </a:prstGeom>
+            <a:noFill/>
+            <a:extLst>
+              <a:ext uri="{909E8E84-426E-40DD-AFC4-6F175D3DCCD1}">
+                <a14:hiddenFill xmlns:a14="http://schemas.microsoft.com/office/drawing/2010/main">
+                  <a:solidFill>
+                    <a:srgbClr val="FFFFFF"/>
+                  </a:solidFill>
+                </a14:hiddenFill>
+              </a:ext>
+            </a:extLst>
+          </p:spPr>
+        </p:pic>
+      </p:grpSp>
+      <p:cxnSp>
+        <p:nvCxnSpPr>
+          <p:cNvPr id="32" name="Connettore 2 31">
+            <a:extLst>
+              <a:ext uri="{FF2B5EF4-FFF2-40B4-BE49-F238E27FC236}">
+                <a16:creationId xmlns:a16="http://schemas.microsoft.com/office/drawing/2014/main" id="{8B7EB74F-1550-471B-A235-AC2F1ABA0AF4}"/>
+              </a:ext>
+            </a:extLst>
+          </p:cNvPr>
+          <p:cNvCxnSpPr>
+            <a:cxnSpLocks/>
+          </p:cNvCxnSpPr>
+          <p:nvPr/>
+        </p:nvCxnSpPr>
+        <p:spPr>
+          <a:xfrm flipV="1">
+            <a:off x="2814221" y="3331799"/>
+            <a:ext cx="839900" cy="783056"/>
+          </a:xfrm>
+          <a:prstGeom prst="straightConnector1">
+            <a:avLst/>
+          </a:prstGeom>
+          <a:ln w="38100">
+            <a:solidFill>
+              <a:srgbClr val="FF0000"/>
+            </a:solidFill>
+            <a:headEnd type="triangle" w="med" len="med"/>
+            <a:tailEnd type="none" w="med" len="med"/>
+          </a:ln>
+        </p:spPr>
+        <p:style>
+          <a:lnRef idx="1">
+            <a:schemeClr val="accent1"/>
+          </a:lnRef>
+          <a:fillRef idx="0">
+            <a:schemeClr val="accent1"/>
+          </a:fillRef>
+          <a:effectRef idx="0">
+            <a:schemeClr val="accent1"/>
+          </a:effectRef>
+          <a:fontRef idx="minor">
+            <a:schemeClr val="tx1"/>
+          </a:fontRef>
+        </p:style>
+      </p:cxnSp>
+      <p:pic>
+        <p:nvPicPr>
+          <p:cNvPr id="34" name="Picture 4" descr="Risultati immagini per node logo">
+            <a:extLst>
+              <a:ext uri="{FF2B5EF4-FFF2-40B4-BE49-F238E27FC236}">
+                <a16:creationId xmlns:a16="http://schemas.microsoft.com/office/drawing/2014/main" id="{AF21A34C-23CA-4CC5-9F03-355499C88562}"/>
+              </a:ext>
+            </a:extLst>
+          </p:cNvPr>
+          <p:cNvPicPr>
+            <a:picLocks noChangeAspect="1" noChangeArrowheads="1"/>
+          </p:cNvPicPr>
+          <p:nvPr/>
+        </p:nvPicPr>
+        <p:blipFill>
+          <a:blip r:embed="rId8">
+            <a:extLst>
+              <a:ext uri="{28A0092B-C50C-407E-A947-70E740481C1C}">
+                <a14:useLocalDpi xmlns:a14="http://schemas.microsoft.com/office/drawing/2010/main" val="0"/>
+              </a:ext>
+            </a:extLst>
+          </a:blip>
+          <a:srcRect/>
+          <a:stretch>
+            <a:fillRect/>
+          </a:stretch>
+        </p:blipFill>
+        <p:spPr bwMode="auto">
+          <a:xfrm>
+            <a:off x="3303615" y="535752"/>
+            <a:ext cx="1755928" cy="1075669"/>
+          </a:xfrm>
+          <a:prstGeom prst="rect">
+            <a:avLst/>
+          </a:prstGeom>
+          <a:noFill/>
+          <a:extLst>
+            <a:ext uri="{909E8E84-426E-40DD-AFC4-6F175D3DCCD1}">
+              <a14:hiddenFill xmlns:a14="http://schemas.microsoft.com/office/drawing/2010/main">
+                <a:solidFill>
+                  <a:srgbClr val="FFFFFF"/>
+                </a:solidFill>
+              </a14:hiddenFill>
+            </a:ext>
+          </a:extLst>
+        </p:spPr>
+      </p:pic>
     </p:spTree>
     <p:extLst>
       <p:ext uri="{BB962C8B-B14F-4D97-AF65-F5344CB8AC3E}">
         <p14:creationId xmlns:p14="http://schemas.microsoft.com/office/powerpoint/2010/main" val="1076403188"/>
+      </p:ext>
+    </p:extLst>
+  </p:cSld>
+  <p:clrMapOvr>
+    <a:masterClrMapping/>
+  </p:clrMapOvr>
+</p:sld>
+</file>
+
+<file path=ppt/slides/slide14.xml><?xml version="1.0" encoding="utf-8"?>
+<p:sld xmlns:a="http://schemas.openxmlformats.org/drawingml/2006/main" xmlns:r="http://schemas.openxmlformats.org/officeDocument/2006/relationships" xmlns:p="http://schemas.openxmlformats.org/presentationml/2006/main">
+  <p:cSld>
+    <p:spTree>
+      <p:nvGrpSpPr>
+        <p:cNvPr id="1" name=""/>
+        <p:cNvGrpSpPr/>
+        <p:nvPr/>
+      </p:nvGrpSpPr>
+      <p:grpSpPr>
+        <a:xfrm>
+          <a:off x="0" y="0"/>
+          <a:ext cx="0" cy="0"/>
+          <a:chOff x="0" y="0"/>
+          <a:chExt cx="0" cy="0"/>
+        </a:xfrm>
+      </p:grpSpPr>
+      <p:sp>
+        <p:nvSpPr>
+          <p:cNvPr id="2" name="Rettangolo con angoli arrotondati 1">
+            <a:extLst>
+              <a:ext uri="{FF2B5EF4-FFF2-40B4-BE49-F238E27FC236}">
+                <a16:creationId xmlns:a16="http://schemas.microsoft.com/office/drawing/2014/main" id="{4CA35170-E1F1-43D1-B661-3E9255B7B3EF}"/>
+              </a:ext>
+            </a:extLst>
+          </p:cNvPr>
+          <p:cNvSpPr/>
+          <p:nvPr/>
+        </p:nvSpPr>
+        <p:spPr>
+          <a:xfrm>
+            <a:off x="3175130" y="678636"/>
+            <a:ext cx="3368615" cy="3722984"/>
+          </a:xfrm>
+          <a:prstGeom prst="roundRect">
+            <a:avLst/>
+          </a:prstGeom>
+          <a:solidFill>
+            <a:schemeClr val="bg1"/>
+          </a:solidFill>
+          <a:ln w="38100">
+            <a:solidFill>
+              <a:schemeClr val="accent5">
+                <a:lumMod val="75000"/>
+              </a:schemeClr>
+            </a:solidFill>
+          </a:ln>
+        </p:spPr>
+        <p:style>
+          <a:lnRef idx="2">
+            <a:schemeClr val="accent1">
+              <a:shade val="50000"/>
+            </a:schemeClr>
+          </a:lnRef>
+          <a:fillRef idx="1">
+            <a:schemeClr val="accent1"/>
+          </a:fillRef>
+          <a:effectRef idx="0">
+            <a:schemeClr val="accent1"/>
+          </a:effectRef>
+          <a:fontRef idx="minor">
+            <a:schemeClr val="lt1"/>
+          </a:fontRef>
+        </p:style>
+        <p:txBody>
+          <a:bodyPr rtlCol="0" anchor="ctr"/>
+          <a:lstStyle/>
+          <a:p>
+            <a:pPr algn="ctr"/>
+            <a:endParaRPr lang="it-IT" sz="3600" dirty="0">
+              <a:solidFill>
+                <a:schemeClr val="tx2"/>
+              </a:solidFill>
+            </a:endParaRPr>
+          </a:p>
+        </p:txBody>
+      </p:sp>
+      <p:grpSp>
+        <p:nvGrpSpPr>
+          <p:cNvPr id="12" name="Gruppo 11">
+            <a:extLst>
+              <a:ext uri="{FF2B5EF4-FFF2-40B4-BE49-F238E27FC236}">
+                <a16:creationId xmlns:a16="http://schemas.microsoft.com/office/drawing/2014/main" id="{43521005-01A3-4664-A9BB-7A58190AEE8E}"/>
+              </a:ext>
+            </a:extLst>
+          </p:cNvPr>
+          <p:cNvGrpSpPr/>
+          <p:nvPr/>
+        </p:nvGrpSpPr>
+        <p:grpSpPr>
+          <a:xfrm>
+            <a:off x="3314634" y="2302194"/>
+            <a:ext cx="1100880" cy="1388404"/>
+            <a:chOff x="585235" y="1897720"/>
+            <a:chExt cx="1100880" cy="1388404"/>
+          </a:xfrm>
+        </p:grpSpPr>
+        <p:sp>
+          <p:nvSpPr>
+            <p:cNvPr id="4" name="Rettangolo con angoli arrotondati 3">
+              <a:extLst>
+                <a:ext uri="{FF2B5EF4-FFF2-40B4-BE49-F238E27FC236}">
+                  <a16:creationId xmlns:a16="http://schemas.microsoft.com/office/drawing/2014/main" id="{0CF4BB3B-F5A1-4E52-972B-75F5F6A2A65E}"/>
+                </a:ext>
+              </a:extLst>
+            </p:cNvPr>
+            <p:cNvSpPr/>
+            <p:nvPr/>
+          </p:nvSpPr>
+          <p:spPr>
+            <a:xfrm>
+              <a:off x="585235" y="2315321"/>
+              <a:ext cx="1100880" cy="970803"/>
+            </a:xfrm>
+            <a:prstGeom prst="roundRect">
+              <a:avLst/>
+            </a:prstGeom>
+            <a:solidFill>
+              <a:schemeClr val="accent2">
+                <a:lumMod val="60000"/>
+                <a:lumOff val="40000"/>
+              </a:schemeClr>
+            </a:solidFill>
+            <a:ln w="38100">
+              <a:solidFill>
+                <a:schemeClr val="accent2">
+                  <a:lumMod val="75000"/>
+                </a:schemeClr>
+              </a:solidFill>
+            </a:ln>
+          </p:spPr>
+          <p:style>
+            <a:lnRef idx="2">
+              <a:schemeClr val="accent1">
+                <a:shade val="50000"/>
+              </a:schemeClr>
+            </a:lnRef>
+            <a:fillRef idx="1">
+              <a:schemeClr val="accent1"/>
+            </a:fillRef>
+            <a:effectRef idx="0">
+              <a:schemeClr val="accent1"/>
+            </a:effectRef>
+            <a:fontRef idx="minor">
+              <a:schemeClr val="lt1"/>
+            </a:fontRef>
+          </p:style>
+          <p:txBody>
+            <a:bodyPr rtlCol="0" anchor="ctr"/>
+            <a:lstStyle/>
+            <a:p>
+              <a:pPr algn="ctr"/>
+              <a:r>
+                <a:rPr lang="it-IT" sz="2400" dirty="0">
+                  <a:solidFill>
+                    <a:schemeClr val="tx2"/>
+                  </a:solidFill>
+                </a:rPr>
+                <a:t>Robot model</a:t>
+              </a:r>
+            </a:p>
+          </p:txBody>
+        </p:sp>
+        <p:pic>
+          <p:nvPicPr>
+            <p:cNvPr id="2052" name="Picture 4" descr="Risultati immagini per json logo">
+              <a:extLst>
+                <a:ext uri="{FF2B5EF4-FFF2-40B4-BE49-F238E27FC236}">
+                  <a16:creationId xmlns:a16="http://schemas.microsoft.com/office/drawing/2014/main" id="{9687118F-5E0B-4955-8C0E-6520E97B2362}"/>
+                </a:ext>
+              </a:extLst>
+            </p:cNvPr>
+            <p:cNvPicPr>
+              <a:picLocks noChangeAspect="1" noChangeArrowheads="1"/>
+            </p:cNvPicPr>
+            <p:nvPr/>
+          </p:nvPicPr>
+          <p:blipFill>
+            <a:blip r:embed="rId2">
+              <a:extLst>
+                <a:ext uri="{28A0092B-C50C-407E-A947-70E740481C1C}">
+                  <a14:useLocalDpi xmlns:a14="http://schemas.microsoft.com/office/drawing/2010/main" val="0"/>
+                </a:ext>
+              </a:extLst>
+            </a:blip>
+            <a:srcRect/>
+            <a:stretch>
+              <a:fillRect/>
+            </a:stretch>
+          </p:blipFill>
+          <p:spPr bwMode="auto">
+            <a:xfrm>
+              <a:off x="636614" y="1897720"/>
+              <a:ext cx="998121" cy="499061"/>
+            </a:xfrm>
+            <a:prstGeom prst="rect">
+              <a:avLst/>
+            </a:prstGeom>
+            <a:noFill/>
+            <a:extLst>
+              <a:ext uri="{909E8E84-426E-40DD-AFC4-6F175D3DCCD1}">
+                <a14:hiddenFill xmlns:a14="http://schemas.microsoft.com/office/drawing/2010/main">
+                  <a:solidFill>
+                    <a:srgbClr val="FFFFFF"/>
+                  </a:solidFill>
+                </a14:hiddenFill>
+              </a:ext>
+            </a:extLst>
+          </p:spPr>
+        </p:pic>
+      </p:grpSp>
+      <p:grpSp>
+        <p:nvGrpSpPr>
+          <p:cNvPr id="5" name="Gruppo 4">
+            <a:extLst>
+              <a:ext uri="{FF2B5EF4-FFF2-40B4-BE49-F238E27FC236}">
+                <a16:creationId xmlns:a16="http://schemas.microsoft.com/office/drawing/2014/main" id="{3FF0CE6F-1AB4-4E9C-8865-D3940AE9E079}"/>
+              </a:ext>
+            </a:extLst>
+          </p:cNvPr>
+          <p:cNvGrpSpPr/>
+          <p:nvPr/>
+        </p:nvGrpSpPr>
+        <p:grpSpPr>
+          <a:xfrm>
+            <a:off x="4305892" y="4900476"/>
+            <a:ext cx="1287040" cy="1295176"/>
+            <a:chOff x="3888213" y="4186342"/>
+            <a:chExt cx="2257244" cy="2319427"/>
+          </a:xfrm>
+        </p:grpSpPr>
+        <p:pic>
+          <p:nvPicPr>
+            <p:cNvPr id="2050" name="Picture 2" descr="Risultati immagini per database">
+              <a:extLst>
+                <a:ext uri="{FF2B5EF4-FFF2-40B4-BE49-F238E27FC236}">
+                  <a16:creationId xmlns:a16="http://schemas.microsoft.com/office/drawing/2014/main" id="{767A0126-2ED3-43ED-A0CA-56F90166EC6A}"/>
+                </a:ext>
+              </a:extLst>
+            </p:cNvPr>
+            <p:cNvPicPr>
+              <a:picLocks noChangeAspect="1" noChangeArrowheads="1"/>
+            </p:cNvPicPr>
+            <p:nvPr/>
+          </p:nvPicPr>
+          <p:blipFill>
+            <a:blip r:embed="rId3">
+              <a:extLst>
+                <a:ext uri="{28A0092B-C50C-407E-A947-70E740481C1C}">
+                  <a14:useLocalDpi xmlns:a14="http://schemas.microsoft.com/office/drawing/2010/main" val="0"/>
+                </a:ext>
+              </a:extLst>
+            </a:blip>
+            <a:srcRect/>
+            <a:stretch>
+              <a:fillRect/>
+            </a:stretch>
+          </p:blipFill>
+          <p:spPr bwMode="auto">
+            <a:xfrm>
+              <a:off x="3888213" y="4362988"/>
+              <a:ext cx="1940903" cy="2142781"/>
+            </a:xfrm>
+            <a:prstGeom prst="rect">
+              <a:avLst/>
+            </a:prstGeom>
+            <a:noFill/>
+            <a:extLst>
+              <a:ext uri="{909E8E84-426E-40DD-AFC4-6F175D3DCCD1}">
+                <a14:hiddenFill xmlns:a14="http://schemas.microsoft.com/office/drawing/2010/main">
+                  <a:solidFill>
+                    <a:srgbClr val="FFFFFF"/>
+                  </a:solidFill>
+                </a14:hiddenFill>
+              </a:ext>
+            </a:extLst>
+          </p:spPr>
+        </p:pic>
+        <p:pic>
+          <p:nvPicPr>
+            <p:cNvPr id="2056" name="Picture 8" descr="Risultati immagini per mongodb png">
+              <a:extLst>
+                <a:ext uri="{FF2B5EF4-FFF2-40B4-BE49-F238E27FC236}">
+                  <a16:creationId xmlns:a16="http://schemas.microsoft.com/office/drawing/2014/main" id="{1586B79B-AEA8-41CC-B99E-E1891BA864D7}"/>
+                </a:ext>
+              </a:extLst>
+            </p:cNvPr>
+            <p:cNvPicPr>
+              <a:picLocks noChangeAspect="1" noChangeArrowheads="1"/>
+            </p:cNvPicPr>
+            <p:nvPr/>
+          </p:nvPicPr>
+          <p:blipFill>
+            <a:blip r:embed="rId4">
+              <a:extLst>
+                <a:ext uri="{28A0092B-C50C-407E-A947-70E740481C1C}">
+                  <a14:useLocalDpi xmlns:a14="http://schemas.microsoft.com/office/drawing/2010/main" val="0"/>
+                </a:ext>
+              </a:extLst>
+            </a:blip>
+            <a:srcRect/>
+            <a:stretch>
+              <a:fillRect/>
+            </a:stretch>
+          </p:blipFill>
+          <p:spPr bwMode="auto">
+            <a:xfrm>
+              <a:off x="5316782" y="4186342"/>
+              <a:ext cx="828675" cy="885721"/>
+            </a:xfrm>
+            <a:prstGeom prst="rect">
+              <a:avLst/>
+            </a:prstGeom>
+            <a:noFill/>
+            <a:extLst>
+              <a:ext uri="{909E8E84-426E-40DD-AFC4-6F175D3DCCD1}">
+                <a14:hiddenFill xmlns:a14="http://schemas.microsoft.com/office/drawing/2010/main">
+                  <a:solidFill>
+                    <a:srgbClr val="FFFFFF"/>
+                  </a:solidFill>
+                </a14:hiddenFill>
+              </a:ext>
+            </a:extLst>
+          </p:spPr>
+        </p:pic>
+      </p:grpSp>
+      <p:sp>
+        <p:nvSpPr>
+          <p:cNvPr id="3" name="CasellaDiTesto 2">
+            <a:extLst>
+              <a:ext uri="{FF2B5EF4-FFF2-40B4-BE49-F238E27FC236}">
+                <a16:creationId xmlns:a16="http://schemas.microsoft.com/office/drawing/2014/main" id="{6ED1BD23-9C07-4A47-A0DD-7FDDC00D41AB}"/>
+              </a:ext>
+            </a:extLst>
+          </p:cNvPr>
+          <p:cNvSpPr txBox="1"/>
+          <p:nvPr/>
+        </p:nvSpPr>
+        <p:spPr>
+          <a:xfrm>
+            <a:off x="4251799" y="6121212"/>
+            <a:ext cx="1211507" cy="369332"/>
+          </a:xfrm>
+          <a:prstGeom prst="rect">
+            <a:avLst/>
+          </a:prstGeom>
+          <a:noFill/>
+        </p:spPr>
+        <p:txBody>
+          <a:bodyPr wrap="square" rtlCol="0">
+            <a:spAutoFit/>
+          </a:bodyPr>
+          <a:lstStyle/>
+          <a:p>
+            <a:r>
+              <a:rPr lang="it-IT" dirty="0"/>
+              <a:t>MongoDB </a:t>
+            </a:r>
+          </a:p>
+        </p:txBody>
+      </p:sp>
+      <p:sp>
+        <p:nvSpPr>
+          <p:cNvPr id="11" name="Rettangolo con angoli arrotondati 10">
+            <a:extLst>
+              <a:ext uri="{FF2B5EF4-FFF2-40B4-BE49-F238E27FC236}">
+                <a16:creationId xmlns:a16="http://schemas.microsoft.com/office/drawing/2014/main" id="{E949EEA1-FC18-48E5-8807-5482CCBE6121}"/>
+              </a:ext>
+            </a:extLst>
+          </p:cNvPr>
+          <p:cNvSpPr/>
+          <p:nvPr/>
+        </p:nvSpPr>
+        <p:spPr>
+          <a:xfrm>
+            <a:off x="9548341" y="678636"/>
+            <a:ext cx="2573583" cy="2386379"/>
+          </a:xfrm>
+          <a:prstGeom prst="roundRect">
+            <a:avLst/>
+          </a:prstGeom>
+          <a:solidFill>
+            <a:schemeClr val="accent6">
+              <a:lumMod val="40000"/>
+              <a:lumOff val="60000"/>
+            </a:schemeClr>
+          </a:solidFill>
+          <a:ln w="38100">
+            <a:solidFill>
+              <a:schemeClr val="accent6"/>
+            </a:solidFill>
+          </a:ln>
+        </p:spPr>
+        <p:style>
+          <a:lnRef idx="2">
+            <a:schemeClr val="accent1">
+              <a:shade val="50000"/>
+            </a:schemeClr>
+          </a:lnRef>
+          <a:fillRef idx="1">
+            <a:schemeClr val="accent1"/>
+          </a:fillRef>
+          <a:effectRef idx="0">
+            <a:schemeClr val="accent1"/>
+          </a:effectRef>
+          <a:fontRef idx="minor">
+            <a:schemeClr val="lt1"/>
+          </a:fontRef>
+        </p:style>
+        <p:txBody>
+          <a:bodyPr rtlCol="0" anchor="ctr"/>
+          <a:lstStyle/>
+          <a:p>
+            <a:pPr algn="ctr"/>
+            <a:r>
+              <a:rPr lang="it-IT" sz="3600" dirty="0">
+                <a:solidFill>
+                  <a:schemeClr val="tx2"/>
+                </a:solidFill>
+              </a:rPr>
+              <a:t>System</a:t>
+            </a:r>
+          </a:p>
+        </p:txBody>
+      </p:sp>
+      <p:cxnSp>
+        <p:nvCxnSpPr>
+          <p:cNvPr id="10" name="Connettore 2 9">
+            <a:extLst>
+              <a:ext uri="{FF2B5EF4-FFF2-40B4-BE49-F238E27FC236}">
+                <a16:creationId xmlns:a16="http://schemas.microsoft.com/office/drawing/2014/main" id="{897E7060-8D14-4361-A310-6A2E40867CEA}"/>
+              </a:ext>
+            </a:extLst>
+          </p:cNvPr>
+          <p:cNvCxnSpPr>
+            <a:cxnSpLocks/>
+            <a:stCxn id="4" idx="3"/>
+            <a:endCxn id="34" idx="1"/>
+          </p:cNvCxnSpPr>
+          <p:nvPr/>
+        </p:nvCxnSpPr>
+        <p:spPr>
+          <a:xfrm>
+            <a:off x="4415514" y="3205197"/>
+            <a:ext cx="380764" cy="2027"/>
+          </a:xfrm>
+          <a:prstGeom prst="straightConnector1">
+            <a:avLst/>
+          </a:prstGeom>
+          <a:ln w="38100">
+            <a:solidFill>
+              <a:srgbClr val="FF0000"/>
+            </a:solidFill>
+            <a:headEnd type="triangle"/>
+            <a:tailEnd type="triangle"/>
+          </a:ln>
+        </p:spPr>
+        <p:style>
+          <a:lnRef idx="1">
+            <a:schemeClr val="accent1"/>
+          </a:lnRef>
+          <a:fillRef idx="0">
+            <a:schemeClr val="accent1"/>
+          </a:fillRef>
+          <a:effectRef idx="0">
+            <a:schemeClr val="accent1"/>
+          </a:effectRef>
+          <a:fontRef idx="minor">
+            <a:schemeClr val="tx1"/>
+          </a:fontRef>
+        </p:style>
+      </p:cxnSp>
+      <p:cxnSp>
+        <p:nvCxnSpPr>
+          <p:cNvPr id="17" name="Connettore 2 16">
+            <a:extLst>
+              <a:ext uri="{FF2B5EF4-FFF2-40B4-BE49-F238E27FC236}">
+                <a16:creationId xmlns:a16="http://schemas.microsoft.com/office/drawing/2014/main" id="{647C59B2-1F5D-4C86-BECC-9005526ADC75}"/>
+              </a:ext>
+            </a:extLst>
+          </p:cNvPr>
+          <p:cNvCxnSpPr>
+            <a:cxnSpLocks/>
+            <a:stCxn id="2050" idx="0"/>
+            <a:endCxn id="2" idx="2"/>
+          </p:cNvCxnSpPr>
+          <p:nvPr/>
+        </p:nvCxnSpPr>
+        <p:spPr>
+          <a:xfrm flipV="1">
+            <a:off x="4859226" y="4401620"/>
+            <a:ext cx="212" cy="597496"/>
+          </a:xfrm>
+          <a:prstGeom prst="straightConnector1">
+            <a:avLst/>
+          </a:prstGeom>
+          <a:ln w="38100">
+            <a:solidFill>
+              <a:srgbClr val="FF0000"/>
+            </a:solidFill>
+            <a:headEnd type="triangle"/>
+            <a:tailEnd type="triangle"/>
+          </a:ln>
+        </p:spPr>
+        <p:style>
+          <a:lnRef idx="1">
+            <a:schemeClr val="accent1"/>
+          </a:lnRef>
+          <a:fillRef idx="0">
+            <a:schemeClr val="accent1"/>
+          </a:fillRef>
+          <a:effectRef idx="0">
+            <a:schemeClr val="accent1"/>
+          </a:effectRef>
+          <a:fontRef idx="minor">
+            <a:schemeClr val="tx1"/>
+          </a:fontRef>
+        </p:style>
+      </p:cxnSp>
+      <p:sp>
+        <p:nvSpPr>
+          <p:cNvPr id="15" name="CasellaDiTesto 14">
+            <a:extLst>
+              <a:ext uri="{FF2B5EF4-FFF2-40B4-BE49-F238E27FC236}">
+                <a16:creationId xmlns:a16="http://schemas.microsoft.com/office/drawing/2014/main" id="{9068B498-3A4D-4320-8309-E78305FD60B7}"/>
+              </a:ext>
+            </a:extLst>
+          </p:cNvPr>
+          <p:cNvSpPr txBox="1"/>
+          <p:nvPr/>
+        </p:nvSpPr>
+        <p:spPr>
+          <a:xfrm rot="20538984">
+            <a:off x="3631514" y="3893855"/>
+            <a:ext cx="1291740" cy="369332"/>
+          </a:xfrm>
+          <a:prstGeom prst="rect">
+            <a:avLst/>
+          </a:prstGeom>
+          <a:noFill/>
+        </p:spPr>
+        <p:txBody>
+          <a:bodyPr wrap="square" rtlCol="0">
+            <a:spAutoFit/>
+          </a:bodyPr>
+          <a:lstStyle/>
+          <a:p>
+            <a:r>
+              <a:rPr lang="it-IT" dirty="0"/>
+              <a:t>robot state</a:t>
+            </a:r>
+          </a:p>
+        </p:txBody>
+      </p:sp>
+      <p:grpSp>
+        <p:nvGrpSpPr>
+          <p:cNvPr id="19" name="Gruppo 18">
+            <a:extLst>
+              <a:ext uri="{FF2B5EF4-FFF2-40B4-BE49-F238E27FC236}">
+                <a16:creationId xmlns:a16="http://schemas.microsoft.com/office/drawing/2014/main" id="{D6E0105D-25FC-48A0-BAFA-9720D4796EBE}"/>
+              </a:ext>
+            </a:extLst>
+          </p:cNvPr>
+          <p:cNvGrpSpPr/>
+          <p:nvPr/>
+        </p:nvGrpSpPr>
+        <p:grpSpPr>
+          <a:xfrm>
+            <a:off x="3765209" y="4485402"/>
+            <a:ext cx="1033836" cy="454285"/>
+            <a:chOff x="3363751" y="4795302"/>
+            <a:chExt cx="1033836" cy="454285"/>
+          </a:xfrm>
+        </p:grpSpPr>
+        <p:sp>
+          <p:nvSpPr>
+            <p:cNvPr id="16" name="CasellaDiTesto 15">
+              <a:extLst>
+                <a:ext uri="{FF2B5EF4-FFF2-40B4-BE49-F238E27FC236}">
+                  <a16:creationId xmlns:a16="http://schemas.microsoft.com/office/drawing/2014/main" id="{E2A87A62-B019-49FF-8628-0A78EF7037CC}"/>
+                </a:ext>
+              </a:extLst>
+            </p:cNvPr>
+            <p:cNvSpPr txBox="1"/>
+            <p:nvPr/>
+          </p:nvSpPr>
+          <p:spPr>
+            <a:xfrm>
+              <a:off x="3363751" y="4838236"/>
+              <a:ext cx="823179" cy="369332"/>
+            </a:xfrm>
+            <a:prstGeom prst="rect">
+              <a:avLst/>
+            </a:prstGeom>
+            <a:noFill/>
+          </p:spPr>
+          <p:txBody>
+            <a:bodyPr wrap="square" rtlCol="0">
+              <a:spAutoFit/>
+            </a:bodyPr>
+            <a:lstStyle/>
+            <a:p>
+              <a:r>
+                <a:rPr lang="it-IT" dirty="0"/>
+                <a:t>users</a:t>
+              </a:r>
+            </a:p>
+          </p:txBody>
+        </p:sp>
+        <p:pic>
+          <p:nvPicPr>
+            <p:cNvPr id="2058" name="Picture 10" descr="Risultati immagini per utente">
+              <a:extLst>
+                <a:ext uri="{FF2B5EF4-FFF2-40B4-BE49-F238E27FC236}">
+                  <a16:creationId xmlns:a16="http://schemas.microsoft.com/office/drawing/2014/main" id="{4520DDAC-A384-4FD2-8241-DC17AF042546}"/>
+                </a:ext>
+              </a:extLst>
+            </p:cNvPr>
+            <p:cNvPicPr>
+              <a:picLocks noChangeAspect="1" noChangeArrowheads="1"/>
+            </p:cNvPicPr>
+            <p:nvPr/>
+          </p:nvPicPr>
+          <p:blipFill>
+            <a:blip r:embed="rId5">
+              <a:extLst>
+                <a:ext uri="{28A0092B-C50C-407E-A947-70E740481C1C}">
+                  <a14:useLocalDpi xmlns:a14="http://schemas.microsoft.com/office/drawing/2010/main" val="0"/>
+                </a:ext>
+              </a:extLst>
+            </a:blip>
+            <a:srcRect/>
+            <a:stretch>
+              <a:fillRect/>
+            </a:stretch>
+          </p:blipFill>
+          <p:spPr bwMode="auto">
+            <a:xfrm>
+              <a:off x="3943302" y="4795302"/>
+              <a:ext cx="454285" cy="454285"/>
+            </a:xfrm>
+            <a:prstGeom prst="rect">
+              <a:avLst/>
+            </a:prstGeom>
+            <a:noFill/>
+            <a:extLst>
+              <a:ext uri="{909E8E84-426E-40DD-AFC4-6F175D3DCCD1}">
+                <a14:hiddenFill xmlns:a14="http://schemas.microsoft.com/office/drawing/2010/main">
+                  <a:solidFill>
+                    <a:srgbClr val="FFFFFF"/>
+                  </a:solidFill>
+                </a14:hiddenFill>
+              </a:ext>
+            </a:extLst>
+          </p:spPr>
+        </p:pic>
+      </p:grpSp>
+      <p:cxnSp>
+        <p:nvCxnSpPr>
+          <p:cNvPr id="24" name="Connettore 2 23">
+            <a:extLst>
+              <a:ext uri="{FF2B5EF4-FFF2-40B4-BE49-F238E27FC236}">
+                <a16:creationId xmlns:a16="http://schemas.microsoft.com/office/drawing/2014/main" id="{A956FD39-0764-4B94-B1DD-BDECB593C7EE}"/>
+              </a:ext>
+            </a:extLst>
+          </p:cNvPr>
+          <p:cNvCxnSpPr>
+            <a:cxnSpLocks/>
+            <a:endCxn id="11" idx="1"/>
+          </p:cNvCxnSpPr>
+          <p:nvPr/>
+        </p:nvCxnSpPr>
+        <p:spPr>
+          <a:xfrm flipV="1">
+            <a:off x="6399142" y="1871826"/>
+            <a:ext cx="3149199" cy="948607"/>
+          </a:xfrm>
+          <a:prstGeom prst="straightConnector1">
+            <a:avLst/>
+          </a:prstGeom>
+          <a:ln w="38100">
+            <a:solidFill>
+              <a:srgbClr val="FF0000"/>
+            </a:solidFill>
+            <a:headEnd type="none" w="med" len="med"/>
+            <a:tailEnd type="triangle" w="med" len="med"/>
+          </a:ln>
+        </p:spPr>
+        <p:style>
+          <a:lnRef idx="1">
+            <a:schemeClr val="accent1"/>
+          </a:lnRef>
+          <a:fillRef idx="0">
+            <a:schemeClr val="accent1"/>
+          </a:fillRef>
+          <a:effectRef idx="0">
+            <a:schemeClr val="accent1"/>
+          </a:effectRef>
+          <a:fontRef idx="minor">
+            <a:schemeClr val="tx1"/>
+          </a:fontRef>
+        </p:style>
+      </p:cxnSp>
+      <p:sp>
+        <p:nvSpPr>
+          <p:cNvPr id="6" name="CasellaDiTesto 5">
+            <a:extLst>
+              <a:ext uri="{FF2B5EF4-FFF2-40B4-BE49-F238E27FC236}">
+                <a16:creationId xmlns:a16="http://schemas.microsoft.com/office/drawing/2014/main" id="{A42652FB-B83C-403A-B126-576A4BBB72DA}"/>
+              </a:ext>
+            </a:extLst>
+          </p:cNvPr>
+          <p:cNvSpPr txBox="1"/>
+          <p:nvPr/>
+        </p:nvSpPr>
+        <p:spPr>
+          <a:xfrm>
+            <a:off x="6314597" y="548808"/>
+            <a:ext cx="3603533" cy="369332"/>
+          </a:xfrm>
+          <a:prstGeom prst="rect">
+            <a:avLst/>
+          </a:prstGeom>
+          <a:noFill/>
+        </p:spPr>
+        <p:txBody>
+          <a:bodyPr wrap="square" rtlCol="0">
+            <a:spAutoFit/>
+          </a:bodyPr>
+          <a:lstStyle/>
+          <a:p>
+            <a:r>
+              <a:rPr lang="it-IT" dirty="0"/>
+              <a:t>ctrlEvent : ctrlEvent(robot,r1,CMD)</a:t>
+            </a:r>
+          </a:p>
+        </p:txBody>
+      </p:sp>
+      <p:sp>
+        <p:nvSpPr>
+          <p:cNvPr id="7" name="Rettangolo con angoli arrotondati 6">
+            <a:extLst>
+              <a:ext uri="{FF2B5EF4-FFF2-40B4-BE49-F238E27FC236}">
+                <a16:creationId xmlns:a16="http://schemas.microsoft.com/office/drawing/2014/main" id="{CF053B30-A2B1-4912-804D-5346F770B255}"/>
+              </a:ext>
+            </a:extLst>
+          </p:cNvPr>
+          <p:cNvSpPr/>
+          <p:nvPr/>
+        </p:nvSpPr>
+        <p:spPr>
+          <a:xfrm>
+            <a:off x="8526065" y="4037567"/>
+            <a:ext cx="2189284" cy="1942563"/>
+          </a:xfrm>
+          <a:prstGeom prst="roundRect">
+            <a:avLst/>
+          </a:prstGeom>
+          <a:solidFill>
+            <a:srgbClr val="FAF472"/>
+          </a:solidFill>
+          <a:ln w="38100">
+            <a:solidFill>
+              <a:srgbClr val="F39B0D"/>
+            </a:solidFill>
+          </a:ln>
+        </p:spPr>
+        <p:style>
+          <a:lnRef idx="2">
+            <a:schemeClr val="accent1">
+              <a:shade val="50000"/>
+            </a:schemeClr>
+          </a:lnRef>
+          <a:fillRef idx="1">
+            <a:schemeClr val="accent1"/>
+          </a:fillRef>
+          <a:effectRef idx="0">
+            <a:schemeClr val="accent1"/>
+          </a:effectRef>
+          <a:fontRef idx="minor">
+            <a:schemeClr val="lt1"/>
+          </a:fontRef>
+        </p:style>
+        <p:txBody>
+          <a:bodyPr rtlCol="0" anchor="ctr"/>
+          <a:lstStyle/>
+          <a:p>
+            <a:pPr algn="ctr"/>
+            <a:r>
+              <a:rPr lang="it-IT" sz="3600" dirty="0">
+                <a:solidFill>
+                  <a:schemeClr val="tx2"/>
+                </a:solidFill>
+              </a:rPr>
+              <a:t>MQTT</a:t>
+            </a:r>
+            <a:endParaRPr lang="it-IT" dirty="0">
+              <a:solidFill>
+                <a:schemeClr val="tx2"/>
+              </a:solidFill>
+            </a:endParaRPr>
+          </a:p>
+        </p:txBody>
+      </p:sp>
+      <p:cxnSp>
+        <p:nvCxnSpPr>
+          <p:cNvPr id="21" name="Connettore 2 20">
+            <a:extLst>
+              <a:ext uri="{FF2B5EF4-FFF2-40B4-BE49-F238E27FC236}">
+                <a16:creationId xmlns:a16="http://schemas.microsoft.com/office/drawing/2014/main" id="{BC9CD8FD-69C0-414F-8D96-25DA21472B3D}"/>
+              </a:ext>
+            </a:extLst>
+          </p:cNvPr>
+          <p:cNvCxnSpPr>
+            <a:cxnSpLocks/>
+          </p:cNvCxnSpPr>
+          <p:nvPr/>
+        </p:nvCxnSpPr>
+        <p:spPr>
+          <a:xfrm>
+            <a:off x="6415396" y="3033047"/>
+            <a:ext cx="2157180" cy="1162736"/>
+          </a:xfrm>
+          <a:prstGeom prst="straightConnector1">
+            <a:avLst/>
+          </a:prstGeom>
+          <a:ln w="38100">
+            <a:solidFill>
+              <a:srgbClr val="FF0000"/>
+            </a:solidFill>
+            <a:headEnd type="none" w="med" len="med"/>
+            <a:tailEnd type="triangle" w="med" len="med"/>
+          </a:ln>
+        </p:spPr>
+        <p:style>
+          <a:lnRef idx="1">
+            <a:schemeClr val="accent1"/>
+          </a:lnRef>
+          <a:fillRef idx="0">
+            <a:schemeClr val="accent1"/>
+          </a:fillRef>
+          <a:effectRef idx="0">
+            <a:schemeClr val="accent1"/>
+          </a:effectRef>
+          <a:fontRef idx="minor">
+            <a:schemeClr val="tx1"/>
+          </a:fontRef>
+        </p:style>
+      </p:cxnSp>
+      <p:cxnSp>
+        <p:nvCxnSpPr>
+          <p:cNvPr id="25" name="Connettore 2 24">
+            <a:extLst>
+              <a:ext uri="{FF2B5EF4-FFF2-40B4-BE49-F238E27FC236}">
+                <a16:creationId xmlns:a16="http://schemas.microsoft.com/office/drawing/2014/main" id="{6F72EC06-8107-4E98-84F9-922FE942B007}"/>
+              </a:ext>
+            </a:extLst>
+          </p:cNvPr>
+          <p:cNvCxnSpPr>
+            <a:cxnSpLocks/>
+            <a:endCxn id="7" idx="0"/>
+          </p:cNvCxnSpPr>
+          <p:nvPr/>
+        </p:nvCxnSpPr>
+        <p:spPr>
+          <a:xfrm flipH="1">
+            <a:off x="9620707" y="3065015"/>
+            <a:ext cx="389976" cy="972552"/>
+          </a:xfrm>
+          <a:prstGeom prst="straightConnector1">
+            <a:avLst/>
+          </a:prstGeom>
+          <a:ln w="38100">
+            <a:solidFill>
+              <a:srgbClr val="FF0000"/>
+            </a:solidFill>
+            <a:headEnd type="triangle" w="med" len="med"/>
+            <a:tailEnd type="triangle" w="med" len="med"/>
+          </a:ln>
+        </p:spPr>
+        <p:style>
+          <a:lnRef idx="1">
+            <a:schemeClr val="accent1"/>
+          </a:lnRef>
+          <a:fillRef idx="0">
+            <a:schemeClr val="accent1"/>
+          </a:fillRef>
+          <a:effectRef idx="0">
+            <a:schemeClr val="accent1"/>
+          </a:effectRef>
+          <a:fontRef idx="minor">
+            <a:schemeClr val="tx1"/>
+          </a:fontRef>
+        </p:style>
+      </p:cxnSp>
+      <p:sp>
+        <p:nvSpPr>
+          <p:cNvPr id="31" name="CasellaDiTesto 30">
+            <a:extLst>
+              <a:ext uri="{FF2B5EF4-FFF2-40B4-BE49-F238E27FC236}">
+                <a16:creationId xmlns:a16="http://schemas.microsoft.com/office/drawing/2014/main" id="{6D7C24F6-03D8-4A23-9333-00E5D292722D}"/>
+              </a:ext>
+            </a:extLst>
+          </p:cNvPr>
+          <p:cNvSpPr txBox="1"/>
+          <p:nvPr/>
+        </p:nvSpPr>
+        <p:spPr>
+          <a:xfrm rot="20541825">
+            <a:off x="6723253" y="1713482"/>
+            <a:ext cx="2286548" cy="646331"/>
+          </a:xfrm>
+          <a:prstGeom prst="rect">
+            <a:avLst/>
+          </a:prstGeom>
+          <a:noFill/>
+        </p:spPr>
+        <p:txBody>
+          <a:bodyPr wrap="square" rtlCol="0">
+            <a:spAutoFit/>
+          </a:bodyPr>
+          <a:lstStyle/>
+          <a:p>
+            <a:r>
+              <a:rPr lang="it-IT" dirty="0"/>
+              <a:t>alarm | usercmd : usercmd(CMD)</a:t>
+            </a:r>
+          </a:p>
+        </p:txBody>
+      </p:sp>
+      <p:cxnSp>
+        <p:nvCxnSpPr>
+          <p:cNvPr id="33" name="Connettore 2 32">
+            <a:extLst>
+              <a:ext uri="{FF2B5EF4-FFF2-40B4-BE49-F238E27FC236}">
+                <a16:creationId xmlns:a16="http://schemas.microsoft.com/office/drawing/2014/main" id="{EA4CDF94-C3FF-4AF5-9827-D827D0B13EF1}"/>
+              </a:ext>
+            </a:extLst>
+          </p:cNvPr>
+          <p:cNvCxnSpPr>
+            <a:cxnSpLocks/>
+            <a:stCxn id="34" idx="3"/>
+          </p:cNvCxnSpPr>
+          <p:nvPr/>
+        </p:nvCxnSpPr>
+        <p:spPr>
+          <a:xfrm>
+            <a:off x="6399142" y="3207224"/>
+            <a:ext cx="2137538" cy="1194396"/>
+          </a:xfrm>
+          <a:prstGeom prst="straightConnector1">
+            <a:avLst/>
+          </a:prstGeom>
+          <a:ln w="38100">
+            <a:solidFill>
+              <a:srgbClr val="FF0000"/>
+            </a:solidFill>
+            <a:headEnd type="triangle" w="med" len="med"/>
+            <a:tailEnd type="none" w="med" len="med"/>
+          </a:ln>
+        </p:spPr>
+        <p:style>
+          <a:lnRef idx="1">
+            <a:schemeClr val="accent1"/>
+          </a:lnRef>
+          <a:fillRef idx="0">
+            <a:schemeClr val="accent1"/>
+          </a:fillRef>
+          <a:effectRef idx="0">
+            <a:schemeClr val="accent1"/>
+          </a:effectRef>
+          <a:fontRef idx="minor">
+            <a:schemeClr val="tx1"/>
+          </a:fontRef>
+        </p:style>
+      </p:cxnSp>
+      <p:pic>
+        <p:nvPicPr>
+          <p:cNvPr id="1026" name="Picture 2" descr="Risultati immagini per mqtt logo png">
+            <a:extLst>
+              <a:ext uri="{FF2B5EF4-FFF2-40B4-BE49-F238E27FC236}">
+                <a16:creationId xmlns:a16="http://schemas.microsoft.com/office/drawing/2014/main" id="{DF3D5CAC-ECC6-4ADB-9577-35A95BC4CD8C}"/>
+              </a:ext>
+            </a:extLst>
+          </p:cNvPr>
+          <p:cNvPicPr>
+            <a:picLocks noChangeAspect="1" noChangeArrowheads="1"/>
+          </p:cNvPicPr>
+          <p:nvPr/>
+        </p:nvPicPr>
+        <p:blipFill>
+          <a:blip r:embed="rId6">
+            <a:extLst>
+              <a:ext uri="{28A0092B-C50C-407E-A947-70E740481C1C}">
+                <a14:useLocalDpi xmlns:a14="http://schemas.microsoft.com/office/drawing/2010/main" val="0"/>
+              </a:ext>
+            </a:extLst>
+          </a:blip>
+          <a:srcRect/>
+          <a:stretch>
+            <a:fillRect/>
+          </a:stretch>
+        </p:blipFill>
+        <p:spPr bwMode="auto">
+          <a:xfrm>
+            <a:off x="10010683" y="5337517"/>
+            <a:ext cx="986383" cy="971587"/>
+          </a:xfrm>
+          <a:prstGeom prst="rect">
+            <a:avLst/>
+          </a:prstGeom>
+          <a:noFill/>
+          <a:extLst>
+            <a:ext uri="{909E8E84-426E-40DD-AFC4-6F175D3DCCD1}">
+              <a14:hiddenFill xmlns:a14="http://schemas.microsoft.com/office/drawing/2010/main">
+                <a:solidFill>
+                  <a:srgbClr val="FFFFFF"/>
+                </a:solidFill>
+              </a14:hiddenFill>
+            </a:ext>
+          </a:extLst>
+        </p:spPr>
+      </p:pic>
+      <p:sp>
+        <p:nvSpPr>
+          <p:cNvPr id="30" name="CasellaDiTesto 29">
+            <a:extLst>
+              <a:ext uri="{FF2B5EF4-FFF2-40B4-BE49-F238E27FC236}">
+                <a16:creationId xmlns:a16="http://schemas.microsoft.com/office/drawing/2014/main" id="{8C2FB992-193E-4898-9A77-3859D396020F}"/>
+              </a:ext>
+            </a:extLst>
+          </p:cNvPr>
+          <p:cNvSpPr txBox="1"/>
+          <p:nvPr/>
+        </p:nvSpPr>
+        <p:spPr>
+          <a:xfrm>
+            <a:off x="7120313" y="1243993"/>
+            <a:ext cx="747346" cy="769441"/>
+          </a:xfrm>
+          <a:prstGeom prst="rect">
+            <a:avLst/>
+          </a:prstGeom>
+          <a:noFill/>
+        </p:spPr>
+        <p:txBody>
+          <a:bodyPr wrap="square" rtlCol="0">
+            <a:spAutoFit/>
+          </a:bodyPr>
+          <a:lstStyle/>
+          <a:p>
+            <a:r>
+              <a:rPr lang="it-IT" sz="4400" dirty="0">
+                <a:solidFill>
+                  <a:srgbClr val="FF0000"/>
+                </a:solidFill>
+              </a:rPr>
+              <a:t>a)</a:t>
+            </a:r>
+          </a:p>
+        </p:txBody>
+      </p:sp>
+      <p:sp>
+        <p:nvSpPr>
+          <p:cNvPr id="38" name="CasellaDiTesto 37">
+            <a:extLst>
+              <a:ext uri="{FF2B5EF4-FFF2-40B4-BE49-F238E27FC236}">
+                <a16:creationId xmlns:a16="http://schemas.microsoft.com/office/drawing/2014/main" id="{B8EDAE9C-C508-438D-8E34-2615048BB58E}"/>
+              </a:ext>
+            </a:extLst>
+          </p:cNvPr>
+          <p:cNvSpPr txBox="1"/>
+          <p:nvPr/>
+        </p:nvSpPr>
+        <p:spPr>
+          <a:xfrm>
+            <a:off x="6885733" y="3779457"/>
+            <a:ext cx="747346" cy="769441"/>
+          </a:xfrm>
+          <a:prstGeom prst="rect">
+            <a:avLst/>
+          </a:prstGeom>
+          <a:noFill/>
+        </p:spPr>
+        <p:txBody>
+          <a:bodyPr wrap="square" rtlCol="0">
+            <a:spAutoFit/>
+          </a:bodyPr>
+          <a:lstStyle/>
+          <a:p>
+            <a:r>
+              <a:rPr lang="it-IT" sz="4400" dirty="0">
+                <a:solidFill>
+                  <a:srgbClr val="FF0000"/>
+                </a:solidFill>
+              </a:rPr>
+              <a:t>b)</a:t>
+            </a:r>
+          </a:p>
+        </p:txBody>
+      </p:sp>
+      <p:sp>
+        <p:nvSpPr>
+          <p:cNvPr id="14" name="Ovale 13">
+            <a:extLst>
+              <a:ext uri="{FF2B5EF4-FFF2-40B4-BE49-F238E27FC236}">
+                <a16:creationId xmlns:a16="http://schemas.microsoft.com/office/drawing/2014/main" id="{6797D0E0-702C-4FC4-9823-89A0C375C6F2}"/>
+              </a:ext>
+            </a:extLst>
+          </p:cNvPr>
+          <p:cNvSpPr/>
+          <p:nvPr/>
+        </p:nvSpPr>
+        <p:spPr>
+          <a:xfrm>
+            <a:off x="4847016" y="743683"/>
+            <a:ext cx="1494215" cy="1396033"/>
+          </a:xfrm>
+          <a:prstGeom prst="ellipse">
+            <a:avLst/>
+          </a:prstGeom>
+          <a:solidFill>
+            <a:schemeClr val="accent1">
+              <a:lumMod val="40000"/>
+              <a:lumOff val="60000"/>
+            </a:schemeClr>
+          </a:solidFill>
+          <a:ln w="38100"/>
+        </p:spPr>
+        <p:style>
+          <a:lnRef idx="2">
+            <a:schemeClr val="accent1">
+              <a:shade val="50000"/>
+            </a:schemeClr>
+          </a:lnRef>
+          <a:fillRef idx="1">
+            <a:schemeClr val="accent1"/>
+          </a:fillRef>
+          <a:effectRef idx="0">
+            <a:schemeClr val="accent1"/>
+          </a:effectRef>
+          <a:fontRef idx="minor">
+            <a:schemeClr val="lt1"/>
+          </a:fontRef>
+        </p:style>
+        <p:txBody>
+          <a:bodyPr rtlCol="0" anchor="ctr"/>
+          <a:lstStyle/>
+          <a:p>
+            <a:pPr algn="ctr"/>
+            <a:r>
+              <a:rPr lang="it-IT" dirty="0">
+                <a:solidFill>
+                  <a:schemeClr val="tx2"/>
+                </a:solidFill>
+              </a:rPr>
+              <a:t>Frontend Activator QA</a:t>
+            </a:r>
+          </a:p>
+        </p:txBody>
+      </p:sp>
+      <p:sp>
+        <p:nvSpPr>
+          <p:cNvPr id="34" name="Rettangolo con angoli arrotondati 33">
+            <a:extLst>
+              <a:ext uri="{FF2B5EF4-FFF2-40B4-BE49-F238E27FC236}">
+                <a16:creationId xmlns:a16="http://schemas.microsoft.com/office/drawing/2014/main" id="{D6348EF2-2424-4E5A-9060-3DF809AED3EB}"/>
+              </a:ext>
+            </a:extLst>
+          </p:cNvPr>
+          <p:cNvSpPr/>
+          <p:nvPr/>
+        </p:nvSpPr>
+        <p:spPr>
+          <a:xfrm>
+            <a:off x="4796278" y="2577613"/>
+            <a:ext cx="1602864" cy="1259221"/>
+          </a:xfrm>
+          <a:prstGeom prst="roundRect">
+            <a:avLst/>
+          </a:prstGeom>
+          <a:solidFill>
+            <a:schemeClr val="accent1">
+              <a:lumMod val="40000"/>
+              <a:lumOff val="60000"/>
+            </a:schemeClr>
+          </a:solidFill>
+          <a:ln w="38100">
+            <a:solidFill>
+              <a:schemeClr val="accent1">
+                <a:lumMod val="75000"/>
+              </a:schemeClr>
+            </a:solidFill>
+          </a:ln>
+        </p:spPr>
+        <p:style>
+          <a:lnRef idx="2">
+            <a:schemeClr val="accent1">
+              <a:shade val="50000"/>
+            </a:schemeClr>
+          </a:lnRef>
+          <a:fillRef idx="1">
+            <a:schemeClr val="accent1"/>
+          </a:fillRef>
+          <a:effectRef idx="0">
+            <a:schemeClr val="accent1"/>
+          </a:effectRef>
+          <a:fontRef idx="minor">
+            <a:schemeClr val="lt1"/>
+          </a:fontRef>
+        </p:style>
+        <p:txBody>
+          <a:bodyPr rtlCol="0" anchor="ctr"/>
+          <a:lstStyle/>
+          <a:p>
+            <a:pPr algn="ctr"/>
+            <a:r>
+              <a:rPr lang="it-IT" sz="2400" dirty="0">
+                <a:solidFill>
+                  <a:schemeClr val="tx2"/>
+                </a:solidFill>
+              </a:rPr>
+              <a:t>Frontend Server JS</a:t>
+            </a:r>
+          </a:p>
+        </p:txBody>
+      </p:sp>
+      <p:cxnSp>
+        <p:nvCxnSpPr>
+          <p:cNvPr id="36" name="Connettore 2 35">
+            <a:extLst>
+              <a:ext uri="{FF2B5EF4-FFF2-40B4-BE49-F238E27FC236}">
+                <a16:creationId xmlns:a16="http://schemas.microsoft.com/office/drawing/2014/main" id="{341099DD-C3E9-492A-9782-A1AAD0EDC571}"/>
+              </a:ext>
+            </a:extLst>
+          </p:cNvPr>
+          <p:cNvCxnSpPr>
+            <a:cxnSpLocks/>
+          </p:cNvCxnSpPr>
+          <p:nvPr/>
+        </p:nvCxnSpPr>
+        <p:spPr>
+          <a:xfrm flipH="1">
+            <a:off x="2931010" y="3760820"/>
+            <a:ext cx="1908770" cy="611980"/>
+          </a:xfrm>
+          <a:prstGeom prst="straightConnector1">
+            <a:avLst/>
+          </a:prstGeom>
+          <a:ln w="38100">
+            <a:solidFill>
+              <a:srgbClr val="FF0000"/>
+            </a:solidFill>
+            <a:headEnd type="none" w="med" len="med"/>
+            <a:tailEnd type="triangle" w="med" len="med"/>
+          </a:ln>
+        </p:spPr>
+        <p:style>
+          <a:lnRef idx="1">
+            <a:schemeClr val="accent1"/>
+          </a:lnRef>
+          <a:fillRef idx="0">
+            <a:schemeClr val="accent1"/>
+          </a:fillRef>
+          <a:effectRef idx="0">
+            <a:schemeClr val="accent1"/>
+          </a:effectRef>
+          <a:fontRef idx="minor">
+            <a:schemeClr val="tx1"/>
+          </a:fontRef>
+        </p:style>
+      </p:cxnSp>
+      <p:cxnSp>
+        <p:nvCxnSpPr>
+          <p:cNvPr id="46" name="Connettore 2 45">
+            <a:extLst>
+              <a:ext uri="{FF2B5EF4-FFF2-40B4-BE49-F238E27FC236}">
+                <a16:creationId xmlns:a16="http://schemas.microsoft.com/office/drawing/2014/main" id="{5AFB73BB-24F4-4D1C-9CA7-19C56D13F752}"/>
+              </a:ext>
+            </a:extLst>
+          </p:cNvPr>
+          <p:cNvCxnSpPr>
+            <a:cxnSpLocks/>
+            <a:stCxn id="14" idx="4"/>
+            <a:endCxn id="34" idx="0"/>
+          </p:cNvCxnSpPr>
+          <p:nvPr/>
+        </p:nvCxnSpPr>
+        <p:spPr>
+          <a:xfrm>
+            <a:off x="5594124" y="2139716"/>
+            <a:ext cx="3586" cy="437897"/>
+          </a:xfrm>
+          <a:prstGeom prst="straightConnector1">
+            <a:avLst/>
+          </a:prstGeom>
+          <a:ln w="38100">
+            <a:solidFill>
+              <a:srgbClr val="FF0000"/>
+            </a:solidFill>
+            <a:headEnd type="none" w="med" len="med"/>
+            <a:tailEnd type="triangle" w="med" len="med"/>
+          </a:ln>
+        </p:spPr>
+        <p:style>
+          <a:lnRef idx="1">
+            <a:schemeClr val="accent1"/>
+          </a:lnRef>
+          <a:fillRef idx="0">
+            <a:schemeClr val="accent1"/>
+          </a:fillRef>
+          <a:effectRef idx="0">
+            <a:schemeClr val="accent1"/>
+          </a:effectRef>
+          <a:fontRef idx="minor">
+            <a:schemeClr val="tx1"/>
+          </a:fontRef>
+        </p:style>
+      </p:cxnSp>
+      <p:sp>
+        <p:nvSpPr>
+          <p:cNvPr id="2057" name="CasellaDiTesto 2056">
+            <a:extLst>
+              <a:ext uri="{FF2B5EF4-FFF2-40B4-BE49-F238E27FC236}">
+                <a16:creationId xmlns:a16="http://schemas.microsoft.com/office/drawing/2014/main" id="{C309EB58-2206-4F92-9FAE-3C17BDD11FDD}"/>
+              </a:ext>
+            </a:extLst>
+          </p:cNvPr>
+          <p:cNvSpPr txBox="1"/>
+          <p:nvPr/>
+        </p:nvSpPr>
+        <p:spPr>
+          <a:xfrm>
+            <a:off x="4839780" y="2097054"/>
+            <a:ext cx="876143" cy="523220"/>
+          </a:xfrm>
+          <a:prstGeom prst="rect">
+            <a:avLst/>
+          </a:prstGeom>
+          <a:noFill/>
+        </p:spPr>
+        <p:txBody>
+          <a:bodyPr wrap="square" rtlCol="0">
+            <a:spAutoFit/>
+          </a:bodyPr>
+          <a:lstStyle/>
+          <a:p>
+            <a:r>
+              <a:rPr lang="it-IT" sz="2800" b="1" dirty="0">
+                <a:solidFill>
+                  <a:srgbClr val="FF0000"/>
+                </a:solidFill>
+              </a:rPr>
+              <a:t>PUT</a:t>
+            </a:r>
+            <a:endParaRPr lang="it-IT" b="1" dirty="0">
+              <a:solidFill>
+                <a:srgbClr val="FF0000"/>
+              </a:solidFill>
+            </a:endParaRPr>
+          </a:p>
+        </p:txBody>
+      </p:sp>
+      <p:cxnSp>
+        <p:nvCxnSpPr>
+          <p:cNvPr id="69" name="Connettore 2 68">
+            <a:extLst>
+              <a:ext uri="{FF2B5EF4-FFF2-40B4-BE49-F238E27FC236}">
+                <a16:creationId xmlns:a16="http://schemas.microsoft.com/office/drawing/2014/main" id="{90ED476A-8357-49BF-9E7E-53CD729D4E9D}"/>
+              </a:ext>
+            </a:extLst>
+          </p:cNvPr>
+          <p:cNvCxnSpPr>
+            <a:cxnSpLocks/>
+          </p:cNvCxnSpPr>
+          <p:nvPr/>
+        </p:nvCxnSpPr>
+        <p:spPr>
+          <a:xfrm flipH="1">
+            <a:off x="6232125" y="1079141"/>
+            <a:ext cx="3316216" cy="1702"/>
+          </a:xfrm>
+          <a:prstGeom prst="straightConnector1">
+            <a:avLst/>
+          </a:prstGeom>
+          <a:ln w="38100">
+            <a:solidFill>
+              <a:srgbClr val="FF0000"/>
+            </a:solidFill>
+            <a:headEnd type="none" w="med" len="med"/>
+            <a:tailEnd type="triangle" w="med" len="med"/>
+          </a:ln>
+        </p:spPr>
+        <p:style>
+          <a:lnRef idx="1">
+            <a:schemeClr val="accent1"/>
+          </a:lnRef>
+          <a:fillRef idx="0">
+            <a:schemeClr val="accent1"/>
+          </a:fillRef>
+          <a:effectRef idx="0">
+            <a:schemeClr val="accent1"/>
+          </a:effectRef>
+          <a:fontRef idx="minor">
+            <a:schemeClr val="tx1"/>
+          </a:fontRef>
+        </p:style>
+      </p:cxnSp>
+      <p:sp>
+        <p:nvSpPr>
+          <p:cNvPr id="75" name="CasellaDiTesto 74">
+            <a:extLst>
+              <a:ext uri="{FF2B5EF4-FFF2-40B4-BE49-F238E27FC236}">
+                <a16:creationId xmlns:a16="http://schemas.microsoft.com/office/drawing/2014/main" id="{44070BD2-CB46-4677-8F07-D3A6780CDE63}"/>
+              </a:ext>
+            </a:extLst>
+          </p:cNvPr>
+          <p:cNvSpPr txBox="1"/>
+          <p:nvPr/>
+        </p:nvSpPr>
+        <p:spPr>
+          <a:xfrm rot="1723866">
+            <a:off x="7010867" y="3314202"/>
+            <a:ext cx="2286548" cy="646331"/>
+          </a:xfrm>
+          <a:prstGeom prst="rect">
+            <a:avLst/>
+          </a:prstGeom>
+          <a:noFill/>
+        </p:spPr>
+        <p:txBody>
+          <a:bodyPr wrap="square" rtlCol="0">
+            <a:spAutoFit/>
+          </a:bodyPr>
+          <a:lstStyle/>
+          <a:p>
+            <a:r>
+              <a:rPr lang="it-IT" dirty="0"/>
+              <a:t>alarm | usercmd : usercmd(CMD)</a:t>
+            </a:r>
+          </a:p>
+        </p:txBody>
+      </p:sp>
+      <p:grpSp>
+        <p:nvGrpSpPr>
+          <p:cNvPr id="48" name="Gruppo 47">
+            <a:extLst>
+              <a:ext uri="{FF2B5EF4-FFF2-40B4-BE49-F238E27FC236}">
+                <a16:creationId xmlns:a16="http://schemas.microsoft.com/office/drawing/2014/main" id="{FA6B7BB2-C998-4CB4-A6D8-27DE6E50F2F9}"/>
+              </a:ext>
+            </a:extLst>
+          </p:cNvPr>
+          <p:cNvGrpSpPr/>
+          <p:nvPr/>
+        </p:nvGrpSpPr>
+        <p:grpSpPr>
+          <a:xfrm>
+            <a:off x="357425" y="3331799"/>
+            <a:ext cx="2573583" cy="3043333"/>
+            <a:chOff x="357425" y="3331799"/>
+            <a:chExt cx="2573583" cy="3043333"/>
+          </a:xfrm>
+        </p:grpSpPr>
+        <p:sp>
+          <p:nvSpPr>
+            <p:cNvPr id="35" name="Rettangolo con angoli arrotondati 34">
+              <a:extLst>
+                <a:ext uri="{FF2B5EF4-FFF2-40B4-BE49-F238E27FC236}">
+                  <a16:creationId xmlns:a16="http://schemas.microsoft.com/office/drawing/2014/main" id="{9F5CC579-B7C1-43DD-8E25-5703C9F308AE}"/>
+                </a:ext>
+              </a:extLst>
+            </p:cNvPr>
+            <p:cNvSpPr/>
+            <p:nvPr/>
+          </p:nvSpPr>
+          <p:spPr>
+            <a:xfrm>
+              <a:off x="357425" y="3988753"/>
+              <a:ext cx="2573583" cy="2386379"/>
+            </a:xfrm>
+            <a:prstGeom prst="roundRect">
+              <a:avLst/>
+            </a:prstGeom>
+            <a:solidFill>
+              <a:srgbClr val="BF84FA"/>
+            </a:solidFill>
+            <a:ln w="38100">
+              <a:solidFill>
+                <a:srgbClr val="7030A0"/>
+              </a:solidFill>
+            </a:ln>
+          </p:spPr>
+          <p:style>
+            <a:lnRef idx="2">
+              <a:schemeClr val="accent1">
+                <a:shade val="50000"/>
+              </a:schemeClr>
+            </a:lnRef>
+            <a:fillRef idx="1">
+              <a:schemeClr val="accent1"/>
+            </a:fillRef>
+            <a:effectRef idx="0">
+              <a:schemeClr val="accent1"/>
+            </a:effectRef>
+            <a:fontRef idx="minor">
+              <a:schemeClr val="lt1"/>
+            </a:fontRef>
+          </p:style>
+          <p:txBody>
+            <a:bodyPr rtlCol="0" anchor="ctr"/>
+            <a:lstStyle/>
+            <a:p>
+              <a:pPr algn="ctr"/>
+              <a:r>
+                <a:rPr lang="it-IT" sz="3600" dirty="0">
+                  <a:solidFill>
+                    <a:schemeClr val="tx2"/>
+                  </a:solidFill>
+                </a:rPr>
+                <a:t>Browser</a:t>
+              </a:r>
+            </a:p>
+          </p:txBody>
+        </p:sp>
+        <p:pic>
+          <p:nvPicPr>
+            <p:cNvPr id="47" name="Picture 2" descr="Risultati immagini per firefox png">
+              <a:extLst>
+                <a:ext uri="{FF2B5EF4-FFF2-40B4-BE49-F238E27FC236}">
+                  <a16:creationId xmlns:a16="http://schemas.microsoft.com/office/drawing/2014/main" id="{4C5F103A-B428-41C2-9206-874FAB248118}"/>
+                </a:ext>
+              </a:extLst>
+            </p:cNvPr>
+            <p:cNvPicPr>
+              <a:picLocks noChangeAspect="1" noChangeArrowheads="1"/>
+            </p:cNvPicPr>
+            <p:nvPr/>
+          </p:nvPicPr>
+          <p:blipFill>
+            <a:blip r:embed="rId7">
+              <a:extLst>
+                <a:ext uri="{28A0092B-C50C-407E-A947-70E740481C1C}">
+                  <a14:useLocalDpi xmlns:a14="http://schemas.microsoft.com/office/drawing/2010/main" val="0"/>
+                </a:ext>
+              </a:extLst>
+            </a:blip>
+            <a:srcRect/>
+            <a:stretch>
+              <a:fillRect/>
+            </a:stretch>
+          </p:blipFill>
+          <p:spPr bwMode="auto">
+            <a:xfrm>
+              <a:off x="533134" y="3331799"/>
+              <a:ext cx="1158868" cy="1196537"/>
+            </a:xfrm>
+            <a:prstGeom prst="rect">
+              <a:avLst/>
+            </a:prstGeom>
+            <a:noFill/>
+            <a:extLst>
+              <a:ext uri="{909E8E84-426E-40DD-AFC4-6F175D3DCCD1}">
+                <a14:hiddenFill xmlns:a14="http://schemas.microsoft.com/office/drawing/2010/main">
+                  <a:solidFill>
+                    <a:srgbClr val="FFFFFF"/>
+                  </a:solidFill>
+                </a14:hiddenFill>
+              </a:ext>
+            </a:extLst>
+          </p:spPr>
+        </p:pic>
+      </p:grpSp>
+      <p:pic>
+        <p:nvPicPr>
+          <p:cNvPr id="1028" name="Picture 4" descr="Risultati immagini per node logo">
+            <a:extLst>
+              <a:ext uri="{FF2B5EF4-FFF2-40B4-BE49-F238E27FC236}">
+                <a16:creationId xmlns:a16="http://schemas.microsoft.com/office/drawing/2014/main" id="{5C9EFDB5-32C5-4E84-81C1-4A7C523BB72B}"/>
+              </a:ext>
+            </a:extLst>
+          </p:cNvPr>
+          <p:cNvPicPr>
+            <a:picLocks noChangeAspect="1" noChangeArrowheads="1"/>
+          </p:cNvPicPr>
+          <p:nvPr/>
+        </p:nvPicPr>
+        <p:blipFill>
+          <a:blip r:embed="rId8">
+            <a:extLst>
+              <a:ext uri="{28A0092B-C50C-407E-A947-70E740481C1C}">
+                <a14:useLocalDpi xmlns:a14="http://schemas.microsoft.com/office/drawing/2010/main" val="0"/>
+              </a:ext>
+            </a:extLst>
+          </a:blip>
+          <a:srcRect/>
+          <a:stretch>
+            <a:fillRect/>
+          </a:stretch>
+        </p:blipFill>
+        <p:spPr bwMode="auto">
+          <a:xfrm>
+            <a:off x="5239205" y="3577342"/>
+            <a:ext cx="1102026" cy="675093"/>
+          </a:xfrm>
+          <a:prstGeom prst="rect">
+            <a:avLst/>
+          </a:prstGeom>
+          <a:noFill/>
+          <a:extLst>
+            <a:ext uri="{909E8E84-426E-40DD-AFC4-6F175D3DCCD1}">
+              <a14:hiddenFill xmlns:a14="http://schemas.microsoft.com/office/drawing/2010/main">
+                <a:solidFill>
+                  <a:srgbClr val="FFFFFF"/>
+                </a:solidFill>
+              </a14:hiddenFill>
+            </a:ext>
+          </a:extLst>
+        </p:spPr>
+      </p:pic>
+    </p:spTree>
+    <p:extLst>
+      <p:ext uri="{BB962C8B-B14F-4D97-AF65-F5344CB8AC3E}">
+        <p14:creationId xmlns:p14="http://schemas.microsoft.com/office/powerpoint/2010/main" val="4266352096"/>
       </p:ext>
     </p:extLst>
   </p:cSld>

</xml_diff>

<commit_message>
immagine project architecture 2
</commit_message>
<xml_diff>
--- a/Appunti/ISSPowerPoint.pptx
+++ b/Appunti/ISSPowerPoint.pptx
@@ -10226,10 +10226,10 @@
       </p:grpSpPr>
       <p:sp>
         <p:nvSpPr>
-          <p:cNvPr id="2" name="Rettangolo con angoli arrotondati 1">
-            <a:extLst>
-              <a:ext uri="{FF2B5EF4-FFF2-40B4-BE49-F238E27FC236}">
-                <a16:creationId xmlns:a16="http://schemas.microsoft.com/office/drawing/2014/main" id="{4CA35170-E1F1-43D1-B661-3E9255B7B3EF}"/>
+          <p:cNvPr id="11" name="Rettangolo con angoli arrotondati 10">
+            <a:extLst>
+              <a:ext uri="{FF2B5EF4-FFF2-40B4-BE49-F238E27FC236}">
+                <a16:creationId xmlns:a16="http://schemas.microsoft.com/office/drawing/2014/main" id="{E949EEA1-FC18-48E5-8807-5482CCBE6121}"/>
               </a:ext>
             </a:extLst>
           </p:cNvPr>
@@ -10238,23 +10238,21 @@
         </p:nvSpPr>
         <p:spPr>
           <a:xfrm>
-            <a:off x="4808292" y="1042621"/>
-            <a:ext cx="2573583" cy="2386379"/>
+            <a:off x="5788240" y="2272973"/>
+            <a:ext cx="2377933" cy="2312054"/>
           </a:xfrm>
           <a:prstGeom prst="roundRect">
             <a:avLst/>
           </a:prstGeom>
           <a:solidFill>
-            <a:schemeClr val="accent5">
+            <a:schemeClr val="accent2">
               <a:lumMod val="60000"/>
               <a:lumOff val="40000"/>
             </a:schemeClr>
           </a:solidFill>
           <a:ln w="38100">
             <a:solidFill>
-              <a:schemeClr val="accent5">
-                <a:lumMod val="75000"/>
-              </a:schemeClr>
+              <a:srgbClr val="FF0000"/>
             </a:solidFill>
           </a:ln>
         </p:spPr>
@@ -10285,17 +10283,266 @@
                   <a:schemeClr val="tx2"/>
                 </a:solidFill>
               </a:rPr>
-              <a:t>Frontend Server</a:t>
+              <a:t>Controller</a:t>
             </a:r>
+            <a:endParaRPr lang="it-IT" sz="2800" dirty="0">
+              <a:solidFill>
+                <a:schemeClr val="tx2"/>
+              </a:solidFill>
+            </a:endParaRPr>
           </a:p>
         </p:txBody>
       </p:sp>
+      <p:cxnSp>
+        <p:nvCxnSpPr>
+          <p:cNvPr id="10" name="Connettore 2 9">
+            <a:extLst>
+              <a:ext uri="{FF2B5EF4-FFF2-40B4-BE49-F238E27FC236}">
+                <a16:creationId xmlns:a16="http://schemas.microsoft.com/office/drawing/2014/main" id="{897E7060-8D14-4361-A310-6A2E40867CEA}"/>
+              </a:ext>
+            </a:extLst>
+          </p:cNvPr>
+          <p:cNvCxnSpPr>
+            <a:cxnSpLocks/>
+            <a:stCxn id="27" idx="2"/>
+            <a:endCxn id="38" idx="0"/>
+          </p:cNvCxnSpPr>
+          <p:nvPr/>
+        </p:nvCxnSpPr>
+        <p:spPr>
+          <a:xfrm>
+            <a:off x="3364113" y="1717184"/>
+            <a:ext cx="1" cy="1104391"/>
+          </a:xfrm>
+          <a:prstGeom prst="straightConnector1">
+            <a:avLst/>
+          </a:prstGeom>
+          <a:ln w="38100">
+            <a:solidFill>
+              <a:srgbClr val="FF0000"/>
+            </a:solidFill>
+            <a:headEnd type="triangle"/>
+            <a:tailEnd type="triangle"/>
+          </a:ln>
+        </p:spPr>
+        <p:style>
+          <a:lnRef idx="1">
+            <a:schemeClr val="accent1"/>
+          </a:lnRef>
+          <a:fillRef idx="0">
+            <a:schemeClr val="accent1"/>
+          </a:fillRef>
+          <a:effectRef idx="0">
+            <a:schemeClr val="accent1"/>
+          </a:effectRef>
+          <a:fontRef idx="minor">
+            <a:schemeClr val="tx1"/>
+          </a:fontRef>
+        </p:style>
+      </p:cxnSp>
+      <p:cxnSp>
+        <p:nvCxnSpPr>
+          <p:cNvPr id="17" name="Connettore 2 16">
+            <a:extLst>
+              <a:ext uri="{FF2B5EF4-FFF2-40B4-BE49-F238E27FC236}">
+                <a16:creationId xmlns:a16="http://schemas.microsoft.com/office/drawing/2014/main" id="{647C59B2-1F5D-4C86-BECC-9005526ADC75}"/>
+              </a:ext>
+            </a:extLst>
+          </p:cNvPr>
+          <p:cNvCxnSpPr>
+            <a:cxnSpLocks/>
+            <a:stCxn id="1028" idx="0"/>
+            <a:endCxn id="38" idx="4"/>
+          </p:cNvCxnSpPr>
+          <p:nvPr/>
+        </p:nvCxnSpPr>
+        <p:spPr>
+          <a:xfrm flipH="1" flipV="1">
+            <a:off x="3364114" y="4036424"/>
+            <a:ext cx="2432" cy="971221"/>
+          </a:xfrm>
+          <a:prstGeom prst="straightConnector1">
+            <a:avLst/>
+          </a:prstGeom>
+          <a:ln w="38100">
+            <a:solidFill>
+              <a:srgbClr val="FF0000"/>
+            </a:solidFill>
+            <a:headEnd type="triangle"/>
+            <a:tailEnd type="triangle"/>
+          </a:ln>
+        </p:spPr>
+        <p:style>
+          <a:lnRef idx="1">
+            <a:schemeClr val="accent1"/>
+          </a:lnRef>
+          <a:fillRef idx="0">
+            <a:schemeClr val="accent1"/>
+          </a:fillRef>
+          <a:effectRef idx="0">
+            <a:schemeClr val="accent1"/>
+          </a:effectRef>
+          <a:fontRef idx="minor">
+            <a:schemeClr val="tx1"/>
+          </a:fontRef>
+        </p:style>
+      </p:cxnSp>
+      <p:grpSp>
+        <p:nvGrpSpPr>
+          <p:cNvPr id="34" name="Gruppo 33">
+            <a:extLst>
+              <a:ext uri="{FF2B5EF4-FFF2-40B4-BE49-F238E27FC236}">
+                <a16:creationId xmlns:a16="http://schemas.microsoft.com/office/drawing/2014/main" id="{6A88E1CD-023D-4C14-8DA7-3ECA936041CA}"/>
+              </a:ext>
+            </a:extLst>
+          </p:cNvPr>
+          <p:cNvGrpSpPr/>
+          <p:nvPr/>
+        </p:nvGrpSpPr>
+        <p:grpSpPr>
+          <a:xfrm>
+            <a:off x="2059042" y="4126399"/>
+            <a:ext cx="1445844" cy="719872"/>
+            <a:chOff x="3142119" y="4126399"/>
+            <a:chExt cx="1445844" cy="719872"/>
+          </a:xfrm>
+        </p:grpSpPr>
+        <p:sp>
+          <p:nvSpPr>
+            <p:cNvPr id="16" name="CasellaDiTesto 15">
+              <a:extLst>
+                <a:ext uri="{FF2B5EF4-FFF2-40B4-BE49-F238E27FC236}">
+                  <a16:creationId xmlns:a16="http://schemas.microsoft.com/office/drawing/2014/main" id="{E2A87A62-B019-49FF-8628-0A78EF7037CC}"/>
+                </a:ext>
+              </a:extLst>
+            </p:cNvPr>
+            <p:cNvSpPr txBox="1"/>
+            <p:nvPr/>
+          </p:nvSpPr>
+          <p:spPr>
+            <a:xfrm>
+              <a:off x="3764784" y="4301669"/>
+              <a:ext cx="823179" cy="369332"/>
+            </a:xfrm>
+            <a:prstGeom prst="rect">
+              <a:avLst/>
+            </a:prstGeom>
+            <a:noFill/>
+          </p:spPr>
+          <p:txBody>
+            <a:bodyPr wrap="square" rtlCol="0">
+              <a:spAutoFit/>
+            </a:bodyPr>
+            <a:lstStyle/>
+            <a:p>
+              <a:r>
+                <a:rPr lang="it-IT" dirty="0"/>
+                <a:t>users</a:t>
+              </a:r>
+            </a:p>
+          </p:txBody>
+        </p:sp>
+        <p:pic>
+          <p:nvPicPr>
+            <p:cNvPr id="2058" name="Picture 10" descr="Risultati immagini per utente">
+              <a:extLst>
+                <a:ext uri="{FF2B5EF4-FFF2-40B4-BE49-F238E27FC236}">
+                  <a16:creationId xmlns:a16="http://schemas.microsoft.com/office/drawing/2014/main" id="{4520DDAC-A384-4FD2-8241-DC17AF042546}"/>
+                </a:ext>
+              </a:extLst>
+            </p:cNvPr>
+            <p:cNvPicPr>
+              <a:picLocks noChangeAspect="1" noChangeArrowheads="1"/>
+            </p:cNvPicPr>
+            <p:nvPr/>
+          </p:nvPicPr>
+          <p:blipFill>
+            <a:blip r:embed="rId2">
+              <a:extLst>
+                <a:ext uri="{28A0092B-C50C-407E-A947-70E740481C1C}">
+                  <a14:useLocalDpi xmlns:a14="http://schemas.microsoft.com/office/drawing/2010/main" val="0"/>
+                </a:ext>
+              </a:extLst>
+            </a:blip>
+            <a:srcRect/>
+            <a:stretch>
+              <a:fillRect/>
+            </a:stretch>
+          </p:blipFill>
+          <p:spPr bwMode="auto">
+            <a:xfrm>
+              <a:off x="3142119" y="4126399"/>
+              <a:ext cx="719872" cy="719872"/>
+            </a:xfrm>
+            <a:prstGeom prst="rect">
+              <a:avLst/>
+            </a:prstGeom>
+            <a:noFill/>
+            <a:extLst>
+              <a:ext uri="{909E8E84-426E-40DD-AFC4-6F175D3DCCD1}">
+                <a14:hiddenFill xmlns:a14="http://schemas.microsoft.com/office/drawing/2010/main">
+                  <a:solidFill>
+                    <a:srgbClr val="FFFFFF"/>
+                  </a:solidFill>
+                </a14:hiddenFill>
+              </a:ext>
+            </a:extLst>
+          </p:spPr>
+        </p:pic>
+      </p:grpSp>
+      <p:cxnSp>
+        <p:nvCxnSpPr>
+          <p:cNvPr id="24" name="Connettore 2 23">
+            <a:extLst>
+              <a:ext uri="{FF2B5EF4-FFF2-40B4-BE49-F238E27FC236}">
+                <a16:creationId xmlns:a16="http://schemas.microsoft.com/office/drawing/2014/main" id="{A956FD39-0764-4B94-B1DD-BDECB593C7EE}"/>
+              </a:ext>
+            </a:extLst>
+          </p:cNvPr>
+          <p:cNvCxnSpPr>
+            <a:cxnSpLocks/>
+            <a:stCxn id="38" idx="6"/>
+            <a:endCxn id="11" idx="1"/>
+          </p:cNvCxnSpPr>
+          <p:nvPr/>
+        </p:nvCxnSpPr>
+        <p:spPr>
+          <a:xfrm>
+            <a:off x="4553080" y="3429000"/>
+            <a:ext cx="1235160" cy="0"/>
+          </a:xfrm>
+          <a:prstGeom prst="straightConnector1">
+            <a:avLst/>
+          </a:prstGeom>
+          <a:ln w="38100">
+            <a:solidFill>
+              <a:srgbClr val="FF0000"/>
+            </a:solidFill>
+            <a:headEnd type="none" w="med" len="med"/>
+            <a:tailEnd type="triangle" w="med" len="med"/>
+          </a:ln>
+        </p:spPr>
+        <p:style>
+          <a:lnRef idx="1">
+            <a:schemeClr val="accent1"/>
+          </a:lnRef>
+          <a:fillRef idx="0">
+            <a:schemeClr val="accent1"/>
+          </a:fillRef>
+          <a:effectRef idx="0">
+            <a:schemeClr val="accent1"/>
+          </a:effectRef>
+          <a:fontRef idx="minor">
+            <a:schemeClr val="tx1"/>
+          </a:fontRef>
+        </p:style>
+      </p:cxnSp>
       <p:sp>
         <p:nvSpPr>
-          <p:cNvPr id="11" name="Rettangolo con angoli arrotondati 10">
-            <a:extLst>
-              <a:ext uri="{FF2B5EF4-FFF2-40B4-BE49-F238E27FC236}">
-                <a16:creationId xmlns:a16="http://schemas.microsoft.com/office/drawing/2014/main" id="{E949EEA1-FC18-48E5-8807-5482CCBE6121}"/>
+          <p:cNvPr id="27" name="Rettangolo con angoli arrotondati 26">
+            <a:extLst>
+              <a:ext uri="{FF2B5EF4-FFF2-40B4-BE49-F238E27FC236}">
+                <a16:creationId xmlns:a16="http://schemas.microsoft.com/office/drawing/2014/main" id="{865E844F-7160-4FF6-B0B9-27C2C488D203}"/>
               </a:ext>
             </a:extLst>
           </p:cNvPr>
@@ -10304,21 +10551,18 @@
         </p:nvSpPr>
         <p:spPr>
           <a:xfrm>
-            <a:off x="8483478" y="1042621"/>
-            <a:ext cx="2573583" cy="2386379"/>
+            <a:off x="2581495" y="719086"/>
+            <a:ext cx="1565235" cy="998098"/>
           </a:xfrm>
           <a:prstGeom prst="roundRect">
             <a:avLst/>
           </a:prstGeom>
           <a:solidFill>
-            <a:schemeClr val="accent6">
-              <a:lumMod val="40000"/>
-              <a:lumOff val="60000"/>
-            </a:schemeClr>
+            <a:srgbClr val="BF84FA"/>
           </a:solidFill>
           <a:ln w="38100">
             <a:solidFill>
-              <a:schemeClr val="accent6"/>
+              <a:srgbClr val="7030A0"/>
             </a:solidFill>
           </a:ln>
         </p:spPr>
@@ -10344,291 +10588,7 @@
           <a:p>
             <a:pPr algn="ctr"/>
             <a:r>
-              <a:rPr lang="it-IT" sz="3600" dirty="0">
-                <a:solidFill>
-                  <a:schemeClr val="tx2"/>
-                </a:solidFill>
-              </a:rPr>
-              <a:t>System</a:t>
-            </a:r>
-          </a:p>
-        </p:txBody>
-      </p:sp>
-      <p:cxnSp>
-        <p:nvCxnSpPr>
-          <p:cNvPr id="10" name="Connettore 2 9">
-            <a:extLst>
-              <a:ext uri="{FF2B5EF4-FFF2-40B4-BE49-F238E27FC236}">
-                <a16:creationId xmlns:a16="http://schemas.microsoft.com/office/drawing/2014/main" id="{897E7060-8D14-4361-A310-6A2E40867CEA}"/>
-              </a:ext>
-            </a:extLst>
-          </p:cNvPr>
-          <p:cNvCxnSpPr>
-            <a:cxnSpLocks/>
-            <a:stCxn id="27" idx="3"/>
-            <a:endCxn id="2" idx="1"/>
-          </p:cNvCxnSpPr>
-          <p:nvPr/>
-        </p:nvCxnSpPr>
-        <p:spPr>
-          <a:xfrm>
-            <a:off x="3568696" y="2235811"/>
-            <a:ext cx="1239596" cy="0"/>
-          </a:xfrm>
-          <a:prstGeom prst="straightConnector1">
-            <a:avLst/>
-          </a:prstGeom>
-          <a:ln w="38100">
-            <a:solidFill>
-              <a:srgbClr val="FF0000"/>
-            </a:solidFill>
-            <a:headEnd type="triangle"/>
-            <a:tailEnd type="triangle"/>
-          </a:ln>
-        </p:spPr>
-        <p:style>
-          <a:lnRef idx="1">
-            <a:schemeClr val="accent1"/>
-          </a:lnRef>
-          <a:fillRef idx="0">
-            <a:schemeClr val="accent1"/>
-          </a:fillRef>
-          <a:effectRef idx="0">
-            <a:schemeClr val="accent1"/>
-          </a:effectRef>
-          <a:fontRef idx="minor">
-            <a:schemeClr val="tx1"/>
-          </a:fontRef>
-        </p:style>
-      </p:cxnSp>
-      <p:cxnSp>
-        <p:nvCxnSpPr>
-          <p:cNvPr id="17" name="Connettore 2 16">
-            <a:extLst>
-              <a:ext uri="{FF2B5EF4-FFF2-40B4-BE49-F238E27FC236}">
-                <a16:creationId xmlns:a16="http://schemas.microsoft.com/office/drawing/2014/main" id="{647C59B2-1F5D-4C86-BECC-9005526ADC75}"/>
-              </a:ext>
-            </a:extLst>
-          </p:cNvPr>
-          <p:cNvCxnSpPr>
-            <a:cxnSpLocks/>
-            <a:stCxn id="1028" idx="0"/>
-            <a:endCxn id="2" idx="2"/>
-          </p:cNvCxnSpPr>
-          <p:nvPr/>
-        </p:nvCxnSpPr>
-        <p:spPr>
-          <a:xfrm flipV="1">
-            <a:off x="6092438" y="3429000"/>
-            <a:ext cx="2646" cy="947082"/>
-          </a:xfrm>
-          <a:prstGeom prst="straightConnector1">
-            <a:avLst/>
-          </a:prstGeom>
-          <a:ln w="38100">
-            <a:solidFill>
-              <a:srgbClr val="FF0000"/>
-            </a:solidFill>
-            <a:headEnd type="triangle"/>
-            <a:tailEnd type="triangle"/>
-          </a:ln>
-        </p:spPr>
-        <p:style>
-          <a:lnRef idx="1">
-            <a:schemeClr val="accent1"/>
-          </a:lnRef>
-          <a:fillRef idx="0">
-            <a:schemeClr val="accent1"/>
-          </a:fillRef>
-          <a:effectRef idx="0">
-            <a:schemeClr val="accent1"/>
-          </a:effectRef>
-          <a:fontRef idx="minor">
-            <a:schemeClr val="tx1"/>
-          </a:fontRef>
-        </p:style>
-      </p:cxnSp>
-      <p:sp>
-        <p:nvSpPr>
-          <p:cNvPr id="16" name="CasellaDiTesto 15">
-            <a:extLst>
-              <a:ext uri="{FF2B5EF4-FFF2-40B4-BE49-F238E27FC236}">
-                <a16:creationId xmlns:a16="http://schemas.microsoft.com/office/drawing/2014/main" id="{E2A87A62-B019-49FF-8628-0A78EF7037CC}"/>
-              </a:ext>
-            </a:extLst>
-          </p:cNvPr>
-          <p:cNvSpPr txBox="1"/>
-          <p:nvPr/>
-        </p:nvSpPr>
-        <p:spPr>
-          <a:xfrm>
-            <a:off x="4808292" y="3745523"/>
-            <a:ext cx="823179" cy="369332"/>
-          </a:xfrm>
-          <a:prstGeom prst="rect">
-            <a:avLst/>
-          </a:prstGeom>
-          <a:noFill/>
-        </p:spPr>
-        <p:txBody>
-          <a:bodyPr wrap="square" rtlCol="0">
-            <a:spAutoFit/>
-          </a:bodyPr>
-          <a:lstStyle/>
-          <a:p>
-            <a:r>
-              <a:rPr lang="it-IT" dirty="0"/>
-              <a:t>users</a:t>
-            </a:r>
-          </a:p>
-        </p:txBody>
-      </p:sp>
-      <p:pic>
-        <p:nvPicPr>
-          <p:cNvPr id="2058" name="Picture 10" descr="Risultati immagini per utente">
-            <a:extLst>
-              <a:ext uri="{FF2B5EF4-FFF2-40B4-BE49-F238E27FC236}">
-                <a16:creationId xmlns:a16="http://schemas.microsoft.com/office/drawing/2014/main" id="{4520DDAC-A384-4FD2-8241-DC17AF042546}"/>
-              </a:ext>
-            </a:extLst>
-          </p:cNvPr>
-          <p:cNvPicPr>
-            <a:picLocks noChangeAspect="1" noChangeArrowheads="1"/>
-          </p:cNvPicPr>
-          <p:nvPr/>
-        </p:nvPicPr>
-        <p:blipFill>
-          <a:blip r:embed="rId2">
-            <a:extLst>
-              <a:ext uri="{28A0092B-C50C-407E-A947-70E740481C1C}">
-                <a14:useLocalDpi xmlns:a14="http://schemas.microsoft.com/office/drawing/2010/main" val="0"/>
-              </a:ext>
-            </a:extLst>
-          </a:blip>
-          <a:srcRect/>
-          <a:stretch>
-            <a:fillRect/>
-          </a:stretch>
-        </p:blipFill>
-        <p:spPr bwMode="auto">
-          <a:xfrm>
-            <a:off x="5294983" y="3581572"/>
-            <a:ext cx="719872" cy="719872"/>
-          </a:xfrm>
-          <a:prstGeom prst="rect">
-            <a:avLst/>
-          </a:prstGeom>
-          <a:noFill/>
-          <a:extLst>
-            <a:ext uri="{909E8E84-426E-40DD-AFC4-6F175D3DCCD1}">
-              <a14:hiddenFill xmlns:a14="http://schemas.microsoft.com/office/drawing/2010/main">
-                <a:solidFill>
-                  <a:srgbClr val="FFFFFF"/>
-                </a:solidFill>
-              </a14:hiddenFill>
-            </a:ext>
-          </a:extLst>
-        </p:spPr>
-      </p:pic>
-      <p:cxnSp>
-        <p:nvCxnSpPr>
-          <p:cNvPr id="24" name="Connettore 2 23">
-            <a:extLst>
-              <a:ext uri="{FF2B5EF4-FFF2-40B4-BE49-F238E27FC236}">
-                <a16:creationId xmlns:a16="http://schemas.microsoft.com/office/drawing/2014/main" id="{A956FD39-0764-4B94-B1DD-BDECB593C7EE}"/>
-              </a:ext>
-            </a:extLst>
-          </p:cNvPr>
-          <p:cNvCxnSpPr>
-            <a:cxnSpLocks/>
-            <a:stCxn id="2" idx="3"/>
-            <a:endCxn id="11" idx="1"/>
-          </p:cNvCxnSpPr>
-          <p:nvPr/>
-        </p:nvCxnSpPr>
-        <p:spPr>
-          <a:xfrm>
-            <a:off x="7381875" y="2235811"/>
-            <a:ext cx="1101603" cy="0"/>
-          </a:xfrm>
-          <a:prstGeom prst="straightConnector1">
-            <a:avLst/>
-          </a:prstGeom>
-          <a:ln w="38100">
-            <a:solidFill>
-              <a:srgbClr val="FF0000"/>
-            </a:solidFill>
-            <a:headEnd type="none" w="med" len="med"/>
-            <a:tailEnd type="triangle" w="med" len="med"/>
-          </a:ln>
-        </p:spPr>
-        <p:style>
-          <a:lnRef idx="1">
-            <a:schemeClr val="accent1"/>
-          </a:lnRef>
-          <a:fillRef idx="0">
-            <a:schemeClr val="accent1"/>
-          </a:fillRef>
-          <a:effectRef idx="0">
-            <a:schemeClr val="accent1"/>
-          </a:effectRef>
-          <a:fontRef idx="minor">
-            <a:schemeClr val="tx1"/>
-          </a:fontRef>
-        </p:style>
-      </p:cxnSp>
-      <p:sp>
-        <p:nvSpPr>
-          <p:cNvPr id="27" name="Rettangolo con angoli arrotondati 26">
-            <a:extLst>
-              <a:ext uri="{FF2B5EF4-FFF2-40B4-BE49-F238E27FC236}">
-                <a16:creationId xmlns:a16="http://schemas.microsoft.com/office/drawing/2014/main" id="{865E844F-7160-4FF6-B0B9-27C2C488D203}"/>
-              </a:ext>
-            </a:extLst>
-          </p:cNvPr>
-          <p:cNvSpPr/>
-          <p:nvPr/>
-        </p:nvSpPr>
-        <p:spPr>
-          <a:xfrm>
-            <a:off x="995113" y="1042621"/>
-            <a:ext cx="2573583" cy="2386379"/>
-          </a:xfrm>
-          <a:prstGeom prst="roundRect">
-            <a:avLst/>
-          </a:prstGeom>
-          <a:solidFill>
-            <a:srgbClr val="BF84FA"/>
-          </a:solidFill>
-          <a:ln w="38100">
-            <a:solidFill>
-              <a:srgbClr val="7030A0"/>
-            </a:solidFill>
-          </a:ln>
-        </p:spPr>
-        <p:style>
-          <a:lnRef idx="2">
-            <a:schemeClr val="accent1">
-              <a:shade val="50000"/>
-            </a:schemeClr>
-          </a:lnRef>
-          <a:fillRef idx="1">
-            <a:schemeClr val="accent1"/>
-          </a:fillRef>
-          <a:effectRef idx="0">
-            <a:schemeClr val="accent1"/>
-          </a:effectRef>
-          <a:fontRef idx="minor">
-            <a:schemeClr val="lt1"/>
-          </a:fontRef>
-        </p:style>
-        <p:txBody>
-          <a:bodyPr rtlCol="0" anchor="ctr"/>
-          <a:lstStyle/>
-          <a:p>
-            <a:pPr algn="ctr"/>
-            <a:r>
-              <a:rPr lang="it-IT" sz="3600" dirty="0">
+              <a:rPr lang="it-IT" sz="2800" dirty="0">
                 <a:solidFill>
                   <a:schemeClr val="tx2"/>
                 </a:solidFill>
@@ -10667,8 +10627,8 @@
         </p:blipFill>
         <p:spPr bwMode="auto">
           <a:xfrm>
-            <a:off x="5057993" y="4376082"/>
-            <a:ext cx="2068889" cy="2068889"/>
+            <a:off x="2663951" y="5007645"/>
+            <a:ext cx="1405190" cy="1405190"/>
           </a:xfrm>
           <a:prstGeom prst="rect">
             <a:avLst/>
@@ -10699,7 +10659,7 @@
         </p:nvSpPr>
         <p:spPr>
           <a:xfrm>
-            <a:off x="5531094" y="6400253"/>
+            <a:off x="2786795" y="6308068"/>
             <a:ext cx="1154636" cy="369332"/>
           </a:xfrm>
           <a:prstGeom prst="rect">
@@ -10720,6 +10680,419 @@
           </a:p>
         </p:txBody>
       </p:sp>
+      <p:sp>
+        <p:nvSpPr>
+          <p:cNvPr id="18" name="Ovale 17">
+            <a:extLst>
+              <a:ext uri="{FF2B5EF4-FFF2-40B4-BE49-F238E27FC236}">
+                <a16:creationId xmlns:a16="http://schemas.microsoft.com/office/drawing/2014/main" id="{69D0B1B3-B96A-4C7E-BDB9-F13BCBA6FFAA}"/>
+              </a:ext>
+            </a:extLst>
+          </p:cNvPr>
+          <p:cNvSpPr/>
+          <p:nvPr/>
+        </p:nvSpPr>
+        <p:spPr>
+          <a:xfrm>
+            <a:off x="8946244" y="3015762"/>
+            <a:ext cx="1632726" cy="826476"/>
+          </a:xfrm>
+          <a:prstGeom prst="ellipse">
+            <a:avLst/>
+          </a:prstGeom>
+          <a:solidFill>
+            <a:srgbClr val="FFFF00"/>
+          </a:solidFill>
+          <a:ln w="38100">
+            <a:solidFill>
+              <a:srgbClr val="FFC000"/>
+            </a:solidFill>
+          </a:ln>
+        </p:spPr>
+        <p:style>
+          <a:lnRef idx="2">
+            <a:schemeClr val="accent1">
+              <a:shade val="50000"/>
+            </a:schemeClr>
+          </a:lnRef>
+          <a:fillRef idx="1">
+            <a:schemeClr val="accent1"/>
+          </a:fillRef>
+          <a:effectRef idx="0">
+            <a:schemeClr val="accent1"/>
+          </a:effectRef>
+          <a:fontRef idx="minor">
+            <a:schemeClr val="lt1"/>
+          </a:fontRef>
+        </p:style>
+        <p:txBody>
+          <a:bodyPr rtlCol="0" anchor="ctr"/>
+          <a:lstStyle/>
+          <a:p>
+            <a:pPr algn="ctr"/>
+            <a:r>
+              <a:rPr lang="it-IT" sz="2400" dirty="0">
+                <a:solidFill>
+                  <a:schemeClr val="tx2"/>
+                </a:solidFill>
+              </a:rPr>
+              <a:t>Sensors</a:t>
+            </a:r>
+            <a:endParaRPr lang="it-IT" dirty="0">
+              <a:solidFill>
+                <a:schemeClr val="tx2"/>
+              </a:solidFill>
+            </a:endParaRPr>
+          </a:p>
+        </p:txBody>
+      </p:sp>
+      <p:sp>
+        <p:nvSpPr>
+          <p:cNvPr id="19" name="Ovale 18">
+            <a:extLst>
+              <a:ext uri="{FF2B5EF4-FFF2-40B4-BE49-F238E27FC236}">
+                <a16:creationId xmlns:a16="http://schemas.microsoft.com/office/drawing/2014/main" id="{7D96E281-581B-4A98-8506-185446E38E13}"/>
+              </a:ext>
+            </a:extLst>
+          </p:cNvPr>
+          <p:cNvSpPr/>
+          <p:nvPr/>
+        </p:nvSpPr>
+        <p:spPr>
+          <a:xfrm>
+            <a:off x="6007665" y="747272"/>
+            <a:ext cx="1945439" cy="826476"/>
+          </a:xfrm>
+          <a:prstGeom prst="ellipse">
+            <a:avLst/>
+          </a:prstGeom>
+          <a:solidFill>
+            <a:schemeClr val="accent6">
+              <a:lumMod val="60000"/>
+              <a:lumOff val="40000"/>
+            </a:schemeClr>
+          </a:solidFill>
+          <a:ln w="38100">
+            <a:solidFill>
+              <a:schemeClr val="accent6"/>
+            </a:solidFill>
+          </a:ln>
+        </p:spPr>
+        <p:style>
+          <a:lnRef idx="2">
+            <a:schemeClr val="accent1">
+              <a:shade val="50000"/>
+            </a:schemeClr>
+          </a:lnRef>
+          <a:fillRef idx="1">
+            <a:schemeClr val="accent1"/>
+          </a:fillRef>
+          <a:effectRef idx="0">
+            <a:schemeClr val="accent1"/>
+          </a:effectRef>
+          <a:fontRef idx="minor">
+            <a:schemeClr val="lt1"/>
+          </a:fontRef>
+        </p:style>
+        <p:txBody>
+          <a:bodyPr rtlCol="0" anchor="ctr"/>
+          <a:lstStyle/>
+          <a:p>
+            <a:pPr algn="ctr"/>
+            <a:r>
+              <a:rPr lang="it-IT" sz="2400" dirty="0">
+                <a:solidFill>
+                  <a:schemeClr val="tx2"/>
+                </a:solidFill>
+              </a:rPr>
+              <a:t>Actuators</a:t>
+            </a:r>
+            <a:endParaRPr lang="it-IT" dirty="0">
+              <a:solidFill>
+                <a:schemeClr val="tx2"/>
+              </a:solidFill>
+            </a:endParaRPr>
+          </a:p>
+        </p:txBody>
+      </p:sp>
+      <p:sp>
+        <p:nvSpPr>
+          <p:cNvPr id="29" name="Ovale 28">
+            <a:extLst>
+              <a:ext uri="{FF2B5EF4-FFF2-40B4-BE49-F238E27FC236}">
+                <a16:creationId xmlns:a16="http://schemas.microsoft.com/office/drawing/2014/main" id="{DEC9C7EB-E59A-44B4-BEBC-8F48164F185F}"/>
+              </a:ext>
+            </a:extLst>
+          </p:cNvPr>
+          <p:cNvSpPr/>
+          <p:nvPr/>
+        </p:nvSpPr>
+        <p:spPr>
+          <a:xfrm>
+            <a:off x="6018850" y="5284252"/>
+            <a:ext cx="1945439" cy="826476"/>
+          </a:xfrm>
+          <a:prstGeom prst="ellipse">
+            <a:avLst/>
+          </a:prstGeom>
+          <a:solidFill>
+            <a:schemeClr val="bg1">
+              <a:lumMod val="75000"/>
+            </a:schemeClr>
+          </a:solidFill>
+          <a:ln w="38100">
+            <a:solidFill>
+              <a:schemeClr val="tx1"/>
+            </a:solidFill>
+          </a:ln>
+        </p:spPr>
+        <p:style>
+          <a:lnRef idx="2">
+            <a:schemeClr val="accent1">
+              <a:shade val="50000"/>
+            </a:schemeClr>
+          </a:lnRef>
+          <a:fillRef idx="1">
+            <a:schemeClr val="accent1"/>
+          </a:fillRef>
+          <a:effectRef idx="0">
+            <a:schemeClr val="accent1"/>
+          </a:effectRef>
+          <a:fontRef idx="minor">
+            <a:schemeClr val="lt1"/>
+          </a:fontRef>
+        </p:style>
+        <p:txBody>
+          <a:bodyPr rtlCol="0" anchor="ctr"/>
+          <a:lstStyle/>
+          <a:p>
+            <a:pPr algn="ctr"/>
+            <a:r>
+              <a:rPr lang="it-IT" sz="2400" dirty="0">
+                <a:solidFill>
+                  <a:schemeClr val="tx2"/>
+                </a:solidFill>
+              </a:rPr>
+              <a:t>Robots</a:t>
+            </a:r>
+            <a:endParaRPr lang="it-IT" dirty="0">
+              <a:solidFill>
+                <a:schemeClr val="tx2"/>
+              </a:solidFill>
+            </a:endParaRPr>
+          </a:p>
+        </p:txBody>
+      </p:sp>
+      <p:sp>
+        <p:nvSpPr>
+          <p:cNvPr id="38" name="Ovale 37">
+            <a:extLst>
+              <a:ext uri="{FF2B5EF4-FFF2-40B4-BE49-F238E27FC236}">
+                <a16:creationId xmlns:a16="http://schemas.microsoft.com/office/drawing/2014/main" id="{5EF486A9-F96F-4DDF-9A64-C5FB015EDA4F}"/>
+              </a:ext>
+            </a:extLst>
+          </p:cNvPr>
+          <p:cNvSpPr/>
+          <p:nvPr/>
+        </p:nvSpPr>
+        <p:spPr>
+          <a:xfrm>
+            <a:off x="2175147" y="2821575"/>
+            <a:ext cx="2377933" cy="1214849"/>
+          </a:xfrm>
+          <a:prstGeom prst="ellipse">
+            <a:avLst/>
+          </a:prstGeom>
+          <a:solidFill>
+            <a:schemeClr val="accent1">
+              <a:lumMod val="40000"/>
+              <a:lumOff val="60000"/>
+            </a:schemeClr>
+          </a:solidFill>
+          <a:ln w="38100">
+            <a:solidFill>
+              <a:srgbClr val="0070C0"/>
+            </a:solidFill>
+          </a:ln>
+        </p:spPr>
+        <p:style>
+          <a:lnRef idx="2">
+            <a:schemeClr val="accent1">
+              <a:shade val="50000"/>
+            </a:schemeClr>
+          </a:lnRef>
+          <a:fillRef idx="1">
+            <a:schemeClr val="accent1"/>
+          </a:fillRef>
+          <a:effectRef idx="0">
+            <a:schemeClr val="accent1"/>
+          </a:effectRef>
+          <a:fontRef idx="minor">
+            <a:schemeClr val="lt1"/>
+          </a:fontRef>
+        </p:style>
+        <p:txBody>
+          <a:bodyPr rtlCol="0" anchor="ctr"/>
+          <a:lstStyle/>
+          <a:p>
+            <a:pPr algn="ctr"/>
+            <a:r>
+              <a:rPr lang="it-IT" sz="2800" dirty="0">
+                <a:solidFill>
+                  <a:schemeClr val="tx2"/>
+                </a:solidFill>
+              </a:rPr>
+              <a:t>Frontend Server</a:t>
+            </a:r>
+            <a:endParaRPr lang="it-IT" sz="2000" dirty="0">
+              <a:solidFill>
+                <a:schemeClr val="tx2"/>
+              </a:solidFill>
+            </a:endParaRPr>
+          </a:p>
+        </p:txBody>
+      </p:sp>
+      <p:cxnSp>
+        <p:nvCxnSpPr>
+          <p:cNvPr id="39" name="Connettore 2 38">
+            <a:extLst>
+              <a:ext uri="{FF2B5EF4-FFF2-40B4-BE49-F238E27FC236}">
+                <a16:creationId xmlns:a16="http://schemas.microsoft.com/office/drawing/2014/main" id="{48AEFA5F-57C6-4137-ACF3-33E6667128A4}"/>
+              </a:ext>
+            </a:extLst>
+          </p:cNvPr>
+          <p:cNvCxnSpPr>
+            <a:cxnSpLocks/>
+            <a:stCxn id="11" idx="0"/>
+            <a:endCxn id="19" idx="4"/>
+          </p:cNvCxnSpPr>
+          <p:nvPr/>
+        </p:nvCxnSpPr>
+        <p:spPr>
+          <a:xfrm flipV="1">
+            <a:off x="6977207" y="1573748"/>
+            <a:ext cx="3178" cy="699225"/>
+          </a:xfrm>
+          <a:prstGeom prst="straightConnector1">
+            <a:avLst/>
+          </a:prstGeom>
+          <a:ln w="38100">
+            <a:solidFill>
+              <a:srgbClr val="FF0000"/>
+            </a:solidFill>
+            <a:headEnd type="none" w="med" len="med"/>
+            <a:tailEnd type="triangle" w="med" len="med"/>
+          </a:ln>
+        </p:spPr>
+        <p:style>
+          <a:lnRef idx="1">
+            <a:schemeClr val="accent1"/>
+          </a:lnRef>
+          <a:fillRef idx="0">
+            <a:schemeClr val="accent1"/>
+          </a:fillRef>
+          <a:effectRef idx="0">
+            <a:schemeClr val="accent1"/>
+          </a:effectRef>
+          <a:fontRef idx="minor">
+            <a:schemeClr val="tx1"/>
+          </a:fontRef>
+        </p:style>
+      </p:cxnSp>
+      <p:cxnSp>
+        <p:nvCxnSpPr>
+          <p:cNvPr id="42" name="Connettore 2 41">
+            <a:extLst>
+              <a:ext uri="{FF2B5EF4-FFF2-40B4-BE49-F238E27FC236}">
+                <a16:creationId xmlns:a16="http://schemas.microsoft.com/office/drawing/2014/main" id="{2684BFC6-74B1-4F1E-92E4-2835D98D86C7}"/>
+              </a:ext>
+            </a:extLst>
+          </p:cNvPr>
+          <p:cNvCxnSpPr>
+            <a:cxnSpLocks/>
+            <a:stCxn id="18" idx="2"/>
+            <a:endCxn id="11" idx="3"/>
+          </p:cNvCxnSpPr>
+          <p:nvPr/>
+        </p:nvCxnSpPr>
+        <p:spPr>
+          <a:xfrm flipH="1">
+            <a:off x="8166173" y="3429000"/>
+            <a:ext cx="780071" cy="0"/>
+          </a:xfrm>
+          <a:prstGeom prst="straightConnector1">
+            <a:avLst/>
+          </a:prstGeom>
+          <a:ln w="38100">
+            <a:solidFill>
+              <a:srgbClr val="FF0000"/>
+            </a:solidFill>
+            <a:headEnd type="none" w="med" len="med"/>
+            <a:tailEnd type="triangle" w="med" len="med"/>
+          </a:ln>
+        </p:spPr>
+        <p:style>
+          <a:lnRef idx="1">
+            <a:schemeClr val="accent1"/>
+          </a:lnRef>
+          <a:fillRef idx="0">
+            <a:schemeClr val="accent1"/>
+          </a:fillRef>
+          <a:effectRef idx="0">
+            <a:schemeClr val="accent1"/>
+          </a:effectRef>
+          <a:fontRef idx="minor">
+            <a:schemeClr val="tx1"/>
+          </a:fontRef>
+        </p:style>
+      </p:cxnSp>
+      <p:cxnSp>
+        <p:nvCxnSpPr>
+          <p:cNvPr id="45" name="Connettore 2 44">
+            <a:extLst>
+              <a:ext uri="{FF2B5EF4-FFF2-40B4-BE49-F238E27FC236}">
+                <a16:creationId xmlns:a16="http://schemas.microsoft.com/office/drawing/2014/main" id="{87871395-42A8-45AC-9CF7-7A8ADA23E1D3}"/>
+              </a:ext>
+            </a:extLst>
+          </p:cNvPr>
+          <p:cNvCxnSpPr>
+            <a:cxnSpLocks/>
+            <a:stCxn id="29" idx="0"/>
+            <a:endCxn id="11" idx="2"/>
+          </p:cNvCxnSpPr>
+          <p:nvPr/>
+        </p:nvCxnSpPr>
+        <p:spPr>
+          <a:xfrm flipH="1" flipV="1">
+            <a:off x="6977207" y="4585027"/>
+            <a:ext cx="14363" cy="699225"/>
+          </a:xfrm>
+          <a:prstGeom prst="straightConnector1">
+            <a:avLst/>
+          </a:prstGeom>
+          <a:ln w="38100">
+            <a:solidFill>
+              <a:srgbClr val="FF0000"/>
+            </a:solidFill>
+            <a:headEnd type="triangle" w="med" len="med"/>
+            <a:tailEnd type="triangle" w="med" len="med"/>
+          </a:ln>
+        </p:spPr>
+        <p:style>
+          <a:lnRef idx="1">
+            <a:schemeClr val="accent1"/>
+          </a:lnRef>
+          <a:fillRef idx="0">
+            <a:schemeClr val="accent1"/>
+          </a:fillRef>
+          <a:effectRef idx="0">
+            <a:schemeClr val="accent1"/>
+          </a:effectRef>
+          <a:fontRef idx="minor">
+            <a:schemeClr val="tx1"/>
+          </a:fontRef>
+        </p:style>
+      </p:cxnSp>
     </p:spTree>
     <p:extLst>
       <p:ext uri="{BB962C8B-B14F-4D97-AF65-F5344CB8AC3E}">

</xml_diff>

<commit_message>
modifiche diagramma obastacle avoidance
</commit_message>
<xml_diff>
--- a/Appunti/ISSPowerPoint.pptx
+++ b/Appunti/ISSPowerPoint.pptx
@@ -21997,7 +21997,7 @@
           </p:nvSpPr>
           <p:spPr>
             <a:xfrm>
-              <a:off x="469506" y="1570014"/>
+              <a:off x="469506" y="1401338"/>
               <a:ext cx="1652390" cy="400110"/>
             </a:xfrm>
             <a:prstGeom prst="rect">
@@ -24300,6 +24300,88 @@
           </a:extLst>
         </p:spPr>
       </p:pic>
+      <p:cxnSp>
+        <p:nvCxnSpPr>
+          <p:cNvPr id="6" name="Connettore curvo 5">
+            <a:extLst>
+              <a:ext uri="{FF2B5EF4-FFF2-40B4-BE49-F238E27FC236}">
+                <a16:creationId xmlns:a16="http://schemas.microsoft.com/office/drawing/2014/main" id="{2436FCBF-5349-4E8E-9CF6-62AF4AE7B2EB}"/>
+              </a:ext>
+            </a:extLst>
+          </p:cNvPr>
+          <p:cNvCxnSpPr>
+            <a:stCxn id="10" idx="2"/>
+            <a:endCxn id="5" idx="2"/>
+          </p:cNvCxnSpPr>
+          <p:nvPr/>
+        </p:nvCxnSpPr>
+        <p:spPr>
+          <a:xfrm rot="10800000">
+            <a:off x="946443" y="815773"/>
+            <a:ext cx="271862" cy="3452622"/>
+          </a:xfrm>
+          <a:prstGeom prst="curvedConnector3">
+            <a:avLst>
+              <a:gd name="adj1" fmla="val 337566"/>
+            </a:avLst>
+          </a:prstGeom>
+          <a:ln w="38100">
+            <a:solidFill>
+              <a:schemeClr val="tx1"/>
+            </a:solidFill>
+            <a:tailEnd type="triangle"/>
+          </a:ln>
+        </p:spPr>
+        <p:style>
+          <a:lnRef idx="1">
+            <a:schemeClr val="accent1"/>
+          </a:lnRef>
+          <a:fillRef idx="0">
+            <a:schemeClr val="accent1"/>
+          </a:fillRef>
+          <a:effectRef idx="0">
+            <a:schemeClr val="accent1"/>
+          </a:effectRef>
+          <a:fontRef idx="minor">
+            <a:schemeClr val="tx1"/>
+          </a:fontRef>
+        </p:style>
+      </p:cxnSp>
+      <p:sp>
+        <p:nvSpPr>
+          <p:cNvPr id="66" name="CasellaDiTesto 65">
+            <a:extLst>
+              <a:ext uri="{FF2B5EF4-FFF2-40B4-BE49-F238E27FC236}">
+                <a16:creationId xmlns:a16="http://schemas.microsoft.com/office/drawing/2014/main" id="{8599E1DE-DBE1-445B-BEE2-400A3096F3D9}"/>
+              </a:ext>
+            </a:extLst>
+          </p:cNvPr>
+          <p:cNvSpPr txBox="1"/>
+          <p:nvPr/>
+        </p:nvSpPr>
+        <p:spPr>
+          <a:xfrm rot="3748974">
+            <a:off x="-229204" y="3556829"/>
+            <a:ext cx="1388960" cy="400110"/>
+          </a:xfrm>
+          <a:prstGeom prst="rect">
+            <a:avLst/>
+          </a:prstGeom>
+          <a:noFill/>
+        </p:spPr>
+        <p:txBody>
+          <a:bodyPr wrap="square" rtlCol="0">
+            <a:spAutoFit/>
+          </a:bodyPr>
+          <a:lstStyle/>
+          <a:p>
+            <a:r>
+              <a:rPr lang="it-IT" sz="2000" dirty="0"/>
+              <a:t>frontSonar</a:t>
+            </a:r>
+          </a:p>
+        </p:txBody>
+      </p:sp>
     </p:spTree>
     <p:extLst>
       <p:ext uri="{BB962C8B-B14F-4D97-AF65-F5344CB8AC3E}">

</xml_diff>